<commit_message>
add edge case error handling
</commit_message>
<xml_diff>
--- a/from Node14 to 18_4/Node14-18.powerpoint.pptx
+++ b/from Node14 to 18_4/Node14-18.powerpoint.pptx
@@ -5,7 +5,7 @@
     <p:sldMasterId id="2147483720" r:id="rId1"/>
   </p:sldMasterIdLst>
   <p:notesMasterIdLst>
-    <p:notesMasterId r:id="rId35"/>
+    <p:notesMasterId r:id="rId36"/>
   </p:notesMasterIdLst>
   <p:sldIdLst>
     <p:sldId id="263" r:id="rId2"/>
@@ -15,37 +15,38 @@
     <p:sldId id="285" r:id="rId6"/>
     <p:sldId id="286" r:id="rId7"/>
     <p:sldId id="287" r:id="rId8"/>
-    <p:sldId id="270" r:id="rId9"/>
-    <p:sldId id="272" r:id="rId10"/>
-    <p:sldId id="271" r:id="rId11"/>
-    <p:sldId id="273" r:id="rId12"/>
-    <p:sldId id="274" r:id="rId13"/>
-    <p:sldId id="276" r:id="rId14"/>
-    <p:sldId id="278" r:id="rId15"/>
-    <p:sldId id="279" r:id="rId16"/>
-    <p:sldId id="280" r:id="rId17"/>
-    <p:sldId id="281" r:id="rId18"/>
-    <p:sldId id="282" r:id="rId19"/>
-    <p:sldId id="283" r:id="rId20"/>
-    <p:sldId id="284" r:id="rId21"/>
-    <p:sldId id="288" r:id="rId22"/>
-    <p:sldId id="292" r:id="rId23"/>
-    <p:sldId id="296" r:id="rId24"/>
-    <p:sldId id="297" r:id="rId25"/>
-    <p:sldId id="298" r:id="rId26"/>
-    <p:sldId id="291" r:id="rId27"/>
-    <p:sldId id="293" r:id="rId28"/>
-    <p:sldId id="294" r:id="rId29"/>
-    <p:sldId id="301" r:id="rId30"/>
-    <p:sldId id="303" r:id="rId31"/>
-    <p:sldId id="302" r:id="rId32"/>
-    <p:sldId id="290" r:id="rId33"/>
-    <p:sldId id="295" r:id="rId34"/>
+    <p:sldId id="304" r:id="rId9"/>
+    <p:sldId id="270" r:id="rId10"/>
+    <p:sldId id="272" r:id="rId11"/>
+    <p:sldId id="271" r:id="rId12"/>
+    <p:sldId id="273" r:id="rId13"/>
+    <p:sldId id="274" r:id="rId14"/>
+    <p:sldId id="276" r:id="rId15"/>
+    <p:sldId id="278" r:id="rId16"/>
+    <p:sldId id="279" r:id="rId17"/>
+    <p:sldId id="280" r:id="rId18"/>
+    <p:sldId id="281" r:id="rId19"/>
+    <p:sldId id="282" r:id="rId20"/>
+    <p:sldId id="283" r:id="rId21"/>
+    <p:sldId id="284" r:id="rId22"/>
+    <p:sldId id="288" r:id="rId23"/>
+    <p:sldId id="292" r:id="rId24"/>
+    <p:sldId id="296" r:id="rId25"/>
+    <p:sldId id="297" r:id="rId26"/>
+    <p:sldId id="298" r:id="rId27"/>
+    <p:sldId id="291" r:id="rId28"/>
+    <p:sldId id="293" r:id="rId29"/>
+    <p:sldId id="294" r:id="rId30"/>
+    <p:sldId id="301" r:id="rId31"/>
+    <p:sldId id="303" r:id="rId32"/>
+    <p:sldId id="302" r:id="rId33"/>
+    <p:sldId id="290" r:id="rId34"/>
+    <p:sldId id="295" r:id="rId35"/>
   </p:sldIdLst>
   <p:sldSz cx="9144000" cy="6858000" type="screen4x3"/>
   <p:notesSz cx="6858000" cy="9144000"/>
   <p:custDataLst>
-    <p:tags r:id="rId36"/>
+    <p:tags r:id="rId37"/>
   </p:custDataLst>
   <p:defaultTextStyle>
     <a:defPPr>
@@ -243,7 +244,7 @@
           <a:p>
             <a:fld id="{76FB3B5D-8085-41F4-8D3F-AD7279DC1F90}" type="datetimeFigureOut">
               <a:rPr lang="en-US" smtClean="0"/>
-              <a:t>8/11/22</a:t>
+              <a:t>8/12/22</a:t>
             </a:fld>
             <a:endParaRPr lang="en-US"/>
           </a:p>
@@ -668,7 +669,7 @@
     </p:spTree>
     <p:extLst>
       <p:ext uri="{BB962C8B-B14F-4D97-AF65-F5344CB8AC3E}">
-        <p14:creationId xmlns:p14="http://schemas.microsoft.com/office/powerpoint/2010/main" val="3028643736"/>
+        <p14:creationId xmlns:p14="http://schemas.microsoft.com/office/powerpoint/2010/main" val="3357813912"/>
       </p:ext>
     </p:extLst>
   </p:cSld>
@@ -752,7 +753,7 @@
     </p:spTree>
     <p:extLst>
       <p:ext uri="{BB962C8B-B14F-4D97-AF65-F5344CB8AC3E}">
-        <p14:creationId xmlns:p14="http://schemas.microsoft.com/office/powerpoint/2010/main" val="1508672699"/>
+        <p14:creationId xmlns:p14="http://schemas.microsoft.com/office/powerpoint/2010/main" val="3028643736"/>
       </p:ext>
     </p:extLst>
   </p:cSld>
@@ -836,7 +837,7 @@
     </p:spTree>
     <p:extLst>
       <p:ext uri="{BB962C8B-B14F-4D97-AF65-F5344CB8AC3E}">
-        <p14:creationId xmlns:p14="http://schemas.microsoft.com/office/powerpoint/2010/main" val="2752716445"/>
+        <p14:creationId xmlns:p14="http://schemas.microsoft.com/office/powerpoint/2010/main" val="1508672699"/>
       </p:ext>
     </p:extLst>
   </p:cSld>
@@ -920,7 +921,7 @@
     </p:spTree>
     <p:extLst>
       <p:ext uri="{BB962C8B-B14F-4D97-AF65-F5344CB8AC3E}">
-        <p14:creationId xmlns:p14="http://schemas.microsoft.com/office/powerpoint/2010/main" val="1606660222"/>
+        <p14:creationId xmlns:p14="http://schemas.microsoft.com/office/powerpoint/2010/main" val="2752716445"/>
       </p:ext>
     </p:extLst>
   </p:cSld>
@@ -1004,7 +1005,7 @@
     </p:spTree>
     <p:extLst>
       <p:ext uri="{BB962C8B-B14F-4D97-AF65-F5344CB8AC3E}">
-        <p14:creationId xmlns:p14="http://schemas.microsoft.com/office/powerpoint/2010/main" val="2576589982"/>
+        <p14:creationId xmlns:p14="http://schemas.microsoft.com/office/powerpoint/2010/main" val="1606660222"/>
       </p:ext>
     </p:extLst>
   </p:cSld>
@@ -1088,7 +1089,7 @@
     </p:spTree>
     <p:extLst>
       <p:ext uri="{BB962C8B-B14F-4D97-AF65-F5344CB8AC3E}">
-        <p14:creationId xmlns:p14="http://schemas.microsoft.com/office/powerpoint/2010/main" val="2181296735"/>
+        <p14:creationId xmlns:p14="http://schemas.microsoft.com/office/powerpoint/2010/main" val="2576589982"/>
       </p:ext>
     </p:extLst>
   </p:cSld>
@@ -1172,7 +1173,7 @@
     </p:spTree>
     <p:extLst>
       <p:ext uri="{BB962C8B-B14F-4D97-AF65-F5344CB8AC3E}">
-        <p14:creationId xmlns:p14="http://schemas.microsoft.com/office/powerpoint/2010/main" val="1181337693"/>
+        <p14:creationId xmlns:p14="http://schemas.microsoft.com/office/powerpoint/2010/main" val="2181296735"/>
       </p:ext>
     </p:extLst>
   </p:cSld>
@@ -1256,7 +1257,7 @@
     </p:spTree>
     <p:extLst>
       <p:ext uri="{BB962C8B-B14F-4D97-AF65-F5344CB8AC3E}">
-        <p14:creationId xmlns:p14="http://schemas.microsoft.com/office/powerpoint/2010/main" val="3013916771"/>
+        <p14:creationId xmlns:p14="http://schemas.microsoft.com/office/powerpoint/2010/main" val="1181337693"/>
       </p:ext>
     </p:extLst>
   </p:cSld>
@@ -1340,7 +1341,7 @@
     </p:spTree>
     <p:extLst>
       <p:ext uri="{BB962C8B-B14F-4D97-AF65-F5344CB8AC3E}">
-        <p14:creationId xmlns:p14="http://schemas.microsoft.com/office/powerpoint/2010/main" val="584186073"/>
+        <p14:creationId xmlns:p14="http://schemas.microsoft.com/office/powerpoint/2010/main" val="3013916771"/>
       </p:ext>
     </p:extLst>
   </p:cSld>
@@ -1424,7 +1425,7 @@
     </p:spTree>
     <p:extLst>
       <p:ext uri="{BB962C8B-B14F-4D97-AF65-F5344CB8AC3E}">
-        <p14:creationId xmlns:p14="http://schemas.microsoft.com/office/powerpoint/2010/main" val="1545339435"/>
+        <p14:creationId xmlns:p14="http://schemas.microsoft.com/office/powerpoint/2010/main" val="584186073"/>
       </p:ext>
     </p:extLst>
   </p:cSld>
@@ -1592,7 +1593,7 @@
     </p:spTree>
     <p:extLst>
       <p:ext uri="{BB962C8B-B14F-4D97-AF65-F5344CB8AC3E}">
-        <p14:creationId xmlns:p14="http://schemas.microsoft.com/office/powerpoint/2010/main" val="3468118748"/>
+        <p14:creationId xmlns:p14="http://schemas.microsoft.com/office/powerpoint/2010/main" val="1545339435"/>
       </p:ext>
     </p:extLst>
   </p:cSld>
@@ -1676,7 +1677,7 @@
     </p:spTree>
     <p:extLst>
       <p:ext uri="{BB962C8B-B14F-4D97-AF65-F5344CB8AC3E}">
-        <p14:creationId xmlns:p14="http://schemas.microsoft.com/office/powerpoint/2010/main" val="1296276087"/>
+        <p14:creationId xmlns:p14="http://schemas.microsoft.com/office/powerpoint/2010/main" val="3468118748"/>
       </p:ext>
     </p:extLst>
   </p:cSld>
@@ -1760,7 +1761,7 @@
     </p:spTree>
     <p:extLst>
       <p:ext uri="{BB962C8B-B14F-4D97-AF65-F5344CB8AC3E}">
-        <p14:creationId xmlns:p14="http://schemas.microsoft.com/office/powerpoint/2010/main" val="3033761594"/>
+        <p14:creationId xmlns:p14="http://schemas.microsoft.com/office/powerpoint/2010/main" val="1296276087"/>
       </p:ext>
     </p:extLst>
   </p:cSld>
@@ -1844,7 +1845,7 @@
     </p:spTree>
     <p:extLst>
       <p:ext uri="{BB962C8B-B14F-4D97-AF65-F5344CB8AC3E}">
-        <p14:creationId xmlns:p14="http://schemas.microsoft.com/office/powerpoint/2010/main" val="1482358437"/>
+        <p14:creationId xmlns:p14="http://schemas.microsoft.com/office/powerpoint/2010/main" val="3033761594"/>
       </p:ext>
     </p:extLst>
   </p:cSld>
@@ -1928,7 +1929,7 @@
     </p:spTree>
     <p:extLst>
       <p:ext uri="{BB962C8B-B14F-4D97-AF65-F5344CB8AC3E}">
-        <p14:creationId xmlns:p14="http://schemas.microsoft.com/office/powerpoint/2010/main" val="2343949943"/>
+        <p14:creationId xmlns:p14="http://schemas.microsoft.com/office/powerpoint/2010/main" val="1482358437"/>
       </p:ext>
     </p:extLst>
   </p:cSld>
@@ -2012,7 +2013,7 @@
     </p:spTree>
     <p:extLst>
       <p:ext uri="{BB962C8B-B14F-4D97-AF65-F5344CB8AC3E}">
-        <p14:creationId xmlns:p14="http://schemas.microsoft.com/office/powerpoint/2010/main" val="364836999"/>
+        <p14:creationId xmlns:p14="http://schemas.microsoft.com/office/powerpoint/2010/main" val="2343949943"/>
       </p:ext>
     </p:extLst>
   </p:cSld>
@@ -2096,7 +2097,7 @@
     </p:spTree>
     <p:extLst>
       <p:ext uri="{BB962C8B-B14F-4D97-AF65-F5344CB8AC3E}">
-        <p14:creationId xmlns:p14="http://schemas.microsoft.com/office/powerpoint/2010/main" val="1365421613"/>
+        <p14:creationId xmlns:p14="http://schemas.microsoft.com/office/powerpoint/2010/main" val="364836999"/>
       </p:ext>
     </p:extLst>
   </p:cSld>
@@ -2180,7 +2181,7 @@
     </p:spTree>
     <p:extLst>
       <p:ext uri="{BB962C8B-B14F-4D97-AF65-F5344CB8AC3E}">
-        <p14:creationId xmlns:p14="http://schemas.microsoft.com/office/powerpoint/2010/main" val="231302674"/>
+        <p14:creationId xmlns:p14="http://schemas.microsoft.com/office/powerpoint/2010/main" val="1365421613"/>
       </p:ext>
     </p:extLst>
   </p:cSld>
@@ -2264,7 +2265,7 @@
     </p:spTree>
     <p:extLst>
       <p:ext uri="{BB962C8B-B14F-4D97-AF65-F5344CB8AC3E}">
-        <p14:creationId xmlns:p14="http://schemas.microsoft.com/office/powerpoint/2010/main" val="3604371772"/>
+        <p14:creationId xmlns:p14="http://schemas.microsoft.com/office/powerpoint/2010/main" val="231302674"/>
       </p:ext>
     </p:extLst>
   </p:cSld>
@@ -2348,7 +2349,7 @@
     </p:spTree>
     <p:extLst>
       <p:ext uri="{BB962C8B-B14F-4D97-AF65-F5344CB8AC3E}">
-        <p14:creationId xmlns:p14="http://schemas.microsoft.com/office/powerpoint/2010/main" val="31742301"/>
+        <p14:creationId xmlns:p14="http://schemas.microsoft.com/office/powerpoint/2010/main" val="3604371772"/>
       </p:ext>
     </p:extLst>
   </p:cSld>
@@ -2516,7 +2517,7 @@
     </p:spTree>
     <p:extLst>
       <p:ext uri="{BB962C8B-B14F-4D97-AF65-F5344CB8AC3E}">
-        <p14:creationId xmlns:p14="http://schemas.microsoft.com/office/powerpoint/2010/main" val="4068176962"/>
+        <p14:creationId xmlns:p14="http://schemas.microsoft.com/office/powerpoint/2010/main" val="31742301"/>
       </p:ext>
     </p:extLst>
   </p:cSld>
@@ -2600,7 +2601,7 @@
     </p:spTree>
     <p:extLst>
       <p:ext uri="{BB962C8B-B14F-4D97-AF65-F5344CB8AC3E}">
-        <p14:creationId xmlns:p14="http://schemas.microsoft.com/office/powerpoint/2010/main" val="3162967801"/>
+        <p14:creationId xmlns:p14="http://schemas.microsoft.com/office/powerpoint/2010/main" val="4068176962"/>
       </p:ext>
     </p:extLst>
   </p:cSld>
@@ -2684,7 +2685,7 @@
     </p:spTree>
     <p:extLst>
       <p:ext uri="{BB962C8B-B14F-4D97-AF65-F5344CB8AC3E}">
-        <p14:creationId xmlns:p14="http://schemas.microsoft.com/office/powerpoint/2010/main" val="811037307"/>
+        <p14:creationId xmlns:p14="http://schemas.microsoft.com/office/powerpoint/2010/main" val="3162967801"/>
       </p:ext>
     </p:extLst>
   </p:cSld>
@@ -2760,6 +2761,90 @@
             <a:fld id="{A81EC861-E83A-4356-9FA8-9584F54C13A4}" type="slidenum">
               <a:rPr lang="en-US" smtClean="0"/>
               <a:t>33</a:t>
+            </a:fld>
+            <a:endParaRPr lang="en-US"/>
+          </a:p>
+        </p:txBody>
+      </p:sp>
+    </p:spTree>
+    <p:extLst>
+      <p:ext uri="{BB962C8B-B14F-4D97-AF65-F5344CB8AC3E}">
+        <p14:creationId xmlns:p14="http://schemas.microsoft.com/office/powerpoint/2010/main" val="811037307"/>
+      </p:ext>
+    </p:extLst>
+  </p:cSld>
+  <p:clrMapOvr>
+    <a:masterClrMapping/>
+  </p:clrMapOvr>
+</p:notes>
+</file>
+
+<file path=ppt/notesSlides/notesSlide34.xml><?xml version="1.0" encoding="utf-8"?>
+<p:notes xmlns:a="http://schemas.openxmlformats.org/drawingml/2006/main" xmlns:r="http://schemas.openxmlformats.org/officeDocument/2006/relationships" xmlns:p="http://schemas.openxmlformats.org/presentationml/2006/main">
+  <p:cSld>
+    <p:spTree>
+      <p:nvGrpSpPr>
+        <p:cNvPr id="1" name=""/>
+        <p:cNvGrpSpPr/>
+        <p:nvPr/>
+      </p:nvGrpSpPr>
+      <p:grpSpPr>
+        <a:xfrm>
+          <a:off x="0" y="0"/>
+          <a:ext cx="0" cy="0"/>
+          <a:chOff x="0" y="0"/>
+          <a:chExt cx="0" cy="0"/>
+        </a:xfrm>
+      </p:grpSpPr>
+      <p:sp>
+        <p:nvSpPr>
+          <p:cNvPr id="2" name="Slide Image Placeholder 1"/>
+          <p:cNvSpPr>
+            <a:spLocks noGrp="1" noRot="1" noChangeAspect="1"/>
+          </p:cNvSpPr>
+          <p:nvPr>
+            <p:ph type="sldImg"/>
+          </p:nvPr>
+        </p:nvSpPr>
+        <p:spPr/>
+      </p:sp>
+      <p:sp>
+        <p:nvSpPr>
+          <p:cNvPr id="3" name="Notes Placeholder 2"/>
+          <p:cNvSpPr>
+            <a:spLocks noGrp="1"/>
+          </p:cNvSpPr>
+          <p:nvPr>
+            <p:ph type="body" idx="1"/>
+          </p:nvPr>
+        </p:nvSpPr>
+        <p:spPr/>
+        <p:txBody>
+          <a:bodyPr/>
+          <a:lstStyle/>
+          <a:p>
+            <a:endParaRPr lang="en-US"/>
+          </a:p>
+        </p:txBody>
+      </p:sp>
+      <p:sp>
+        <p:nvSpPr>
+          <p:cNvPr id="4" name="Slide Number Placeholder 3"/>
+          <p:cNvSpPr>
+            <a:spLocks noGrp="1"/>
+          </p:cNvSpPr>
+          <p:nvPr>
+            <p:ph type="sldNum" sz="quarter" idx="10"/>
+          </p:nvPr>
+        </p:nvSpPr>
+        <p:spPr/>
+        <p:txBody>
+          <a:bodyPr/>
+          <a:lstStyle/>
+          <a:p>
+            <a:fld id="{A81EC861-E83A-4356-9FA8-9584F54C13A4}" type="slidenum">
+              <a:rPr lang="en-US" smtClean="0"/>
+              <a:t>34</a:t>
             </a:fld>
             <a:endParaRPr lang="en-US"/>
           </a:p>
@@ -3188,7 +3273,7 @@
     </p:spTree>
     <p:extLst>
       <p:ext uri="{BB962C8B-B14F-4D97-AF65-F5344CB8AC3E}">
-        <p14:creationId xmlns:p14="http://schemas.microsoft.com/office/powerpoint/2010/main" val="4245438914"/>
+        <p14:creationId xmlns:p14="http://schemas.microsoft.com/office/powerpoint/2010/main" val="4032661384"/>
       </p:ext>
     </p:extLst>
   </p:cSld>
@@ -3272,7 +3357,7 @@
     </p:spTree>
     <p:extLst>
       <p:ext uri="{BB962C8B-B14F-4D97-AF65-F5344CB8AC3E}">
-        <p14:creationId xmlns:p14="http://schemas.microsoft.com/office/powerpoint/2010/main" val="3357813912"/>
+        <p14:creationId xmlns:p14="http://schemas.microsoft.com/office/powerpoint/2010/main" val="4245438914"/>
       </p:ext>
     </p:extLst>
   </p:cSld>
@@ -3417,7 +3502,7 @@
           <a:p>
             <a:fld id="{28AE415C-7A85-634B-B028-DBE71C5D2D63}" type="datetime1">
               <a:rPr lang="en-US" smtClean="0"/>
-              <a:t>8/11/22</a:t>
+              <a:t>8/12/22</a:t>
             </a:fld>
             <a:endParaRPr lang="en-US"/>
           </a:p>
@@ -4289,7 +4374,7 @@
           <a:p>
             <a:fld id="{348C49A0-719E-C942-A783-66E173E6A0F0}" type="datetime1">
               <a:rPr lang="en-US" smtClean="0"/>
-              <a:t>8/11/22</a:t>
+              <a:t>8/12/22</a:t>
             </a:fld>
             <a:endParaRPr lang="en-US"/>
           </a:p>
@@ -4467,7 +4552,7 @@
           <a:p>
             <a:fld id="{7F0FF785-B1BC-7C47-8418-671EC1989A67}" type="datetime1">
               <a:rPr lang="en-US" smtClean="0"/>
-              <a:t>8/11/22</a:t>
+              <a:t>8/12/22</a:t>
             </a:fld>
             <a:endParaRPr lang="en-US"/>
           </a:p>
@@ -4640,7 +4725,7 @@
           <a:p>
             <a:fld id="{FBC6205D-28A0-D14B-BB25-8E18F06B9E65}" type="datetime1">
               <a:rPr lang="en-US" smtClean="0"/>
-              <a:t>8/11/22</a:t>
+              <a:t>8/12/22</a:t>
             </a:fld>
             <a:endParaRPr lang="en-US"/>
           </a:p>
@@ -4853,7 +4938,7 @@
           <a:p>
             <a:fld id="{E0B5867B-D9CD-7440-8E34-2DE4EEBB756F}" type="datetime1">
               <a:rPr lang="en-US" smtClean="0"/>
-              <a:t>8/11/22</a:t>
+              <a:t>8/12/22</a:t>
             </a:fld>
             <a:endParaRPr lang="en-US"/>
           </a:p>
@@ -5670,7 +5755,7 @@
           <a:p>
             <a:fld id="{C4A280C9-E45C-9241-904E-CCA7A172C53A}" type="datetime1">
               <a:rPr lang="en-US" smtClean="0"/>
-              <a:t>8/11/22</a:t>
+              <a:t>8/12/22</a:t>
             </a:fld>
             <a:endParaRPr lang="en-US"/>
           </a:p>
@@ -5909,7 +5994,7 @@
           <a:p>
             <a:fld id="{B00548EF-D67B-BD4A-9D30-4143161FE6C7}" type="datetime1">
               <a:rPr lang="en-US" smtClean="0"/>
-              <a:t>8/11/22</a:t>
+              <a:t>8/12/22</a:t>
             </a:fld>
             <a:endParaRPr lang="en-US"/>
           </a:p>
@@ -6235,7 +6320,7 @@
           <a:p>
             <a:fld id="{F2D71A65-90D4-EE40-BBFD-8771A93CB24C}" type="datetime1">
               <a:rPr lang="en-US" smtClean="0"/>
-              <a:t>8/11/22</a:t>
+              <a:t>8/12/22</a:t>
             </a:fld>
             <a:endParaRPr lang="en-US"/>
           </a:p>
@@ -6329,7 +6414,7 @@
           <a:p>
             <a:fld id="{FD4EEC9E-69C9-2145-9EEE-DB99B983CF0A}" type="datetime1">
               <a:rPr lang="en-US" smtClean="0"/>
-              <a:t>8/11/22</a:t>
+              <a:t>8/12/22</a:t>
             </a:fld>
             <a:endParaRPr lang="en-US"/>
           </a:p>
@@ -6849,7 +6934,7 @@
           <a:p>
             <a:fld id="{7218A1DF-E552-E741-9FD8-9B85174CEEA6}" type="datetime1">
               <a:rPr lang="en-US" smtClean="0"/>
-              <a:t>8/11/22</a:t>
+              <a:t>8/12/22</a:t>
             </a:fld>
             <a:endParaRPr lang="en-US"/>
           </a:p>
@@ -7363,7 +7448,7 @@
           <a:p>
             <a:fld id="{56AB1607-3325-4A40-862F-490ACE222F66}" type="datetime1">
               <a:rPr lang="en-US" smtClean="0"/>
-              <a:t>8/11/22</a:t>
+              <a:t>8/12/22</a:t>
             </a:fld>
             <a:endParaRPr lang="en-US"/>
           </a:p>
@@ -7610,7 +7695,7 @@
           <a:p>
             <a:fld id="{96CD6ED2-99B4-D84C-83B0-15233ABEDB88}" type="datetime1">
               <a:rPr lang="en-US" smtClean="0"/>
-              <a:t>8/11/22</a:t>
+              <a:t>8/12/22</a:t>
             </a:fld>
             <a:endParaRPr lang="en-US"/>
           </a:p>
@@ -8351,7 +8436,7 @@
         <p:spPr>
           <a:xfrm>
             <a:off x="1752600" y="1447800"/>
-            <a:ext cx="6705600" cy="2895600"/>
+            <a:ext cx="6705600" cy="4114800"/>
           </a:xfrm>
           <a:prstGeom prst="rect">
             <a:avLst/>
@@ -8400,7 +8485,7 @@
         </p:nvSpPr>
         <p:spPr>
           <a:xfrm>
-            <a:off x="1752600" y="630838"/>
+            <a:off x="2971800" y="1869785"/>
             <a:ext cx="6705600" cy="598962"/>
           </a:xfrm>
         </p:spPr>
@@ -8412,69 +8497,70 @@
           <a:p>
             <a:r>
               <a:rPr lang="en-US" sz="4000" dirty="0"/>
-              <a:t>New import protocol</a:t>
-            </a:r>
-          </a:p>
-        </p:txBody>
-      </p:sp>
-      <p:sp>
-        <p:nvSpPr>
-          <p:cNvPr id="3" name="Title 1">
+              <a:t>Node 14.18 – </a:t>
+            </a:r>
+            <a:br>
+              <a:rPr lang="en-US" sz="4000" dirty="0"/>
+            </a:br>
+            <a:r>
+              <a:rPr lang="en-US" dirty="0"/>
+              <a:t>Built-in tooling</a:t>
+            </a:r>
+            <a:br>
+              <a:rPr lang="en-US" dirty="0"/>
+            </a:br>
+            <a:br>
+              <a:rPr lang="en-US" sz="4000" dirty="0"/>
+            </a:br>
+            <a:r>
+              <a:rPr lang="en-US" sz="4000" dirty="0"/>
+              <a:t> </a:t>
+            </a:r>
+          </a:p>
+        </p:txBody>
+      </p:sp>
+      <p:pic>
+        <p:nvPicPr>
+          <p:cNvPr id="4" name="Picture 3" descr="Graphical user interface, text, application&#10;&#10;Description automatically generated">
             <a:extLst>
               <a:ext uri="{FF2B5EF4-FFF2-40B4-BE49-F238E27FC236}">
-                <a16:creationId xmlns:a16="http://schemas.microsoft.com/office/drawing/2014/main" id="{40D82690-2AB7-2AEE-96F1-F94C3A150FDC}"/>
+                <a16:creationId xmlns:a16="http://schemas.microsoft.com/office/drawing/2014/main" id="{EB1C4C4A-0B7A-5DAC-AFC0-D654A6154FDB}"/>
               </a:ext>
             </a:extLst>
           </p:cNvPr>
-          <p:cNvSpPr txBox="1">
-            <a:spLocks/>
-          </p:cNvSpPr>
-          <p:nvPr/>
-        </p:nvSpPr>
-        <p:spPr>
-          <a:xfrm>
-            <a:off x="1790700" y="1600200"/>
-            <a:ext cx="6705600" cy="533400"/>
+          <p:cNvPicPr>
+            <a:picLocks noChangeAspect="1"/>
+          </p:cNvPicPr>
+          <p:nvPr/>
+        </p:nvPicPr>
+        <p:blipFill>
+          <a:blip r:embed="rId3">
+            <a:extLst>
+              <a:ext uri="{28A0092B-C50C-407E-A947-70E740481C1C}">
+                <a14:useLocalDpi xmlns:a14="http://schemas.microsoft.com/office/drawing/2010/main" val="0"/>
+              </a:ext>
+            </a:extLst>
+          </a:blip>
+          <a:stretch>
+            <a:fillRect/>
+          </a:stretch>
+        </p:blipFill>
+        <p:spPr>
+          <a:xfrm>
+            <a:off x="876300" y="1479487"/>
+            <a:ext cx="7391400" cy="4582668"/>
           </a:xfrm>
           <a:prstGeom prst="rect">
             <a:avLst/>
           </a:prstGeom>
         </p:spPr>
-        <p:txBody>
-          <a:bodyPr vert="horz" anchor="b">
-            <a:noAutofit/>
-          </a:bodyPr>
-          <a:lstStyle>
-            <a:lvl1pPr algn="l" rtl="0" eaLnBrk="1" latinLnBrk="0" hangingPunct="1">
-              <a:spcBef>
-                <a:spcPct val="0"/>
-              </a:spcBef>
-              <a:buNone/>
-              <a:defRPr kumimoji="0" sz="3000" b="1" kern="1200" cap="small" baseline="0">
-                <a:solidFill>
-                  <a:schemeClr val="tx2"/>
-                </a:solidFill>
-                <a:latin typeface="+mj-lt"/>
-                <a:ea typeface="+mj-ea"/>
-                <a:cs typeface="+mj-cs"/>
-              </a:defRPr>
-            </a:lvl1pPr>
-          </a:lstStyle>
-          <a:p>
-            <a:r>
-              <a:rPr lang="en-US" b="0" dirty="0"/>
-              <a:t>For example:</a:t>
-            </a:r>
-            <a:endParaRPr lang="en-US" sz="4000" dirty="0"/>
-          </a:p>
-        </p:txBody>
-      </p:sp>
-      <p:sp>
-        <p:nvSpPr>
-          <p:cNvPr id="8" name="TextBox 7">
+      </p:pic>
+      <p:sp>
+        <p:nvSpPr>
+          <p:cNvPr id="5" name="TextBox 4">
             <a:extLst>
               <a:ext uri="{FF2B5EF4-FFF2-40B4-BE49-F238E27FC236}">
-                <a16:creationId xmlns:a16="http://schemas.microsoft.com/office/drawing/2014/main" id="{6E2E4DEB-B1C9-DBBD-61BD-26C5370C5A45}"/>
+                <a16:creationId xmlns:a16="http://schemas.microsoft.com/office/drawing/2014/main" id="{4DE08A7A-AEDE-58D4-E03D-91FA7EE5DDF5}"/>
               </a:ext>
             </a:extLst>
           </p:cNvPr>
@@ -8483,8 +8569,8 @@
         </p:nvSpPr>
         <p:spPr>
           <a:xfrm>
-            <a:off x="2286000" y="2279974"/>
-            <a:ext cx="6248400" cy="1200329"/>
+            <a:off x="2476500" y="6093842"/>
+            <a:ext cx="4191000" cy="646331"/>
           </a:xfrm>
           <a:prstGeom prst="rect">
             <a:avLst/>
@@ -8497,158 +8583,49 @@
           </a:bodyPr>
           <a:lstStyle/>
           <a:p>
-            <a:pPr marL="285750" indent="-285750">
-              <a:buFont typeface="Arial" panose="020B0604020202020204" pitchFamily="34" charset="0"/>
-              <a:buChar char="•"/>
-            </a:pPr>
-            <a:r>
-              <a:rPr lang="en-US" dirty="0" err="1"/>
-              <a:t>node:util</a:t>
-            </a:r>
             <a:r>
               <a:rPr lang="en-US" dirty="0"/>
-              <a:t>/types</a:t>
-            </a:r>
-          </a:p>
-          <a:p>
-            <a:pPr marL="285750" indent="-285750">
-              <a:buFont typeface="Arial" panose="020B0604020202020204" pitchFamily="34" charset="0"/>
-              <a:buChar char="•"/>
-            </a:pPr>
-            <a:r>
-              <a:rPr lang="en-US" dirty="0" err="1"/>
-              <a:t>node:string_decoder</a:t>
-            </a:r>
-            <a:endParaRPr lang="en-US" dirty="0"/>
-          </a:p>
-          <a:p>
-            <a:pPr marL="285750" indent="-285750">
-              <a:buFont typeface="Arial" panose="020B0604020202020204" pitchFamily="34" charset="0"/>
-              <a:buChar char="•"/>
-            </a:pPr>
-            <a:r>
-              <a:rPr lang="en-US" dirty="0" err="1"/>
-              <a:t>node:assert</a:t>
-            </a:r>
-            <a:endParaRPr lang="en-US" dirty="0"/>
-          </a:p>
-          <a:p>
-            <a:pPr marL="285750" indent="-285750">
-              <a:buFont typeface="Arial" panose="020B0604020202020204" pitchFamily="34" charset="0"/>
-              <a:buChar char="•"/>
-            </a:pPr>
-            <a:r>
-              <a:rPr lang="en-US" dirty="0" err="1"/>
-              <a:t>node:test</a:t>
+              <a:t>f</a:t>
+            </a:r>
+            <a:r>
+              <a:rPr lang="en-IL" dirty="0"/>
+              <a:t>mt (eslint,prittier) , task (grunt)</a:t>
+            </a:r>
+            <a:br>
+              <a:rPr lang="en-IL" dirty="0"/>
+            </a:br>
+            <a:r>
+              <a:rPr lang="en-IL" dirty="0"/>
+              <a:t>test </a:t>
+            </a:r>
+            <a:r>
+              <a:rPr lang="he-IL" dirty="0"/>
+              <a:t>)</a:t>
+            </a:r>
+            <a:r>
+              <a:rPr lang="en-IL" dirty="0"/>
+              <a:t>mocha </a:t>
             </a:r>
             <a:r>
               <a:rPr lang="en-US" dirty="0"/>
-              <a:t> ! (will talk more about later)</a:t>
+              <a:t>,</a:t>
+            </a:r>
+            <a:r>
+              <a:rPr lang="en-IL" dirty="0"/>
+              <a:t>jest …</a:t>
+            </a:r>
+            <a:r>
+              <a:rPr lang="he-IL" dirty="0"/>
+              <a:t>(</a:t>
             </a:r>
             <a:endParaRPr lang="en-IL" dirty="0"/>
-          </a:p>
-        </p:txBody>
-      </p:sp>
-      <p:sp>
-        <p:nvSpPr>
-          <p:cNvPr id="10" name="Title 1">
-            <a:extLst>
-              <a:ext uri="{FF2B5EF4-FFF2-40B4-BE49-F238E27FC236}">
-                <a16:creationId xmlns:a16="http://schemas.microsoft.com/office/drawing/2014/main" id="{4ADC928A-D86E-42D6-61DE-57118FEA7509}"/>
-              </a:ext>
-            </a:extLst>
-          </p:cNvPr>
-          <p:cNvSpPr txBox="1">
-            <a:spLocks/>
-          </p:cNvSpPr>
-          <p:nvPr/>
-        </p:nvSpPr>
-        <p:spPr>
-          <a:xfrm>
-            <a:off x="1905000" y="1600200"/>
-            <a:ext cx="6705600" cy="2895600"/>
-          </a:xfrm>
-          <a:prstGeom prst="rect">
-            <a:avLst/>
-          </a:prstGeom>
-        </p:spPr>
-        <p:txBody>
-          <a:bodyPr vert="horz" anchor="b">
-            <a:noAutofit/>
-          </a:bodyPr>
-          <a:lstStyle>
-            <a:lvl1pPr algn="l" rtl="0" eaLnBrk="1" latinLnBrk="0" hangingPunct="1">
-              <a:spcBef>
-                <a:spcPct val="0"/>
-              </a:spcBef>
-              <a:buNone/>
-              <a:defRPr kumimoji="0" sz="3000" b="1" kern="1200" cap="small" baseline="0">
-                <a:solidFill>
-                  <a:schemeClr val="tx2"/>
-                </a:solidFill>
-                <a:latin typeface="+mj-lt"/>
-                <a:ea typeface="+mj-ea"/>
-                <a:cs typeface="+mj-cs"/>
-              </a:defRPr>
-            </a:lvl1pPr>
-          </a:lstStyle>
-          <a:p>
-            <a:endParaRPr lang="en-US" sz="4000" dirty="0"/>
-          </a:p>
-        </p:txBody>
-      </p:sp>
-      <p:sp>
-        <p:nvSpPr>
-          <p:cNvPr id="11" name="Title 1">
-            <a:extLst>
-              <a:ext uri="{FF2B5EF4-FFF2-40B4-BE49-F238E27FC236}">
-                <a16:creationId xmlns:a16="http://schemas.microsoft.com/office/drawing/2014/main" id="{3282A2DD-3CE3-2A87-5E0C-0A46F153DF07}"/>
-              </a:ext>
-            </a:extLst>
-          </p:cNvPr>
-          <p:cNvSpPr txBox="1">
-            <a:spLocks/>
-          </p:cNvSpPr>
-          <p:nvPr/>
-        </p:nvSpPr>
-        <p:spPr>
-          <a:xfrm>
-            <a:off x="2057400" y="1752600"/>
-            <a:ext cx="6705600" cy="2895600"/>
-          </a:xfrm>
-          <a:prstGeom prst="rect">
-            <a:avLst/>
-          </a:prstGeom>
-        </p:spPr>
-        <p:txBody>
-          <a:bodyPr vert="horz" anchor="b">
-            <a:noAutofit/>
-          </a:bodyPr>
-          <a:lstStyle>
-            <a:lvl1pPr algn="l" rtl="0" eaLnBrk="1" latinLnBrk="0" hangingPunct="1">
-              <a:spcBef>
-                <a:spcPct val="0"/>
-              </a:spcBef>
-              <a:buNone/>
-              <a:defRPr kumimoji="0" sz="3000" b="1" kern="1200" cap="small" baseline="0">
-                <a:solidFill>
-                  <a:schemeClr val="tx2"/>
-                </a:solidFill>
-                <a:latin typeface="+mj-lt"/>
-                <a:ea typeface="+mj-ea"/>
-                <a:cs typeface="+mj-cs"/>
-              </a:defRPr>
-            </a:lvl1pPr>
-          </a:lstStyle>
-          <a:p>
-            <a:endParaRPr lang="en-US" sz="4000" dirty="0"/>
           </a:p>
         </p:txBody>
       </p:sp>
     </p:spTree>
     <p:extLst>
       <p:ext uri="{BB962C8B-B14F-4D97-AF65-F5344CB8AC3E}">
-        <p14:creationId xmlns:p14="http://schemas.microsoft.com/office/powerpoint/2010/main" val="2572356672"/>
+        <p14:creationId xmlns:p14="http://schemas.microsoft.com/office/powerpoint/2010/main" val="3225896332"/>
       </p:ext>
     </p:extLst>
   </p:cSld>
@@ -8678,45 +8655,10 @@
       </p:grpSpPr>
       <p:sp>
         <p:nvSpPr>
-          <p:cNvPr id="7" name="Title 1">
+          <p:cNvPr id="12" name="Title 1">
             <a:extLst>
               <a:ext uri="{FF2B5EF4-FFF2-40B4-BE49-F238E27FC236}">
-                <a16:creationId xmlns:a16="http://schemas.microsoft.com/office/drawing/2014/main" id="{54C561DF-0CCA-BAA8-EEF9-9C112E85285D}"/>
-              </a:ext>
-            </a:extLst>
-          </p:cNvPr>
-          <p:cNvSpPr>
-            <a:spLocks noGrp="1"/>
-          </p:cNvSpPr>
-          <p:nvPr>
-            <p:ph type="ctrTitle"/>
-          </p:nvPr>
-        </p:nvSpPr>
-        <p:spPr>
-          <a:xfrm>
-            <a:off x="1752600" y="630838"/>
-            <a:ext cx="6705600" cy="598962"/>
-          </a:xfrm>
-        </p:spPr>
-        <p:txBody>
-          <a:bodyPr>
-            <a:noAutofit/>
-          </a:bodyPr>
-          <a:lstStyle/>
-          <a:p>
-            <a:r>
-              <a:rPr lang="en-US" sz="4000" dirty="0"/>
-              <a:t>New import protocol</a:t>
-            </a:r>
-          </a:p>
-        </p:txBody>
-      </p:sp>
-      <p:sp>
-        <p:nvSpPr>
-          <p:cNvPr id="10" name="Title 1">
-            <a:extLst>
-              <a:ext uri="{FF2B5EF4-FFF2-40B4-BE49-F238E27FC236}">
-                <a16:creationId xmlns:a16="http://schemas.microsoft.com/office/drawing/2014/main" id="{4ADC928A-D86E-42D6-61DE-57118FEA7509}"/>
+                <a16:creationId xmlns:a16="http://schemas.microsoft.com/office/drawing/2014/main" id="{10FA0667-D2F1-61CF-06C4-CF76375845F1}"/>
               </a:ext>
             </a:extLst>
           </p:cNvPr>
@@ -8727,7 +8669,7 @@
         </p:nvSpPr>
         <p:spPr>
           <a:xfrm>
-            <a:off x="1905000" y="1600200"/>
+            <a:off x="1752600" y="1447800"/>
             <a:ext cx="6705600" cy="2895600"/>
           </a:xfrm>
           <a:prstGeom prst="rect">
@@ -8761,10 +8703,45 @@
       </p:sp>
       <p:sp>
         <p:nvSpPr>
-          <p:cNvPr id="11" name="Title 1">
+          <p:cNvPr id="7" name="Title 1">
             <a:extLst>
               <a:ext uri="{FF2B5EF4-FFF2-40B4-BE49-F238E27FC236}">
-                <a16:creationId xmlns:a16="http://schemas.microsoft.com/office/drawing/2014/main" id="{3282A2DD-3CE3-2A87-5E0C-0A46F153DF07}"/>
+                <a16:creationId xmlns:a16="http://schemas.microsoft.com/office/drawing/2014/main" id="{54C561DF-0CCA-BAA8-EEF9-9C112E85285D}"/>
+              </a:ext>
+            </a:extLst>
+          </p:cNvPr>
+          <p:cNvSpPr>
+            <a:spLocks noGrp="1"/>
+          </p:cNvSpPr>
+          <p:nvPr>
+            <p:ph type="ctrTitle"/>
+          </p:nvPr>
+        </p:nvSpPr>
+        <p:spPr>
+          <a:xfrm>
+            <a:off x="1752600" y="630838"/>
+            <a:ext cx="6705600" cy="598962"/>
+          </a:xfrm>
+        </p:spPr>
+        <p:txBody>
+          <a:bodyPr>
+            <a:noAutofit/>
+          </a:bodyPr>
+          <a:lstStyle/>
+          <a:p>
+            <a:r>
+              <a:rPr lang="en-US" sz="4000" dirty="0"/>
+              <a:t>New import protocol</a:t>
+            </a:r>
+          </a:p>
+        </p:txBody>
+      </p:sp>
+      <p:sp>
+        <p:nvSpPr>
+          <p:cNvPr id="3" name="Title 1">
+            <a:extLst>
+              <a:ext uri="{FF2B5EF4-FFF2-40B4-BE49-F238E27FC236}">
+                <a16:creationId xmlns:a16="http://schemas.microsoft.com/office/drawing/2014/main" id="{40D82690-2AB7-2AEE-96F1-F94C3A150FDC}"/>
               </a:ext>
             </a:extLst>
           </p:cNvPr>
@@ -8775,8 +8752,8 @@
         </p:nvSpPr>
         <p:spPr>
           <a:xfrm>
-            <a:off x="2057400" y="1752600"/>
-            <a:ext cx="6705600" cy="2895600"/>
+            <a:off x="1790700" y="1600200"/>
+            <a:ext cx="6705600" cy="533400"/>
           </a:xfrm>
           <a:prstGeom prst="rect">
             <a:avLst/>
@@ -8803,16 +8780,20 @@
             </a:lvl1pPr>
           </a:lstStyle>
           <a:p>
+            <a:r>
+              <a:rPr lang="en-US" b="0" dirty="0"/>
+              <a:t>For example:</a:t>
+            </a:r>
             <a:endParaRPr lang="en-US" sz="4000" dirty="0"/>
           </a:p>
         </p:txBody>
       </p:sp>
       <p:sp>
         <p:nvSpPr>
-          <p:cNvPr id="2" name="TextBox 1">
+          <p:cNvPr id="8" name="TextBox 7">
             <a:extLst>
               <a:ext uri="{FF2B5EF4-FFF2-40B4-BE49-F238E27FC236}">
-                <a16:creationId xmlns:a16="http://schemas.microsoft.com/office/drawing/2014/main" id="{E846654D-3611-8E5A-7099-A466531689F5}"/>
+                <a16:creationId xmlns:a16="http://schemas.microsoft.com/office/drawing/2014/main" id="{6E2E4DEB-B1C9-DBBD-61BD-26C5370C5A45}"/>
               </a:ext>
             </a:extLst>
           </p:cNvPr>
@@ -8821,8 +8802,8 @@
         </p:nvSpPr>
         <p:spPr>
           <a:xfrm>
-            <a:off x="2775275" y="3753526"/>
-            <a:ext cx="4660250" cy="1200329"/>
+            <a:off x="2286000" y="2279974"/>
+            <a:ext cx="6248400" cy="1200329"/>
           </a:xfrm>
           <a:prstGeom prst="rect">
             <a:avLst/>
@@ -8830,101 +8811,163 @@
           <a:noFill/>
         </p:spPr>
         <p:txBody>
-          <a:bodyPr wrap="none" rtlCol="0">
+          <a:bodyPr wrap="square" rtlCol="0">
             <a:spAutoFit/>
           </a:bodyPr>
           <a:lstStyle/>
           <a:p>
+            <a:pPr marL="285750" indent="-285750">
+              <a:buFont typeface="Arial" panose="020B0604020202020204" pitchFamily="34" charset="0"/>
+              <a:buChar char="•"/>
+            </a:pPr>
+            <a:r>
+              <a:rPr lang="en-US" dirty="0" err="1"/>
+              <a:t>node:util</a:t>
+            </a:r>
             <a:r>
               <a:rPr lang="en-US" dirty="0"/>
-              <a:t>function </a:t>
-            </a:r>
+              <a:t>/types</a:t>
+            </a:r>
+          </a:p>
+          <a:p>
+            <a:pPr marL="285750" indent="-285750">
+              <a:buFont typeface="Arial" panose="020B0604020202020204" pitchFamily="34" charset="0"/>
+              <a:buChar char="•"/>
+            </a:pPr>
             <a:r>
               <a:rPr lang="en-US" dirty="0" err="1"/>
-              <a:t>isCorrectlyEncodedName</a:t>
+              <a:t>node:string_decoder</a:t>
+            </a:r>
+            <a:endParaRPr lang="en-US" dirty="0"/>
+          </a:p>
+          <a:p>
+            <a:pPr marL="285750" indent="-285750">
+              <a:buFont typeface="Arial" panose="020B0604020202020204" pitchFamily="34" charset="0"/>
+              <a:buChar char="•"/>
+            </a:pPr>
+            <a:r>
+              <a:rPr lang="en-US" dirty="0" err="1"/>
+              <a:t>node:assert</a:t>
+            </a:r>
+            <a:endParaRPr lang="en-US" dirty="0"/>
+          </a:p>
+          <a:p>
+            <a:pPr marL="285750" indent="-285750">
+              <a:buFont typeface="Arial" panose="020B0604020202020204" pitchFamily="34" charset="0"/>
+              <a:buChar char="•"/>
+            </a:pPr>
+            <a:r>
+              <a:rPr lang="en-US" dirty="0" err="1"/>
+              <a:t>node:test</a:t>
             </a:r>
             <a:r>
               <a:rPr lang="en-US" dirty="0"/>
-              <a:t> (spec) {</a:t>
-            </a:r>
-          </a:p>
-          <a:p>
-            <a:r>
-              <a:rPr lang="en-US" dirty="0"/>
-              <a:t>  return !</a:t>
-            </a:r>
-            <a:r>
-              <a:rPr lang="en-US" dirty="0" err="1"/>
-              <a:t>spec.match</a:t>
-            </a:r>
-            <a:r>
-              <a:rPr lang="en-US" dirty="0"/>
-              <a:t>(/[/@\s+%:]/) &amp;&amp;</a:t>
-            </a:r>
-          </a:p>
-          <a:p>
-            <a:r>
-              <a:rPr lang="en-US" dirty="0"/>
-              <a:t>    spec === </a:t>
-            </a:r>
-            <a:r>
-              <a:rPr lang="en-US" dirty="0" err="1"/>
-              <a:t>encodeURIComponent</a:t>
-            </a:r>
-            <a:r>
-              <a:rPr lang="en-US" dirty="0"/>
-              <a:t>(spec)</a:t>
-            </a:r>
-          </a:p>
-          <a:p>
-            <a:r>
-              <a:rPr lang="en-US" dirty="0"/>
-              <a:t>}</a:t>
+              <a:t> ! (will talk more about later)</a:t>
             </a:r>
             <a:endParaRPr lang="en-IL" dirty="0"/>
           </a:p>
         </p:txBody>
       </p:sp>
-      <p:pic>
-        <p:nvPicPr>
-          <p:cNvPr id="5" name="Picture 4">
+      <p:sp>
+        <p:nvSpPr>
+          <p:cNvPr id="10" name="Title 1">
             <a:extLst>
               <a:ext uri="{FF2B5EF4-FFF2-40B4-BE49-F238E27FC236}">
-                <a16:creationId xmlns:a16="http://schemas.microsoft.com/office/drawing/2014/main" id="{FBF61832-2FB2-1EF4-8184-A53DC93A06B9}"/>
+                <a16:creationId xmlns:a16="http://schemas.microsoft.com/office/drawing/2014/main" id="{4ADC928A-D86E-42D6-61DE-57118FEA7509}"/>
               </a:ext>
             </a:extLst>
           </p:cNvPr>
-          <p:cNvPicPr>
-            <a:picLocks noChangeAspect="1"/>
-          </p:cNvPicPr>
-          <p:nvPr/>
-        </p:nvPicPr>
-        <p:blipFill>
-          <a:blip r:embed="rId3">
-            <a:extLst>
-              <a:ext uri="{28A0092B-C50C-407E-A947-70E740481C1C}">
-                <a14:useLocalDpi xmlns:a14="http://schemas.microsoft.com/office/drawing/2010/main" val="0"/>
-              </a:ext>
-            </a:extLst>
-          </a:blip>
-          <a:stretch>
-            <a:fillRect/>
-          </a:stretch>
-        </p:blipFill>
-        <p:spPr>
-          <a:xfrm>
-            <a:off x="513030" y="1687855"/>
-            <a:ext cx="8458200" cy="1416527"/>
+          <p:cNvSpPr txBox="1">
+            <a:spLocks/>
+          </p:cNvSpPr>
+          <p:nvPr/>
+        </p:nvSpPr>
+        <p:spPr>
+          <a:xfrm>
+            <a:off x="1905000" y="1600200"/>
+            <a:ext cx="6705600" cy="2895600"/>
           </a:xfrm>
           <a:prstGeom prst="rect">
             <a:avLst/>
           </a:prstGeom>
         </p:spPr>
-      </p:pic>
+        <p:txBody>
+          <a:bodyPr vert="horz" anchor="b">
+            <a:noAutofit/>
+          </a:bodyPr>
+          <a:lstStyle>
+            <a:lvl1pPr algn="l" rtl="0" eaLnBrk="1" latinLnBrk="0" hangingPunct="1">
+              <a:spcBef>
+                <a:spcPct val="0"/>
+              </a:spcBef>
+              <a:buNone/>
+              <a:defRPr kumimoji="0" sz="3000" b="1" kern="1200" cap="small" baseline="0">
+                <a:solidFill>
+                  <a:schemeClr val="tx2"/>
+                </a:solidFill>
+                <a:latin typeface="+mj-lt"/>
+                <a:ea typeface="+mj-ea"/>
+                <a:cs typeface="+mj-cs"/>
+              </a:defRPr>
+            </a:lvl1pPr>
+          </a:lstStyle>
+          <a:p>
+            <a:endParaRPr lang="en-US" sz="4000" dirty="0"/>
+          </a:p>
+        </p:txBody>
+      </p:sp>
+      <p:sp>
+        <p:nvSpPr>
+          <p:cNvPr id="11" name="Title 1">
+            <a:extLst>
+              <a:ext uri="{FF2B5EF4-FFF2-40B4-BE49-F238E27FC236}">
+                <a16:creationId xmlns:a16="http://schemas.microsoft.com/office/drawing/2014/main" id="{3282A2DD-3CE3-2A87-5E0C-0A46F153DF07}"/>
+              </a:ext>
+            </a:extLst>
+          </p:cNvPr>
+          <p:cNvSpPr txBox="1">
+            <a:spLocks/>
+          </p:cNvSpPr>
+          <p:nvPr/>
+        </p:nvSpPr>
+        <p:spPr>
+          <a:xfrm>
+            <a:off x="2057400" y="1752600"/>
+            <a:ext cx="6705600" cy="2895600"/>
+          </a:xfrm>
+          <a:prstGeom prst="rect">
+            <a:avLst/>
+          </a:prstGeom>
+        </p:spPr>
+        <p:txBody>
+          <a:bodyPr vert="horz" anchor="b">
+            <a:noAutofit/>
+          </a:bodyPr>
+          <a:lstStyle>
+            <a:lvl1pPr algn="l" rtl="0" eaLnBrk="1" latinLnBrk="0" hangingPunct="1">
+              <a:spcBef>
+                <a:spcPct val="0"/>
+              </a:spcBef>
+              <a:buNone/>
+              <a:defRPr kumimoji="0" sz="3000" b="1" kern="1200" cap="small" baseline="0">
+                <a:solidFill>
+                  <a:schemeClr val="tx2"/>
+                </a:solidFill>
+                <a:latin typeface="+mj-lt"/>
+                <a:ea typeface="+mj-ea"/>
+                <a:cs typeface="+mj-cs"/>
+              </a:defRPr>
+            </a:lvl1pPr>
+          </a:lstStyle>
+          <a:p>
+            <a:endParaRPr lang="en-US" sz="4000" dirty="0"/>
+          </a:p>
+        </p:txBody>
+      </p:sp>
     </p:spTree>
     <p:extLst>
       <p:ext uri="{BB962C8B-B14F-4D97-AF65-F5344CB8AC3E}">
-        <p14:creationId xmlns:p14="http://schemas.microsoft.com/office/powerpoint/2010/main" val="3923391301"/>
+        <p14:creationId xmlns:p14="http://schemas.microsoft.com/office/powerpoint/2010/main" val="2572356672"/>
       </p:ext>
     </p:extLst>
   </p:cSld>
@@ -9083,12 +9126,90 @@
           </a:p>
         </p:txBody>
       </p:sp>
+      <p:sp>
+        <p:nvSpPr>
+          <p:cNvPr id="2" name="TextBox 1">
+            <a:extLst>
+              <a:ext uri="{FF2B5EF4-FFF2-40B4-BE49-F238E27FC236}">
+                <a16:creationId xmlns:a16="http://schemas.microsoft.com/office/drawing/2014/main" id="{E846654D-3611-8E5A-7099-A466531689F5}"/>
+              </a:ext>
+            </a:extLst>
+          </p:cNvPr>
+          <p:cNvSpPr txBox="1"/>
+          <p:nvPr/>
+        </p:nvSpPr>
+        <p:spPr>
+          <a:xfrm>
+            <a:off x="2775275" y="3753526"/>
+            <a:ext cx="4660250" cy="1200329"/>
+          </a:xfrm>
+          <a:prstGeom prst="rect">
+            <a:avLst/>
+          </a:prstGeom>
+          <a:noFill/>
+        </p:spPr>
+        <p:txBody>
+          <a:bodyPr wrap="none" rtlCol="0">
+            <a:spAutoFit/>
+          </a:bodyPr>
+          <a:lstStyle/>
+          <a:p>
+            <a:r>
+              <a:rPr lang="en-US" dirty="0"/>
+              <a:t>function </a:t>
+            </a:r>
+            <a:r>
+              <a:rPr lang="en-US" dirty="0" err="1"/>
+              <a:t>isCorrectlyEncodedName</a:t>
+            </a:r>
+            <a:r>
+              <a:rPr lang="en-US" dirty="0"/>
+              <a:t> (spec) {</a:t>
+            </a:r>
+          </a:p>
+          <a:p>
+            <a:r>
+              <a:rPr lang="en-US" dirty="0"/>
+              <a:t>  return !</a:t>
+            </a:r>
+            <a:r>
+              <a:rPr lang="en-US" dirty="0" err="1"/>
+              <a:t>spec.match</a:t>
+            </a:r>
+            <a:r>
+              <a:rPr lang="en-US" dirty="0"/>
+              <a:t>(/[/@\s+%:]/) &amp;&amp;</a:t>
+            </a:r>
+          </a:p>
+          <a:p>
+            <a:r>
+              <a:rPr lang="en-US" dirty="0"/>
+              <a:t>    spec === </a:t>
+            </a:r>
+            <a:r>
+              <a:rPr lang="en-US" dirty="0" err="1"/>
+              <a:t>encodeURIComponent</a:t>
+            </a:r>
+            <a:r>
+              <a:rPr lang="en-US" dirty="0"/>
+              <a:t>(spec)</a:t>
+            </a:r>
+          </a:p>
+          <a:p>
+            <a:r>
+              <a:rPr lang="en-US" dirty="0"/>
+              <a:t>}</a:t>
+            </a:r>
+            <a:endParaRPr lang="en-IL" dirty="0"/>
+          </a:p>
+        </p:txBody>
+      </p:sp>
       <p:pic>
         <p:nvPicPr>
-          <p:cNvPr id="4" name="Picture 3" descr="Graphical user interface, application, Teams&#10;&#10;Description automatically generated">
+          <p:cNvPr id="5" name="Picture 4">
             <a:extLst>
               <a:ext uri="{FF2B5EF4-FFF2-40B4-BE49-F238E27FC236}">
-                <a16:creationId xmlns:a16="http://schemas.microsoft.com/office/drawing/2014/main" id="{543AA30A-482E-81B4-CE56-6BB6A9D72CAD}"/>
+                <a16:creationId xmlns:a16="http://schemas.microsoft.com/office/drawing/2014/main" id="{FBF61832-2FB2-1EF4-8184-A53DC93A06B9}"/>
               </a:ext>
             </a:extLst>
           </p:cNvPr>
@@ -9111,8 +9232,8 @@
         </p:blipFill>
         <p:spPr>
           <a:xfrm>
-            <a:off x="0" y="1263877"/>
-            <a:ext cx="9144000" cy="4330246"/>
+            <a:off x="513030" y="1687855"/>
+            <a:ext cx="8458200" cy="1416527"/>
           </a:xfrm>
           <a:prstGeom prst="rect">
             <a:avLst/>
@@ -9122,7 +9243,7 @@
     </p:spTree>
     <p:extLst>
       <p:ext uri="{BB962C8B-B14F-4D97-AF65-F5344CB8AC3E}">
-        <p14:creationId xmlns:p14="http://schemas.microsoft.com/office/powerpoint/2010/main" val="2344868291"/>
+        <p14:creationId xmlns:p14="http://schemas.microsoft.com/office/powerpoint/2010/main" val="3923391301"/>
       </p:ext>
     </p:extLst>
   </p:cSld>
@@ -9152,10 +9273,45 @@
       </p:grpSpPr>
       <p:sp>
         <p:nvSpPr>
-          <p:cNvPr id="12" name="Title 1">
+          <p:cNvPr id="7" name="Title 1">
             <a:extLst>
               <a:ext uri="{FF2B5EF4-FFF2-40B4-BE49-F238E27FC236}">
-                <a16:creationId xmlns:a16="http://schemas.microsoft.com/office/drawing/2014/main" id="{10FA0667-D2F1-61CF-06C4-CF76375845F1}"/>
+                <a16:creationId xmlns:a16="http://schemas.microsoft.com/office/drawing/2014/main" id="{54C561DF-0CCA-BAA8-EEF9-9C112E85285D}"/>
+              </a:ext>
+            </a:extLst>
+          </p:cNvPr>
+          <p:cNvSpPr>
+            <a:spLocks noGrp="1"/>
+          </p:cNvSpPr>
+          <p:nvPr>
+            <p:ph type="ctrTitle"/>
+          </p:nvPr>
+        </p:nvSpPr>
+        <p:spPr>
+          <a:xfrm>
+            <a:off x="1752600" y="630838"/>
+            <a:ext cx="6705600" cy="598962"/>
+          </a:xfrm>
+        </p:spPr>
+        <p:txBody>
+          <a:bodyPr>
+            <a:noAutofit/>
+          </a:bodyPr>
+          <a:lstStyle/>
+          <a:p>
+            <a:r>
+              <a:rPr lang="en-US" sz="4000" dirty="0"/>
+              <a:t>New import protocol</a:t>
+            </a:r>
+          </a:p>
+        </p:txBody>
+      </p:sp>
+      <p:sp>
+        <p:nvSpPr>
+          <p:cNvPr id="10" name="Title 1">
+            <a:extLst>
+              <a:ext uri="{FF2B5EF4-FFF2-40B4-BE49-F238E27FC236}">
+                <a16:creationId xmlns:a16="http://schemas.microsoft.com/office/drawing/2014/main" id="{4ADC928A-D86E-42D6-61DE-57118FEA7509}"/>
               </a:ext>
             </a:extLst>
           </p:cNvPr>
@@ -9166,7 +9322,7 @@
         </p:nvSpPr>
         <p:spPr>
           <a:xfrm>
-            <a:off x="1752600" y="1447800"/>
+            <a:off x="1905000" y="1600200"/>
             <a:ext cx="6705600" cy="2895600"/>
           </a:xfrm>
           <a:prstGeom prst="rect">
@@ -9200,45 +9356,10 @@
       </p:sp>
       <p:sp>
         <p:nvSpPr>
-          <p:cNvPr id="7" name="Title 1">
+          <p:cNvPr id="11" name="Title 1">
             <a:extLst>
               <a:ext uri="{FF2B5EF4-FFF2-40B4-BE49-F238E27FC236}">
-                <a16:creationId xmlns:a16="http://schemas.microsoft.com/office/drawing/2014/main" id="{54C561DF-0CCA-BAA8-EEF9-9C112E85285D}"/>
-              </a:ext>
-            </a:extLst>
-          </p:cNvPr>
-          <p:cNvSpPr>
-            <a:spLocks noGrp="1"/>
-          </p:cNvSpPr>
-          <p:nvPr>
-            <p:ph type="ctrTitle"/>
-          </p:nvPr>
-        </p:nvSpPr>
-        <p:spPr>
-          <a:xfrm>
-            <a:off x="1752600" y="630838"/>
-            <a:ext cx="6705600" cy="598962"/>
-          </a:xfrm>
-        </p:spPr>
-        <p:txBody>
-          <a:bodyPr>
-            <a:noAutofit/>
-          </a:bodyPr>
-          <a:lstStyle/>
-          <a:p>
-            <a:r>
-              <a:rPr lang="en-US" sz="4000" dirty="0"/>
-              <a:t>Features: fetch</a:t>
-            </a:r>
-          </a:p>
-        </p:txBody>
-      </p:sp>
-      <p:sp>
-        <p:nvSpPr>
-          <p:cNvPr id="10" name="Title 1">
-            <a:extLst>
-              <a:ext uri="{FF2B5EF4-FFF2-40B4-BE49-F238E27FC236}">
-                <a16:creationId xmlns:a16="http://schemas.microsoft.com/office/drawing/2014/main" id="{4ADC928A-D86E-42D6-61DE-57118FEA7509}"/>
+                <a16:creationId xmlns:a16="http://schemas.microsoft.com/office/drawing/2014/main" id="{3282A2DD-3CE3-2A87-5E0C-0A46F153DF07}"/>
               </a:ext>
             </a:extLst>
           </p:cNvPr>
@@ -9249,7 +9370,7 @@
         </p:nvSpPr>
         <p:spPr>
           <a:xfrm>
-            <a:off x="1447800" y="3676491"/>
+            <a:off x="2057400" y="1752600"/>
             <a:ext cx="6705600" cy="2895600"/>
           </a:xfrm>
           <a:prstGeom prst="rect">
@@ -9281,60 +9402,12 @@
           </a:p>
         </p:txBody>
       </p:sp>
-      <p:sp>
-        <p:nvSpPr>
-          <p:cNvPr id="11" name="Title 1">
-            <a:extLst>
-              <a:ext uri="{FF2B5EF4-FFF2-40B4-BE49-F238E27FC236}">
-                <a16:creationId xmlns:a16="http://schemas.microsoft.com/office/drawing/2014/main" id="{3282A2DD-3CE3-2A87-5E0C-0A46F153DF07}"/>
-              </a:ext>
-            </a:extLst>
-          </p:cNvPr>
-          <p:cNvSpPr txBox="1">
-            <a:spLocks/>
-          </p:cNvSpPr>
-          <p:nvPr/>
-        </p:nvSpPr>
-        <p:spPr>
-          <a:xfrm>
-            <a:off x="2057400" y="1752600"/>
-            <a:ext cx="6705600" cy="2895600"/>
-          </a:xfrm>
-          <a:prstGeom prst="rect">
-            <a:avLst/>
-          </a:prstGeom>
-        </p:spPr>
-        <p:txBody>
-          <a:bodyPr vert="horz" anchor="b">
-            <a:noAutofit/>
-          </a:bodyPr>
-          <a:lstStyle>
-            <a:lvl1pPr algn="l" rtl="0" eaLnBrk="1" latinLnBrk="0" hangingPunct="1">
-              <a:spcBef>
-                <a:spcPct val="0"/>
-              </a:spcBef>
-              <a:buNone/>
-              <a:defRPr kumimoji="0" sz="3000" b="1" kern="1200" cap="small" baseline="0">
-                <a:solidFill>
-                  <a:schemeClr val="tx2"/>
-                </a:solidFill>
-                <a:latin typeface="+mj-lt"/>
-                <a:ea typeface="+mj-ea"/>
-                <a:cs typeface="+mj-cs"/>
-              </a:defRPr>
-            </a:lvl1pPr>
-          </a:lstStyle>
-          <a:p>
-            <a:endParaRPr lang="en-US" sz="4000" dirty="0"/>
-          </a:p>
-        </p:txBody>
-      </p:sp>
       <p:pic>
         <p:nvPicPr>
-          <p:cNvPr id="4" name="Picture 3" descr="Text&#10;&#10;Description automatically generated">
+          <p:cNvPr id="4" name="Picture 3" descr="Graphical user interface, application, Teams&#10;&#10;Description automatically generated">
             <a:extLst>
               <a:ext uri="{FF2B5EF4-FFF2-40B4-BE49-F238E27FC236}">
-                <a16:creationId xmlns:a16="http://schemas.microsoft.com/office/drawing/2014/main" id="{49ABA119-84B4-8E1F-C332-D874AD43FE58}"/>
+                <a16:creationId xmlns:a16="http://schemas.microsoft.com/office/drawing/2014/main" id="{543AA30A-482E-81B4-CE56-6BB6A9D72CAD}"/>
               </a:ext>
             </a:extLst>
           </p:cNvPr>
@@ -9357,110 +9430,18 @@
         </p:blipFill>
         <p:spPr>
           <a:xfrm>
-            <a:off x="228600" y="1514163"/>
-            <a:ext cx="8915400" cy="1912574"/>
+            <a:off x="0" y="1263877"/>
+            <a:ext cx="9144000" cy="4330246"/>
           </a:xfrm>
           <a:prstGeom prst="rect">
             <a:avLst/>
           </a:prstGeom>
         </p:spPr>
       </p:pic>
-      <p:sp>
-        <p:nvSpPr>
-          <p:cNvPr id="6" name="TextBox 5">
-            <a:extLst>
-              <a:ext uri="{FF2B5EF4-FFF2-40B4-BE49-F238E27FC236}">
-                <a16:creationId xmlns:a16="http://schemas.microsoft.com/office/drawing/2014/main" id="{C7116FB3-68FB-BB60-A1DC-7C147F7DB5DE}"/>
-              </a:ext>
-            </a:extLst>
-          </p:cNvPr>
-          <p:cNvSpPr txBox="1"/>
-          <p:nvPr/>
-        </p:nvSpPr>
-        <p:spPr>
-          <a:xfrm>
-            <a:off x="2209800" y="4040430"/>
-            <a:ext cx="5110881" cy="2585323"/>
-          </a:xfrm>
-          <a:prstGeom prst="rect">
-            <a:avLst/>
-          </a:prstGeom>
-          <a:noFill/>
-        </p:spPr>
-        <p:txBody>
-          <a:bodyPr wrap="square" rtlCol="0">
-            <a:spAutoFit/>
-          </a:bodyPr>
-          <a:lstStyle/>
-          <a:p>
-            <a:pPr marL="285750" indent="-285750">
-              <a:buFont typeface="Arial" panose="020B0604020202020204" pitchFamily="34" charset="0"/>
-              <a:buChar char="•"/>
-            </a:pPr>
-            <a:r>
-              <a:rPr lang="en-US" dirty="0"/>
-              <a:t>Global</a:t>
-            </a:r>
-            <a:r>
-              <a:rPr lang="en-IL" dirty="0"/>
-              <a:t>ley avaliavle no need to import nothing .</a:t>
-            </a:r>
-          </a:p>
-          <a:p>
-            <a:pPr marL="285750" indent="-285750">
-              <a:buFont typeface="Arial" panose="020B0604020202020204" pitchFamily="34" charset="0"/>
-              <a:buChar char="•"/>
-            </a:pPr>
-            <a:r>
-              <a:rPr lang="en-US" dirty="0"/>
-              <a:t>based upon </a:t>
-            </a:r>
-            <a:r>
-              <a:rPr lang="en-US" dirty="0">
-                <a:hlinkClick r:id="rId4"/>
-              </a:rPr>
-              <a:t>undici-fetch</a:t>
-            </a:r>
-            <a:endParaRPr lang="en-US" dirty="0"/>
-          </a:p>
-          <a:p>
-            <a:pPr marL="285750" indent="-285750">
-              <a:buFont typeface="Arial" panose="020B0604020202020204" pitchFamily="34" charset="0"/>
-              <a:buChar char="•"/>
-            </a:pPr>
-            <a:r>
-              <a:rPr lang="en-US" dirty="0"/>
-              <a:t>Through this addition, the following </a:t>
-            </a:r>
-            <a:r>
-              <a:rPr lang="en-US" dirty="0" err="1"/>
-              <a:t>globals</a:t>
-            </a:r>
-            <a:r>
-              <a:rPr lang="en-US" dirty="0"/>
-              <a:t> are made available: fetch, </a:t>
-            </a:r>
-            <a:r>
-              <a:rPr lang="en-US" dirty="0" err="1"/>
-              <a:t>FormData</a:t>
-            </a:r>
-            <a:r>
-              <a:rPr lang="en-US" dirty="0"/>
-              <a:t>, Headers, Request, Response.</a:t>
-            </a:r>
-          </a:p>
-          <a:p>
-            <a:br>
-              <a:rPr lang="en-US" dirty="0"/>
-            </a:br>
-            <a:endParaRPr lang="en-IL" dirty="0"/>
-          </a:p>
-        </p:txBody>
-      </p:sp>
     </p:spTree>
     <p:extLst>
       <p:ext uri="{BB962C8B-B14F-4D97-AF65-F5344CB8AC3E}">
-        <p14:creationId xmlns:p14="http://schemas.microsoft.com/office/powerpoint/2010/main" val="2389944432"/>
+        <p14:creationId xmlns:p14="http://schemas.microsoft.com/office/powerpoint/2010/main" val="2344868291"/>
       </p:ext>
     </p:extLst>
   </p:cSld>
@@ -9667,12 +9648,48 @@
           </a:p>
         </p:txBody>
       </p:sp>
-      <p:sp>
-        <p:nvSpPr>
-          <p:cNvPr id="2" name="TextBox 1">
+      <p:pic>
+        <p:nvPicPr>
+          <p:cNvPr id="4" name="Picture 3" descr="Text&#10;&#10;Description automatically generated">
             <a:extLst>
               <a:ext uri="{FF2B5EF4-FFF2-40B4-BE49-F238E27FC236}">
-                <a16:creationId xmlns:a16="http://schemas.microsoft.com/office/drawing/2014/main" id="{63AE417A-588F-7EE0-D251-BAEB656FF18B}"/>
+                <a16:creationId xmlns:a16="http://schemas.microsoft.com/office/drawing/2014/main" id="{49ABA119-84B4-8E1F-C332-D874AD43FE58}"/>
+              </a:ext>
+            </a:extLst>
+          </p:cNvPr>
+          <p:cNvPicPr>
+            <a:picLocks noChangeAspect="1"/>
+          </p:cNvPicPr>
+          <p:nvPr/>
+        </p:nvPicPr>
+        <p:blipFill>
+          <a:blip r:embed="rId3">
+            <a:extLst>
+              <a:ext uri="{28A0092B-C50C-407E-A947-70E740481C1C}">
+                <a14:useLocalDpi xmlns:a14="http://schemas.microsoft.com/office/drawing/2010/main" val="0"/>
+              </a:ext>
+            </a:extLst>
+          </a:blip>
+          <a:stretch>
+            <a:fillRect/>
+          </a:stretch>
+        </p:blipFill>
+        <p:spPr>
+          <a:xfrm>
+            <a:off x="228600" y="1514163"/>
+            <a:ext cx="8915400" cy="1912574"/>
+          </a:xfrm>
+          <a:prstGeom prst="rect">
+            <a:avLst/>
+          </a:prstGeom>
+        </p:spPr>
+      </p:pic>
+      <p:sp>
+        <p:nvSpPr>
+          <p:cNvPr id="6" name="TextBox 5">
+            <a:extLst>
+              <a:ext uri="{FF2B5EF4-FFF2-40B4-BE49-F238E27FC236}">
+                <a16:creationId xmlns:a16="http://schemas.microsoft.com/office/drawing/2014/main" id="{C7116FB3-68FB-BB60-A1DC-7C147F7DB5DE}"/>
               </a:ext>
             </a:extLst>
           </p:cNvPr>
@@ -9681,8 +9698,8 @@
         </p:nvSpPr>
         <p:spPr>
           <a:xfrm>
-            <a:off x="1943100" y="2114381"/>
-            <a:ext cx="6934200" cy="1754326"/>
+            <a:off x="2209800" y="4040430"/>
+            <a:ext cx="5110881" cy="2585323"/>
           </a:xfrm>
           <a:prstGeom prst="rect">
             <a:avLst/>
@@ -9695,38 +9712,63 @@
           </a:bodyPr>
           <a:lstStyle/>
           <a:p>
+            <a:pPr marL="285750" indent="-285750">
+              <a:buFont typeface="Arial" panose="020B0604020202020204" pitchFamily="34" charset="0"/>
+              <a:buChar char="•"/>
+            </a:pPr>
             <a:r>
               <a:rPr lang="en-US" dirty="0"/>
-              <a:t>T</a:t>
+              <a:t>Global</a:t>
             </a:r>
             <a:r>
               <a:rPr lang="en-IL" dirty="0"/>
-              <a:t>oday at platform js were using 2 diff</a:t>
-            </a:r>
+              <a:t>ley avaliavle no need to import nothing .</a:t>
+            </a:r>
+          </a:p>
+          <a:p>
+            <a:pPr marL="285750" indent="-285750">
+              <a:buFont typeface="Arial" panose="020B0604020202020204" pitchFamily="34" charset="0"/>
+              <a:buChar char="•"/>
+            </a:pPr>
             <a:r>
               <a:rPr lang="en-US" dirty="0"/>
-              <a:t>e</a:t>
-            </a:r>
-            <a:r>
-              <a:rPr lang="en-IL" dirty="0"/>
-              <a:t>rent liberies for http-clients.</a:t>
-            </a:r>
-          </a:p>
-          <a:p>
-            <a:endParaRPr lang="en-IL" dirty="0"/>
-          </a:p>
-          <a:p>
+              <a:t>based upon </a:t>
+            </a:r>
+            <a:r>
+              <a:rPr lang="en-US" dirty="0">
+                <a:hlinkClick r:id="rId4"/>
+              </a:rPr>
+              <a:t>undici-fetch</a:t>
+            </a:r>
+            <a:endParaRPr lang="en-US" dirty="0"/>
+          </a:p>
+          <a:p>
+            <a:pPr marL="285750" indent="-285750">
+              <a:buFont typeface="Arial" panose="020B0604020202020204" pitchFamily="34" charset="0"/>
+              <a:buChar char="•"/>
+            </a:pPr>
             <a:r>
               <a:rPr lang="en-US" dirty="0"/>
-              <a:t>"got": "^11.8.3",</a:t>
-            </a:r>
-            <a:br>
+              <a:t>Through this addition, the following </a:t>
+            </a:r>
+            <a:r>
+              <a:rPr lang="en-US" dirty="0" err="1"/>
+              <a:t>globals</a:t>
+            </a:r>
+            <a:r>
               <a:rPr lang="en-US" dirty="0"/>
-            </a:br>
+              <a:t> are made available: fetch, </a:t>
+            </a:r>
+            <a:r>
+              <a:rPr lang="en-US" dirty="0" err="1"/>
+              <a:t>FormData</a:t>
+            </a:r>
             <a:r>
               <a:rPr lang="en-US" dirty="0"/>
-              <a:t>"request": "^2.78.0", (inside demand-client!)</a:t>
-            </a:r>
+              <a:t>, Headers, Request, Response.</a:t>
+            </a:r>
+          </a:p>
+          <a:p>
             <a:br>
               <a:rPr lang="en-US" dirty="0"/>
             </a:br>
@@ -9737,7 +9779,7 @@
     </p:spTree>
     <p:extLst>
       <p:ext uri="{BB962C8B-B14F-4D97-AF65-F5344CB8AC3E}">
-        <p14:creationId xmlns:p14="http://schemas.microsoft.com/office/powerpoint/2010/main" val="2200368742"/>
+        <p14:creationId xmlns:p14="http://schemas.microsoft.com/office/powerpoint/2010/main" val="2389944432"/>
       </p:ext>
     </p:extLst>
   </p:cSld>
@@ -9944,46 +9986,77 @@
           </a:p>
         </p:txBody>
       </p:sp>
-      <p:pic>
-        <p:nvPicPr>
-          <p:cNvPr id="4" name="Picture 3" descr="Graphical user interface, text, application, email&#10;&#10;Description automatically generated">
+      <p:sp>
+        <p:nvSpPr>
+          <p:cNvPr id="2" name="TextBox 1">
             <a:extLst>
               <a:ext uri="{FF2B5EF4-FFF2-40B4-BE49-F238E27FC236}">
-                <a16:creationId xmlns:a16="http://schemas.microsoft.com/office/drawing/2014/main" id="{9C9126F6-BE93-6C4B-BE78-339E5655764E}"/>
+                <a16:creationId xmlns:a16="http://schemas.microsoft.com/office/drawing/2014/main" id="{63AE417A-588F-7EE0-D251-BAEB656FF18B}"/>
               </a:ext>
             </a:extLst>
           </p:cNvPr>
-          <p:cNvPicPr>
-            <a:picLocks noChangeAspect="1"/>
-          </p:cNvPicPr>
-          <p:nvPr/>
-        </p:nvPicPr>
-        <p:blipFill>
-          <a:blip r:embed="rId3">
-            <a:extLst>
-              <a:ext uri="{28A0092B-C50C-407E-A947-70E740481C1C}">
-                <a14:useLocalDpi xmlns:a14="http://schemas.microsoft.com/office/drawing/2010/main" val="0"/>
-              </a:ext>
-            </a:extLst>
-          </a:blip>
-          <a:stretch>
-            <a:fillRect/>
-          </a:stretch>
-        </p:blipFill>
-        <p:spPr>
-          <a:xfrm>
-            <a:off x="7545" y="1447800"/>
-            <a:ext cx="9144000" cy="3763130"/>
+          <p:cNvSpPr txBox="1"/>
+          <p:nvPr/>
+        </p:nvSpPr>
+        <p:spPr>
+          <a:xfrm>
+            <a:off x="1943100" y="2114381"/>
+            <a:ext cx="6934200" cy="1754326"/>
           </a:xfrm>
           <a:prstGeom prst="rect">
             <a:avLst/>
           </a:prstGeom>
-        </p:spPr>
-      </p:pic>
+          <a:noFill/>
+        </p:spPr>
+        <p:txBody>
+          <a:bodyPr wrap="square" rtlCol="0">
+            <a:spAutoFit/>
+          </a:bodyPr>
+          <a:lstStyle/>
+          <a:p>
+            <a:r>
+              <a:rPr lang="en-US" dirty="0"/>
+              <a:t>T</a:t>
+            </a:r>
+            <a:r>
+              <a:rPr lang="en-IL" dirty="0"/>
+              <a:t>oday at platform js were using 2 diff</a:t>
+            </a:r>
+            <a:r>
+              <a:rPr lang="en-US" dirty="0"/>
+              <a:t>e</a:t>
+            </a:r>
+            <a:r>
+              <a:rPr lang="en-IL" dirty="0"/>
+              <a:t>rent liberies for http-clients.</a:t>
+            </a:r>
+          </a:p>
+          <a:p>
+            <a:endParaRPr lang="en-IL" dirty="0"/>
+          </a:p>
+          <a:p>
+            <a:r>
+              <a:rPr lang="en-US" dirty="0"/>
+              <a:t>"got": "^11.8.3",</a:t>
+            </a:r>
+            <a:br>
+              <a:rPr lang="en-US" dirty="0"/>
+            </a:br>
+            <a:r>
+              <a:rPr lang="en-US" dirty="0"/>
+              <a:t>"request": "^2.78.0", (inside demand-client!)</a:t>
+            </a:r>
+            <a:br>
+              <a:rPr lang="en-US" dirty="0"/>
+            </a:br>
+            <a:endParaRPr lang="en-IL" dirty="0"/>
+          </a:p>
+        </p:txBody>
+      </p:sp>
     </p:spTree>
     <p:extLst>
       <p:ext uri="{BB962C8B-B14F-4D97-AF65-F5344CB8AC3E}">
-        <p14:creationId xmlns:p14="http://schemas.microsoft.com/office/powerpoint/2010/main" val="3033686739"/>
+        <p14:creationId xmlns:p14="http://schemas.microsoft.com/office/powerpoint/2010/main" val="2200368742"/>
       </p:ext>
     </p:extLst>
   </p:cSld>
@@ -10089,15 +10162,7 @@
           <a:p>
             <a:r>
               <a:rPr lang="en-US" sz="4000" dirty="0"/>
-              <a:t>Features: ’</a:t>
-            </a:r>
-            <a:r>
-              <a:rPr lang="en-US" sz="4000" dirty="0" err="1"/>
-              <a:t>node:test</a:t>
-            </a:r>
-            <a:r>
-              <a:rPr lang="en-US" sz="4000" dirty="0"/>
-              <a:t>’</a:t>
+              <a:t>Features: fetch</a:t>
             </a:r>
           </a:p>
         </p:txBody>
@@ -10200,10 +10265,10 @@
       </p:sp>
       <p:pic>
         <p:nvPicPr>
-          <p:cNvPr id="3" name="Picture 2" descr="Graphical user interface, text, application&#10;&#10;Description automatically generated">
+          <p:cNvPr id="4" name="Picture 3" descr="Graphical user interface, text, application, email&#10;&#10;Description automatically generated">
             <a:extLst>
               <a:ext uri="{FF2B5EF4-FFF2-40B4-BE49-F238E27FC236}">
-                <a16:creationId xmlns:a16="http://schemas.microsoft.com/office/drawing/2014/main" id="{E0D664AC-8BAB-D300-797B-51AFD798058D}"/>
+                <a16:creationId xmlns:a16="http://schemas.microsoft.com/office/drawing/2014/main" id="{9C9126F6-BE93-6C4B-BE78-339E5655764E}"/>
               </a:ext>
             </a:extLst>
           </p:cNvPr>
@@ -10226,86 +10291,18 @@
         </p:blipFill>
         <p:spPr>
           <a:xfrm>
-            <a:off x="0" y="1201433"/>
-            <a:ext cx="9144000" cy="4208767"/>
+            <a:off x="7545" y="1447800"/>
+            <a:ext cx="9144000" cy="3763130"/>
           </a:xfrm>
           <a:prstGeom prst="rect">
             <a:avLst/>
           </a:prstGeom>
         </p:spPr>
       </p:pic>
-      <p:sp>
-        <p:nvSpPr>
-          <p:cNvPr id="5" name="TextBox 4">
-            <a:extLst>
-              <a:ext uri="{FF2B5EF4-FFF2-40B4-BE49-F238E27FC236}">
-                <a16:creationId xmlns:a16="http://schemas.microsoft.com/office/drawing/2014/main" id="{0DA9AB27-85B2-7AE1-83F2-ED600AB7A5E3}"/>
-              </a:ext>
-            </a:extLst>
-          </p:cNvPr>
-          <p:cNvSpPr txBox="1"/>
-          <p:nvPr/>
-        </p:nvSpPr>
-        <p:spPr>
-          <a:xfrm>
-            <a:off x="2093614" y="5455529"/>
-            <a:ext cx="5110881" cy="923330"/>
-          </a:xfrm>
-          <a:prstGeom prst="rect">
-            <a:avLst/>
-          </a:prstGeom>
-          <a:noFill/>
-        </p:spPr>
-        <p:txBody>
-          <a:bodyPr wrap="square" rtlCol="0">
-            <a:spAutoFit/>
-          </a:bodyPr>
-          <a:lstStyle/>
-          <a:p>
-            <a:pPr marL="285750" indent="-285750">
-              <a:buFont typeface="Arial" panose="020B0604020202020204" pitchFamily="34" charset="0"/>
-              <a:buChar char="•"/>
-            </a:pPr>
-            <a:r>
-              <a:rPr lang="en-US" dirty="0"/>
-              <a:t>based upon </a:t>
-            </a:r>
-            <a:r>
-              <a:rPr lang="en-US" b="1" u="sng" dirty="0">
-                <a:hlinkClick r:id="rId4"/>
-              </a:rPr>
-              <a:t>node-tap</a:t>
-            </a:r>
-            <a:r>
-              <a:rPr lang="en-US" b="1" u="sng" dirty="0"/>
-              <a:t> </a:t>
-            </a:r>
-          </a:p>
-          <a:p>
-            <a:pPr marL="285750" indent="-285750">
-              <a:buFont typeface="Arial" panose="020B0604020202020204" pitchFamily="34" charset="0"/>
-              <a:buChar char="•"/>
-            </a:pPr>
-            <a:r>
-              <a:rPr lang="en-US" b="1" u="sng" dirty="0"/>
-              <a:t>Note: (</a:t>
-            </a:r>
-            <a:r>
-              <a:rPr lang="en-US" b="1" u="sng" dirty="0" err="1"/>
-              <a:t>coverage,reports</a:t>
-            </a:r>
-            <a:r>
-              <a:rPr lang="en-US" b="1" u="sng" dirty="0"/>
-              <a:t> everything inside..)</a:t>
-            </a:r>
-            <a:endParaRPr lang="en-US" dirty="0"/>
-          </a:p>
-        </p:txBody>
-      </p:sp>
     </p:spTree>
     <p:extLst>
       <p:ext uri="{BB962C8B-B14F-4D97-AF65-F5344CB8AC3E}">
-        <p14:creationId xmlns:p14="http://schemas.microsoft.com/office/powerpoint/2010/main" val="2928993965"/>
+        <p14:creationId xmlns:p14="http://schemas.microsoft.com/office/powerpoint/2010/main" val="3033686739"/>
       </p:ext>
     </p:extLst>
   </p:cSld>
@@ -10399,8 +10396,8 @@
         </p:nvSpPr>
         <p:spPr>
           <a:xfrm>
-            <a:off x="1219200" y="322123"/>
-            <a:ext cx="7620000" cy="598962"/>
+            <a:off x="1752600" y="630838"/>
+            <a:ext cx="6705600" cy="598962"/>
           </a:xfrm>
         </p:spPr>
         <p:txBody>
@@ -10411,15 +10408,15 @@
           <a:p>
             <a:r>
               <a:rPr lang="en-US" sz="4000" dirty="0"/>
-              <a:t>Features: </a:t>
+              <a:t>Features: ’</a:t>
             </a:r>
             <a:r>
               <a:rPr lang="en-US" sz="4000" dirty="0" err="1"/>
-              <a:t>intl</a:t>
+              <a:t>node:test</a:t>
             </a:r>
             <a:r>
               <a:rPr lang="en-US" sz="4000" dirty="0"/>
-              <a:t> additions</a:t>
+              <a:t>’</a:t>
             </a:r>
           </a:p>
         </p:txBody>
@@ -10472,12 +10469,60 @@
           </a:p>
         </p:txBody>
       </p:sp>
+      <p:sp>
+        <p:nvSpPr>
+          <p:cNvPr id="11" name="Title 1">
+            <a:extLst>
+              <a:ext uri="{FF2B5EF4-FFF2-40B4-BE49-F238E27FC236}">
+                <a16:creationId xmlns:a16="http://schemas.microsoft.com/office/drawing/2014/main" id="{3282A2DD-3CE3-2A87-5E0C-0A46F153DF07}"/>
+              </a:ext>
+            </a:extLst>
+          </p:cNvPr>
+          <p:cNvSpPr txBox="1">
+            <a:spLocks/>
+          </p:cNvSpPr>
+          <p:nvPr/>
+        </p:nvSpPr>
+        <p:spPr>
+          <a:xfrm>
+            <a:off x="2057400" y="1752600"/>
+            <a:ext cx="6705600" cy="2895600"/>
+          </a:xfrm>
+          <a:prstGeom prst="rect">
+            <a:avLst/>
+          </a:prstGeom>
+        </p:spPr>
+        <p:txBody>
+          <a:bodyPr vert="horz" anchor="b">
+            <a:noAutofit/>
+          </a:bodyPr>
+          <a:lstStyle>
+            <a:lvl1pPr algn="l" rtl="0" eaLnBrk="1" latinLnBrk="0" hangingPunct="1">
+              <a:spcBef>
+                <a:spcPct val="0"/>
+              </a:spcBef>
+              <a:buNone/>
+              <a:defRPr kumimoji="0" sz="3000" b="1" kern="1200" cap="small" baseline="0">
+                <a:solidFill>
+                  <a:schemeClr val="tx2"/>
+                </a:solidFill>
+                <a:latin typeface="+mj-lt"/>
+                <a:ea typeface="+mj-ea"/>
+                <a:cs typeface="+mj-cs"/>
+              </a:defRPr>
+            </a:lvl1pPr>
+          </a:lstStyle>
+          <a:p>
+            <a:endParaRPr lang="en-US" sz="4000" dirty="0"/>
+          </a:p>
+        </p:txBody>
+      </p:sp>
       <p:pic>
         <p:nvPicPr>
-          <p:cNvPr id="4" name="Picture 3" descr="Text&#10;&#10;Description automatically generated">
+          <p:cNvPr id="3" name="Picture 2" descr="Graphical user interface, text, application&#10;&#10;Description automatically generated">
             <a:extLst>
               <a:ext uri="{FF2B5EF4-FFF2-40B4-BE49-F238E27FC236}">
-                <a16:creationId xmlns:a16="http://schemas.microsoft.com/office/drawing/2014/main" id="{E742DC77-1C83-C327-C6D3-CC9C58429DBB}"/>
+                <a16:creationId xmlns:a16="http://schemas.microsoft.com/office/drawing/2014/main" id="{E0D664AC-8BAB-D300-797B-51AFD798058D}"/>
               </a:ext>
             </a:extLst>
           </p:cNvPr>
@@ -10500,18 +10545,86 @@
         </p:blipFill>
         <p:spPr>
           <a:xfrm>
-            <a:off x="609600" y="1280329"/>
-            <a:ext cx="8305800" cy="4129871"/>
+            <a:off x="0" y="1201433"/>
+            <a:ext cx="9144000" cy="4208767"/>
           </a:xfrm>
           <a:prstGeom prst="rect">
             <a:avLst/>
           </a:prstGeom>
         </p:spPr>
       </p:pic>
+      <p:sp>
+        <p:nvSpPr>
+          <p:cNvPr id="5" name="TextBox 4">
+            <a:extLst>
+              <a:ext uri="{FF2B5EF4-FFF2-40B4-BE49-F238E27FC236}">
+                <a16:creationId xmlns:a16="http://schemas.microsoft.com/office/drawing/2014/main" id="{0DA9AB27-85B2-7AE1-83F2-ED600AB7A5E3}"/>
+              </a:ext>
+            </a:extLst>
+          </p:cNvPr>
+          <p:cNvSpPr txBox="1"/>
+          <p:nvPr/>
+        </p:nvSpPr>
+        <p:spPr>
+          <a:xfrm>
+            <a:off x="2093614" y="5455529"/>
+            <a:ext cx="5110881" cy="923330"/>
+          </a:xfrm>
+          <a:prstGeom prst="rect">
+            <a:avLst/>
+          </a:prstGeom>
+          <a:noFill/>
+        </p:spPr>
+        <p:txBody>
+          <a:bodyPr wrap="square" rtlCol="0">
+            <a:spAutoFit/>
+          </a:bodyPr>
+          <a:lstStyle/>
+          <a:p>
+            <a:pPr marL="285750" indent="-285750">
+              <a:buFont typeface="Arial" panose="020B0604020202020204" pitchFamily="34" charset="0"/>
+              <a:buChar char="•"/>
+            </a:pPr>
+            <a:r>
+              <a:rPr lang="en-US" dirty="0"/>
+              <a:t>based upon </a:t>
+            </a:r>
+            <a:r>
+              <a:rPr lang="en-US" b="1" u="sng" dirty="0">
+                <a:hlinkClick r:id="rId4"/>
+              </a:rPr>
+              <a:t>node-tap</a:t>
+            </a:r>
+            <a:r>
+              <a:rPr lang="en-US" b="1" u="sng" dirty="0"/>
+              <a:t> </a:t>
+            </a:r>
+          </a:p>
+          <a:p>
+            <a:pPr marL="285750" indent="-285750">
+              <a:buFont typeface="Arial" panose="020B0604020202020204" pitchFamily="34" charset="0"/>
+              <a:buChar char="•"/>
+            </a:pPr>
+            <a:r>
+              <a:rPr lang="en-US" b="1" u="sng" dirty="0"/>
+              <a:t>Note: (</a:t>
+            </a:r>
+            <a:r>
+              <a:rPr lang="en-US" b="1" u="sng" dirty="0" err="1"/>
+              <a:t>coverage,reports</a:t>
+            </a:r>
+            <a:r>
+              <a:rPr lang="en-US" b="1" u="sng" dirty="0"/>
+              <a:t> everything inside..)</a:t>
+            </a:r>
+            <a:endParaRPr lang="en-US" dirty="0"/>
+          </a:p>
+        </p:txBody>
+      </p:sp>
     </p:spTree>
     <p:extLst>
       <p:ext uri="{BB962C8B-B14F-4D97-AF65-F5344CB8AC3E}">
-        <p14:creationId xmlns:p14="http://schemas.microsoft.com/office/powerpoint/2010/main" val="1922842497"/>
+        <p14:creationId xmlns:p14="http://schemas.microsoft.com/office/powerpoint/2010/main" val="2928993965"/>
       </p:ext>
     </p:extLst>
   </p:cSld>
@@ -10605,7 +10718,7 @@
         </p:nvSpPr>
         <p:spPr>
           <a:xfrm>
-            <a:off x="1752600" y="216067"/>
+            <a:off x="1219200" y="322123"/>
             <a:ext cx="7620000" cy="598962"/>
           </a:xfrm>
         </p:spPr>
@@ -10680,10 +10793,10 @@
       </p:sp>
       <p:pic>
         <p:nvPicPr>
-          <p:cNvPr id="3" name="Picture 2">
+          <p:cNvPr id="4" name="Picture 3" descr="Text&#10;&#10;Description automatically generated">
             <a:extLst>
               <a:ext uri="{FF2B5EF4-FFF2-40B4-BE49-F238E27FC236}">
-                <a16:creationId xmlns:a16="http://schemas.microsoft.com/office/drawing/2014/main" id="{6DA2EF35-0596-C7CB-679E-D557F9335CE3}"/>
+                <a16:creationId xmlns:a16="http://schemas.microsoft.com/office/drawing/2014/main" id="{E742DC77-1C83-C327-C6D3-CC9C58429DBB}"/>
               </a:ext>
             </a:extLst>
           </p:cNvPr>
@@ -10706,80 +10819,8 @@
         </p:blipFill>
         <p:spPr>
           <a:xfrm>
-            <a:off x="827649" y="4370940"/>
-            <a:ext cx="7708900" cy="1524000"/>
-          </a:xfrm>
-          <a:prstGeom prst="rect">
-            <a:avLst/>
-          </a:prstGeom>
-        </p:spPr>
-      </p:pic>
-      <p:pic>
-        <p:nvPicPr>
-          <p:cNvPr id="6" name="Picture 5">
-            <a:extLst>
-              <a:ext uri="{FF2B5EF4-FFF2-40B4-BE49-F238E27FC236}">
-                <a16:creationId xmlns:a16="http://schemas.microsoft.com/office/drawing/2014/main" id="{74A47B22-7E58-36EF-BB6E-54099A4F1D9C}"/>
-              </a:ext>
-            </a:extLst>
-          </p:cNvPr>
-          <p:cNvPicPr>
-            <a:picLocks noChangeAspect="1"/>
-          </p:cNvPicPr>
-          <p:nvPr/>
-        </p:nvPicPr>
-        <p:blipFill>
-          <a:blip r:embed="rId4">
-            <a:extLst>
-              <a:ext uri="{28A0092B-C50C-407E-A947-70E740481C1C}">
-                <a14:useLocalDpi xmlns:a14="http://schemas.microsoft.com/office/drawing/2010/main" val="0"/>
-              </a:ext>
-            </a:extLst>
-          </a:blip>
-          <a:stretch>
-            <a:fillRect/>
-          </a:stretch>
-        </p:blipFill>
-        <p:spPr>
-          <a:xfrm>
-            <a:off x="808599" y="2545399"/>
-            <a:ext cx="7734300" cy="1435100"/>
-          </a:xfrm>
-          <a:prstGeom prst="rect">
-            <a:avLst/>
-          </a:prstGeom>
-        </p:spPr>
-      </p:pic>
-      <p:pic>
-        <p:nvPicPr>
-          <p:cNvPr id="9" name="Picture 8">
-            <a:extLst>
-              <a:ext uri="{FF2B5EF4-FFF2-40B4-BE49-F238E27FC236}">
-                <a16:creationId xmlns:a16="http://schemas.microsoft.com/office/drawing/2014/main" id="{2414F31A-2A6F-0F3B-343E-666B217A52BA}"/>
-              </a:ext>
-            </a:extLst>
-          </p:cNvPr>
-          <p:cNvPicPr>
-            <a:picLocks noChangeAspect="1"/>
-          </p:cNvPicPr>
-          <p:nvPr/>
-        </p:nvPicPr>
-        <p:blipFill>
-          <a:blip r:embed="rId5">
-            <a:extLst>
-              <a:ext uri="{28A0092B-C50C-407E-A947-70E740481C1C}">
-                <a14:useLocalDpi xmlns:a14="http://schemas.microsoft.com/office/drawing/2010/main" val="0"/>
-              </a:ext>
-            </a:extLst>
-          </a:blip>
-          <a:stretch>
-            <a:fillRect/>
-          </a:stretch>
-        </p:blipFill>
-        <p:spPr>
-          <a:xfrm>
-            <a:off x="808599" y="963060"/>
-            <a:ext cx="7747000" cy="1282700"/>
+            <a:off x="609600" y="1280329"/>
+            <a:ext cx="8305800" cy="4129871"/>
           </a:xfrm>
           <a:prstGeom prst="rect">
             <a:avLst/>
@@ -10789,7 +10830,7 @@
     </p:spTree>
     <p:extLst>
       <p:ext uri="{BB962C8B-B14F-4D97-AF65-F5344CB8AC3E}">
-        <p14:creationId xmlns:p14="http://schemas.microsoft.com/office/powerpoint/2010/main" val="2728943366"/>
+        <p14:creationId xmlns:p14="http://schemas.microsoft.com/office/powerpoint/2010/main" val="1922842497"/>
       </p:ext>
     </p:extLst>
   </p:cSld>
@@ -10956,164 +10997,118 @@
           </a:p>
         </p:txBody>
       </p:sp>
-      <p:sp>
-        <p:nvSpPr>
-          <p:cNvPr id="3" name="TextBox 2">
+      <p:pic>
+        <p:nvPicPr>
+          <p:cNvPr id="3" name="Picture 2">
             <a:extLst>
               <a:ext uri="{FF2B5EF4-FFF2-40B4-BE49-F238E27FC236}">
-                <a16:creationId xmlns:a16="http://schemas.microsoft.com/office/drawing/2014/main" id="{811D7A72-6344-17EA-D223-69B0E43ED940}"/>
+                <a16:creationId xmlns:a16="http://schemas.microsoft.com/office/drawing/2014/main" id="{6DA2EF35-0596-C7CB-679E-D557F9335CE3}"/>
               </a:ext>
             </a:extLst>
           </p:cNvPr>
-          <p:cNvSpPr txBox="1"/>
-          <p:nvPr/>
-        </p:nvSpPr>
-        <p:spPr>
-          <a:xfrm>
-            <a:off x="1430448" y="1044186"/>
-            <a:ext cx="7620000" cy="3139321"/>
+          <p:cNvPicPr>
+            <a:picLocks noChangeAspect="1"/>
+          </p:cNvPicPr>
+          <p:nvPr/>
+        </p:nvPicPr>
+        <p:blipFill>
+          <a:blip r:embed="rId3">
+            <a:extLst>
+              <a:ext uri="{28A0092B-C50C-407E-A947-70E740481C1C}">
+                <a14:useLocalDpi xmlns:a14="http://schemas.microsoft.com/office/drawing/2010/main" val="0"/>
+              </a:ext>
+            </a:extLst>
+          </a:blip>
+          <a:stretch>
+            <a:fillRect/>
+          </a:stretch>
+        </p:blipFill>
+        <p:spPr>
+          <a:xfrm>
+            <a:off x="827649" y="4370940"/>
+            <a:ext cx="7708900" cy="1524000"/>
           </a:xfrm>
           <a:prstGeom prst="rect">
             <a:avLst/>
           </a:prstGeom>
-          <a:noFill/>
-        </p:spPr>
-        <p:txBody>
-          <a:bodyPr wrap="square">
-            <a:spAutoFit/>
-          </a:bodyPr>
-          <a:lstStyle/>
-          <a:p>
-            <a:r>
-              <a:rPr lang="en-US" dirty="0"/>
-              <a:t>if ( [ "Asia/Anadyr", "Asia/Barnaul", "Asia/Chita", "Asia/Irkutsk", "Asia/Kamchatka", "Asia/</a:t>
-            </a:r>
-            <a:r>
-              <a:rPr lang="en-US" dirty="0" err="1"/>
-              <a:t>Khandyga</a:t>
-            </a:r>
-            <a:r>
-              <a:rPr lang="en-US" dirty="0"/>
-              <a:t>", "Asia/Krasnoyarsk", "Asia/Magadan", "Asia/Novokuznetsk", "Asia/Novosibirsk", "Asia/Omsk", "Asia/Sakhalin", "Asia/</a:t>
-            </a:r>
-            <a:r>
-              <a:rPr lang="en-US" dirty="0" err="1"/>
-              <a:t>Srednekolymsk</a:t>
-            </a:r>
-            <a:r>
-              <a:rPr lang="en-US" dirty="0"/>
-              <a:t>", "Asia/Tomsk", "Asia/</a:t>
-            </a:r>
-            <a:r>
-              <a:rPr lang="en-US" dirty="0" err="1"/>
-              <a:t>Ust</a:t>
-            </a:r>
-            <a:r>
-              <a:rPr lang="en-US" dirty="0"/>
-              <a:t>-Nera", "Asia/Vladivostok", "Asia/Yakutsk", "Asia/Yekaterinburg", "Europe/Astrakhan", "Europe/Kaliningrad", "Europe/Kirov", "Europe/Moscow", "Europe/Samara", "Europe/Saratov", "Europe/Simferopol", "Europe/Ulyanovsk", "Europe/Volgograd", "W-SU" ].</a:t>
-            </a:r>
-            <a:r>
-              <a:rPr lang="en-US" dirty="0" err="1"/>
-              <a:t>indexOf</a:t>
-            </a:r>
-            <a:r>
-              <a:rPr lang="en-US" dirty="0"/>
-              <a:t>(</a:t>
-            </a:r>
-          </a:p>
-          <a:p>
-            <a:r>
-              <a:rPr lang="en-US" dirty="0"/>
-              <a:t>new </a:t>
-            </a:r>
-            <a:r>
-              <a:rPr lang="en-US" dirty="0" err="1"/>
-              <a:t>Intl.DateTimeFormat</a:t>
-            </a:r>
-            <a:r>
-              <a:rPr lang="en-US" dirty="0"/>
-              <a:t>().</a:t>
-            </a:r>
-            <a:r>
-              <a:rPr lang="en-US" dirty="0" err="1"/>
-              <a:t>resolvedOptions</a:t>
-            </a:r>
-            <a:r>
-              <a:rPr lang="en-US" dirty="0"/>
-              <a:t>().</a:t>
-            </a:r>
-            <a:r>
-              <a:rPr lang="en-US" dirty="0" err="1"/>
-              <a:t>timeZone</a:t>
-            </a:r>
-            <a:r>
-              <a:rPr lang="en-US" dirty="0"/>
-              <a:t>) === -1 ) { return; }</a:t>
-            </a:r>
-            <a:endParaRPr lang="en-IL" dirty="0"/>
-          </a:p>
-        </p:txBody>
-      </p:sp>
-      <p:sp>
-        <p:nvSpPr>
-          <p:cNvPr id="6" name="TextBox 5">
+        </p:spPr>
+      </p:pic>
+      <p:pic>
+        <p:nvPicPr>
+          <p:cNvPr id="6" name="Picture 5">
             <a:extLst>
               <a:ext uri="{FF2B5EF4-FFF2-40B4-BE49-F238E27FC236}">
-                <a16:creationId xmlns:a16="http://schemas.microsoft.com/office/drawing/2014/main" id="{15F5F0F8-7F51-CD68-705D-24397FEDA278}"/>
+                <a16:creationId xmlns:a16="http://schemas.microsoft.com/office/drawing/2014/main" id="{74A47B22-7E58-36EF-BB6E-54099A4F1D9C}"/>
               </a:ext>
             </a:extLst>
           </p:cNvPr>
-          <p:cNvSpPr txBox="1"/>
-          <p:nvPr/>
-        </p:nvSpPr>
-        <p:spPr>
-          <a:xfrm>
-            <a:off x="1981200" y="4812268"/>
-            <a:ext cx="6477000" cy="369332"/>
+          <p:cNvPicPr>
+            <a:picLocks noChangeAspect="1"/>
+          </p:cNvPicPr>
+          <p:nvPr/>
+        </p:nvPicPr>
+        <p:blipFill>
+          <a:blip r:embed="rId4">
+            <a:extLst>
+              <a:ext uri="{28A0092B-C50C-407E-A947-70E740481C1C}">
+                <a14:useLocalDpi xmlns:a14="http://schemas.microsoft.com/office/drawing/2010/main" val="0"/>
+              </a:ext>
+            </a:extLst>
+          </a:blip>
+          <a:stretch>
+            <a:fillRect/>
+          </a:stretch>
+        </p:blipFill>
+        <p:spPr>
+          <a:xfrm>
+            <a:off x="808599" y="2545399"/>
+            <a:ext cx="7734300" cy="1435100"/>
           </a:xfrm>
           <a:prstGeom prst="rect">
             <a:avLst/>
           </a:prstGeom>
-          <a:noFill/>
-        </p:spPr>
-        <p:txBody>
-          <a:bodyPr wrap="square">
-            <a:spAutoFit/>
-          </a:bodyPr>
-          <a:lstStyle/>
-          <a:p>
-            <a:r>
-              <a:rPr lang="en-US" dirty="0"/>
-              <a:t>new </a:t>
-            </a:r>
-            <a:r>
-              <a:rPr lang="en-US" dirty="0" err="1"/>
-              <a:t>Intl.DateTimeFormat</a:t>
-            </a:r>
-            <a:r>
-              <a:rPr lang="en-US" dirty="0"/>
-              <a:t>().</a:t>
-            </a:r>
-            <a:r>
-              <a:rPr lang="en-US" dirty="0" err="1"/>
-              <a:t>resolvedOptions</a:t>
-            </a:r>
-            <a:r>
-              <a:rPr lang="en-US" dirty="0"/>
-              <a:t>().</a:t>
-            </a:r>
-            <a:r>
-              <a:rPr lang="en-US" dirty="0" err="1"/>
-              <a:t>timeZone</a:t>
-            </a:r>
-            <a:endParaRPr lang="en-IL" dirty="0"/>
-          </a:p>
-        </p:txBody>
-      </p:sp>
+        </p:spPr>
+      </p:pic>
+      <p:pic>
+        <p:nvPicPr>
+          <p:cNvPr id="9" name="Picture 8">
+            <a:extLst>
+              <a:ext uri="{FF2B5EF4-FFF2-40B4-BE49-F238E27FC236}">
+                <a16:creationId xmlns:a16="http://schemas.microsoft.com/office/drawing/2014/main" id="{2414F31A-2A6F-0F3B-343E-666B217A52BA}"/>
+              </a:ext>
+            </a:extLst>
+          </p:cNvPr>
+          <p:cNvPicPr>
+            <a:picLocks noChangeAspect="1"/>
+          </p:cNvPicPr>
+          <p:nvPr/>
+        </p:nvPicPr>
+        <p:blipFill>
+          <a:blip r:embed="rId5">
+            <a:extLst>
+              <a:ext uri="{28A0092B-C50C-407E-A947-70E740481C1C}">
+                <a14:useLocalDpi xmlns:a14="http://schemas.microsoft.com/office/drawing/2010/main" val="0"/>
+              </a:ext>
+            </a:extLst>
+          </a:blip>
+          <a:stretch>
+            <a:fillRect/>
+          </a:stretch>
+        </p:blipFill>
+        <p:spPr>
+          <a:xfrm>
+            <a:off x="808599" y="963060"/>
+            <a:ext cx="7747000" cy="1282700"/>
+          </a:xfrm>
+          <a:prstGeom prst="rect">
+            <a:avLst/>
+          </a:prstGeom>
+        </p:spPr>
+      </p:pic>
     </p:spTree>
     <p:extLst>
       <p:ext uri="{BB962C8B-B14F-4D97-AF65-F5344CB8AC3E}">
-        <p14:creationId xmlns:p14="http://schemas.microsoft.com/office/powerpoint/2010/main" val="4111422596"/>
+        <p14:creationId xmlns:p14="http://schemas.microsoft.com/office/powerpoint/2010/main" val="2728943366"/>
       </p:ext>
     </p:extLst>
   </p:cSld>
@@ -11460,8 +11455,8 @@
         </p:nvSpPr>
         <p:spPr>
           <a:xfrm>
-            <a:off x="1943100" y="1809581"/>
-            <a:ext cx="6705600" cy="598962"/>
+            <a:off x="1752600" y="216067"/>
+            <a:ext cx="7620000" cy="598962"/>
           </a:xfrm>
         </p:spPr>
         <p:txBody>
@@ -11471,16 +11466,17 @@
           <a:lstStyle/>
           <a:p>
             <a:r>
-              <a:rPr lang="en-US" dirty="0"/>
-              <a:t>Throw on unhandled rejections</a:t>
-            </a:r>
-            <a:br>
-              <a:rPr lang="en-US" dirty="0"/>
-            </a:br>
-            <a:br>
               <a:rPr lang="en-US" sz="4000" dirty="0"/>
-            </a:br>
-            <a:endParaRPr lang="en-US" sz="4000" dirty="0"/>
+              <a:t>Features: </a:t>
+            </a:r>
+            <a:r>
+              <a:rPr lang="en-US" sz="4000" dirty="0" err="1"/>
+              <a:t>intl</a:t>
+            </a:r>
+            <a:r>
+              <a:rPr lang="en-US" sz="4000" dirty="0"/>
+              <a:t> additions</a:t>
+            </a:r>
           </a:p>
         </p:txBody>
       </p:sp>
@@ -11534,92 +11530,162 @@
       </p:sp>
       <p:sp>
         <p:nvSpPr>
-          <p:cNvPr id="11" name="Title 1">
+          <p:cNvPr id="3" name="TextBox 2">
             <a:extLst>
               <a:ext uri="{FF2B5EF4-FFF2-40B4-BE49-F238E27FC236}">
-                <a16:creationId xmlns:a16="http://schemas.microsoft.com/office/drawing/2014/main" id="{3282A2DD-3CE3-2A87-5E0C-0A46F153DF07}"/>
+                <a16:creationId xmlns:a16="http://schemas.microsoft.com/office/drawing/2014/main" id="{811D7A72-6344-17EA-D223-69B0E43ED940}"/>
               </a:ext>
             </a:extLst>
           </p:cNvPr>
-          <p:cNvSpPr txBox="1">
-            <a:spLocks/>
-          </p:cNvSpPr>
-          <p:nvPr/>
-        </p:nvSpPr>
-        <p:spPr>
-          <a:xfrm>
-            <a:off x="2057400" y="1752600"/>
-            <a:ext cx="6705600" cy="2895600"/>
+          <p:cNvSpPr txBox="1"/>
+          <p:nvPr/>
+        </p:nvSpPr>
+        <p:spPr>
+          <a:xfrm>
+            <a:off x="1430448" y="1044186"/>
+            <a:ext cx="7620000" cy="3139321"/>
           </a:xfrm>
           <a:prstGeom prst="rect">
             <a:avLst/>
           </a:prstGeom>
-        </p:spPr>
-        <p:txBody>
-          <a:bodyPr vert="horz" anchor="b">
-            <a:noAutofit/>
+          <a:noFill/>
+        </p:spPr>
+        <p:txBody>
+          <a:bodyPr wrap="square">
+            <a:spAutoFit/>
           </a:bodyPr>
-          <a:lstStyle>
-            <a:lvl1pPr algn="l" rtl="0" eaLnBrk="1" latinLnBrk="0" hangingPunct="1">
-              <a:spcBef>
-                <a:spcPct val="0"/>
-              </a:spcBef>
-              <a:buNone/>
-              <a:defRPr kumimoji="0" sz="3000" b="1" kern="1200" cap="small" baseline="0">
-                <a:solidFill>
-                  <a:schemeClr val="tx2"/>
-                </a:solidFill>
-                <a:latin typeface="+mj-lt"/>
-                <a:ea typeface="+mj-ea"/>
-                <a:cs typeface="+mj-cs"/>
-              </a:defRPr>
-            </a:lvl1pPr>
-          </a:lstStyle>
-          <a:p>
-            <a:endParaRPr lang="en-US" sz="4000" dirty="0"/>
-          </a:p>
-        </p:txBody>
-      </p:sp>
-      <p:pic>
-        <p:nvPicPr>
-          <p:cNvPr id="6" name="Picture 5" descr="Text&#10;&#10;Description automatically generated">
+          <a:lstStyle/>
+          <a:p>
+            <a:r>
+              <a:rPr lang="en-US" dirty="0"/>
+              <a:t>if ( [ "Asia/Anadyr", "Asia/Barnaul", "Asia/Chita", "Asia/Irkutsk", "Asia/Kamchatka", "Asia/</a:t>
+            </a:r>
+            <a:r>
+              <a:rPr lang="en-US" dirty="0" err="1"/>
+              <a:t>Khandyga</a:t>
+            </a:r>
+            <a:r>
+              <a:rPr lang="en-US" dirty="0"/>
+              <a:t>", "Asia/Krasnoyarsk", "Asia/Magadan", "Asia/Novokuznetsk", "Asia/Novosibirsk", "Asia/Omsk", "Asia/Sakhalin", "Asia/</a:t>
+            </a:r>
+            <a:r>
+              <a:rPr lang="en-US" dirty="0" err="1"/>
+              <a:t>Srednekolymsk</a:t>
+            </a:r>
+            <a:r>
+              <a:rPr lang="en-US" dirty="0"/>
+              <a:t>", "Asia/Tomsk", "Asia/</a:t>
+            </a:r>
+            <a:r>
+              <a:rPr lang="en-US" dirty="0" err="1"/>
+              <a:t>Ust</a:t>
+            </a:r>
+            <a:r>
+              <a:rPr lang="en-US" dirty="0"/>
+              <a:t>-Nera", "Asia/Vladivostok", "Asia/Yakutsk", "Asia/Yekaterinburg", "Europe/Astrakhan", "Europe/Kaliningrad", "Europe/Kirov", "Europe/Moscow", "Europe/Samara", "Europe/Saratov", "Europe/Simferopol", "Europe/Ulyanovsk", "Europe/Volgograd", "W-SU" ].</a:t>
+            </a:r>
+            <a:r>
+              <a:rPr lang="en-US" dirty="0" err="1"/>
+              <a:t>indexOf</a:t>
+            </a:r>
+            <a:r>
+              <a:rPr lang="en-US" dirty="0"/>
+              <a:t>(</a:t>
+            </a:r>
+          </a:p>
+          <a:p>
+            <a:r>
+              <a:rPr lang="en-US" dirty="0"/>
+              <a:t>new </a:t>
+            </a:r>
+            <a:r>
+              <a:rPr lang="en-US" dirty="0" err="1"/>
+              <a:t>Intl.DateTimeFormat</a:t>
+            </a:r>
+            <a:r>
+              <a:rPr lang="en-US" dirty="0"/>
+              <a:t>().</a:t>
+            </a:r>
+            <a:r>
+              <a:rPr lang="en-US" dirty="0" err="1"/>
+              <a:t>resolvedOptions</a:t>
+            </a:r>
+            <a:r>
+              <a:rPr lang="en-US" dirty="0"/>
+              <a:t>().</a:t>
+            </a:r>
+            <a:r>
+              <a:rPr lang="en-US" dirty="0" err="1"/>
+              <a:t>timeZone</a:t>
+            </a:r>
+            <a:r>
+              <a:rPr lang="en-US" dirty="0"/>
+              <a:t>) === -1 ) { return; }</a:t>
+            </a:r>
+            <a:endParaRPr lang="en-IL" dirty="0"/>
+          </a:p>
+        </p:txBody>
+      </p:sp>
+      <p:sp>
+        <p:nvSpPr>
+          <p:cNvPr id="6" name="TextBox 5">
             <a:extLst>
               <a:ext uri="{FF2B5EF4-FFF2-40B4-BE49-F238E27FC236}">
-                <a16:creationId xmlns:a16="http://schemas.microsoft.com/office/drawing/2014/main" id="{0B6BD949-2995-7285-AD9A-72747609314F}"/>
+                <a16:creationId xmlns:a16="http://schemas.microsoft.com/office/drawing/2014/main" id="{15F5F0F8-7F51-CD68-705D-24397FEDA278}"/>
               </a:ext>
             </a:extLst>
           </p:cNvPr>
-          <p:cNvPicPr>
-            <a:picLocks noChangeAspect="1"/>
-          </p:cNvPicPr>
-          <p:nvPr/>
-        </p:nvPicPr>
-        <p:blipFill>
-          <a:blip r:embed="rId3">
-            <a:extLst>
-              <a:ext uri="{28A0092B-C50C-407E-A947-70E740481C1C}">
-                <a14:useLocalDpi xmlns:a14="http://schemas.microsoft.com/office/drawing/2010/main" val="0"/>
-              </a:ext>
-            </a:extLst>
-          </a:blip>
-          <a:stretch>
-            <a:fillRect/>
-          </a:stretch>
-        </p:blipFill>
-        <p:spPr>
-          <a:xfrm>
-            <a:off x="1143000" y="1454178"/>
-            <a:ext cx="7924800" cy="4003568"/>
+          <p:cNvSpPr txBox="1"/>
+          <p:nvPr/>
+        </p:nvSpPr>
+        <p:spPr>
+          <a:xfrm>
+            <a:off x="1981200" y="4812268"/>
+            <a:ext cx="6477000" cy="369332"/>
           </a:xfrm>
           <a:prstGeom prst="rect">
             <a:avLst/>
           </a:prstGeom>
-        </p:spPr>
-      </p:pic>
+          <a:noFill/>
+        </p:spPr>
+        <p:txBody>
+          <a:bodyPr wrap="square">
+            <a:spAutoFit/>
+          </a:bodyPr>
+          <a:lstStyle/>
+          <a:p>
+            <a:r>
+              <a:rPr lang="en-US" dirty="0"/>
+              <a:t>new </a:t>
+            </a:r>
+            <a:r>
+              <a:rPr lang="en-US" dirty="0" err="1"/>
+              <a:t>Intl.DateTimeFormat</a:t>
+            </a:r>
+            <a:r>
+              <a:rPr lang="en-US" dirty="0"/>
+              <a:t>().</a:t>
+            </a:r>
+            <a:r>
+              <a:rPr lang="en-US" dirty="0" err="1"/>
+              <a:t>resolvedOptions</a:t>
+            </a:r>
+            <a:r>
+              <a:rPr lang="en-US" dirty="0"/>
+              <a:t>().</a:t>
+            </a:r>
+            <a:r>
+              <a:rPr lang="en-US" dirty="0" err="1"/>
+              <a:t>timeZone</a:t>
+            </a:r>
+            <a:endParaRPr lang="en-IL" dirty="0"/>
+          </a:p>
+        </p:txBody>
+      </p:sp>
     </p:spTree>
     <p:extLst>
       <p:ext uri="{BB962C8B-B14F-4D97-AF65-F5344CB8AC3E}">
-        <p14:creationId xmlns:p14="http://schemas.microsoft.com/office/powerpoint/2010/main" val="1302202130"/>
+        <p14:creationId xmlns:p14="http://schemas.microsoft.com/office/powerpoint/2010/main" val="4111422596"/>
       </p:ext>
     </p:extLst>
   </p:cSld>
@@ -11835,10 +11901,10 @@
       </p:sp>
       <p:pic>
         <p:nvPicPr>
-          <p:cNvPr id="3" name="Picture 2" descr="A screenshot of a computer&#10;&#10;Description automatically generated with medium confidence">
+          <p:cNvPr id="6" name="Picture 5" descr="Text&#10;&#10;Description automatically generated">
             <a:extLst>
               <a:ext uri="{FF2B5EF4-FFF2-40B4-BE49-F238E27FC236}">
-                <a16:creationId xmlns:a16="http://schemas.microsoft.com/office/drawing/2014/main" id="{EE2C351F-D43E-8BD9-4642-D38237144192}"/>
+                <a16:creationId xmlns:a16="http://schemas.microsoft.com/office/drawing/2014/main" id="{0B6BD949-2995-7285-AD9A-72747609314F}"/>
               </a:ext>
             </a:extLst>
           </p:cNvPr>
@@ -11861,8 +11927,8 @@
         </p:blipFill>
         <p:spPr>
           <a:xfrm>
-            <a:off x="0" y="1887355"/>
-            <a:ext cx="9144000" cy="2509978"/>
+            <a:off x="1143000" y="1454178"/>
+            <a:ext cx="7924800" cy="4003568"/>
           </a:xfrm>
           <a:prstGeom prst="rect">
             <a:avLst/>
@@ -11872,7 +11938,7 @@
     </p:spTree>
     <p:extLst>
       <p:ext uri="{BB962C8B-B14F-4D97-AF65-F5344CB8AC3E}">
-        <p14:creationId xmlns:p14="http://schemas.microsoft.com/office/powerpoint/2010/main" val="1198548795"/>
+        <p14:creationId xmlns:p14="http://schemas.microsoft.com/office/powerpoint/2010/main" val="1302202130"/>
       </p:ext>
     </p:extLst>
   </p:cSld>
@@ -11950,6 +12016,48 @@
       </p:sp>
       <p:sp>
         <p:nvSpPr>
+          <p:cNvPr id="7" name="Title 1">
+            <a:extLst>
+              <a:ext uri="{FF2B5EF4-FFF2-40B4-BE49-F238E27FC236}">
+                <a16:creationId xmlns:a16="http://schemas.microsoft.com/office/drawing/2014/main" id="{54C561DF-0CCA-BAA8-EEF9-9C112E85285D}"/>
+              </a:ext>
+            </a:extLst>
+          </p:cNvPr>
+          <p:cNvSpPr>
+            <a:spLocks noGrp="1"/>
+          </p:cNvSpPr>
+          <p:nvPr>
+            <p:ph type="ctrTitle"/>
+          </p:nvPr>
+        </p:nvSpPr>
+        <p:spPr>
+          <a:xfrm>
+            <a:off x="1943100" y="1809581"/>
+            <a:ext cx="6705600" cy="598962"/>
+          </a:xfrm>
+        </p:spPr>
+        <p:txBody>
+          <a:bodyPr>
+            <a:noAutofit/>
+          </a:bodyPr>
+          <a:lstStyle/>
+          <a:p>
+            <a:r>
+              <a:rPr lang="en-US" dirty="0"/>
+              <a:t>Throw on unhandled rejections</a:t>
+            </a:r>
+            <a:br>
+              <a:rPr lang="en-US" dirty="0"/>
+            </a:br>
+            <a:br>
+              <a:rPr lang="en-US" sz="4000" dirty="0"/>
+            </a:br>
+            <a:endParaRPr lang="en-US" sz="4000" dirty="0"/>
+          </a:p>
+        </p:txBody>
+      </p:sp>
+      <p:sp>
+        <p:nvSpPr>
           <p:cNvPr id="10" name="Title 1">
             <a:extLst>
               <a:ext uri="{FF2B5EF4-FFF2-40B4-BE49-F238E27FC236}">
@@ -12044,48 +12152,12 @@
           </a:p>
         </p:txBody>
       </p:sp>
-      <p:sp>
-        <p:nvSpPr>
-          <p:cNvPr id="4" name="TextBox 3">
-            <a:extLst>
-              <a:ext uri="{FF2B5EF4-FFF2-40B4-BE49-F238E27FC236}">
-                <a16:creationId xmlns:a16="http://schemas.microsoft.com/office/drawing/2014/main" id="{C1539FA4-3B5C-AFA9-730B-E375CA55FB3C}"/>
-              </a:ext>
-            </a:extLst>
-          </p:cNvPr>
-          <p:cNvSpPr txBox="1"/>
-          <p:nvPr/>
-        </p:nvSpPr>
-        <p:spPr>
-          <a:xfrm>
-            <a:off x="1143000" y="559822"/>
-            <a:ext cx="7162800" cy="461665"/>
-          </a:xfrm>
-          <a:prstGeom prst="rect">
-            <a:avLst/>
-          </a:prstGeom>
-          <a:noFill/>
-        </p:spPr>
-        <p:txBody>
-          <a:bodyPr wrap="square">
-            <a:spAutoFit/>
-          </a:bodyPr>
-          <a:lstStyle/>
-          <a:p>
-            <a:r>
-              <a:rPr lang="en-US" sz="2400" dirty="0"/>
-              <a:t>Feature: CLI read write promise interface</a:t>
-            </a:r>
-            <a:endParaRPr lang="en-IL" sz="2400" dirty="0"/>
-          </a:p>
-        </p:txBody>
-      </p:sp>
       <p:pic>
         <p:nvPicPr>
-          <p:cNvPr id="3" name="Picture 2" descr="Text&#10;&#10;Description automatically generated">
+          <p:cNvPr id="3" name="Picture 2" descr="A screenshot of a computer&#10;&#10;Description automatically generated with medium confidence">
             <a:extLst>
               <a:ext uri="{FF2B5EF4-FFF2-40B4-BE49-F238E27FC236}">
-                <a16:creationId xmlns:a16="http://schemas.microsoft.com/office/drawing/2014/main" id="{A1E6324D-3543-6637-142D-4DCEE1653635}"/>
+                <a16:creationId xmlns:a16="http://schemas.microsoft.com/office/drawing/2014/main" id="{EE2C351F-D43E-8BD9-4642-D38237144192}"/>
               </a:ext>
             </a:extLst>
           </p:cNvPr>
@@ -12108,8 +12180,8 @@
         </p:blipFill>
         <p:spPr>
           <a:xfrm>
-            <a:off x="0" y="1447800"/>
-            <a:ext cx="9144000" cy="3676491"/>
+            <a:off x="0" y="1887355"/>
+            <a:ext cx="9144000" cy="2509978"/>
           </a:xfrm>
           <a:prstGeom prst="rect">
             <a:avLst/>
@@ -12119,7 +12191,7 @@
     </p:spTree>
     <p:extLst>
       <p:ext uri="{BB962C8B-B14F-4D97-AF65-F5344CB8AC3E}">
-        <p14:creationId xmlns:p14="http://schemas.microsoft.com/office/powerpoint/2010/main" val="3287302295"/>
+        <p14:creationId xmlns:p14="http://schemas.microsoft.com/office/powerpoint/2010/main" val="1198548795"/>
       </p:ext>
     </p:extLst>
   </p:cSld>
@@ -12305,8 +12377,8 @@
         </p:nvSpPr>
         <p:spPr>
           <a:xfrm>
-            <a:off x="3124200" y="489123"/>
-            <a:ext cx="7162800" cy="584775"/>
+            <a:off x="1143000" y="559822"/>
+            <a:ext cx="7162800" cy="461665"/>
           </a:xfrm>
           <a:prstGeom prst="rect">
             <a:avLst/>
@@ -12320,19 +12392,19 @@
           <a:lstStyle/>
           <a:p>
             <a:r>
-              <a:rPr lang="en-US" sz="3200" dirty="0" err="1"/>
-              <a:t>AggregateError</a:t>
-            </a:r>
-            <a:endParaRPr lang="en-US" sz="3200" dirty="0"/>
+              <a:rPr lang="en-US" sz="2400" dirty="0"/>
+              <a:t>Feature: CLI read write promise interface</a:t>
+            </a:r>
+            <a:endParaRPr lang="en-IL" sz="2400" dirty="0"/>
           </a:p>
         </p:txBody>
       </p:sp>
       <p:pic>
         <p:nvPicPr>
-          <p:cNvPr id="5" name="Picture 4" descr="A screenshot of a computer&#10;&#10;Description automatically generated">
+          <p:cNvPr id="3" name="Picture 2" descr="Text&#10;&#10;Description automatically generated">
             <a:extLst>
               <a:ext uri="{FF2B5EF4-FFF2-40B4-BE49-F238E27FC236}">
-                <a16:creationId xmlns:a16="http://schemas.microsoft.com/office/drawing/2014/main" id="{E5EFD0BC-A887-5D60-B1DC-B5F4F66BB441}"/>
+                <a16:creationId xmlns:a16="http://schemas.microsoft.com/office/drawing/2014/main" id="{A1E6324D-3543-6637-142D-4DCEE1653635}"/>
               </a:ext>
             </a:extLst>
           </p:cNvPr>
@@ -12355,8 +12427,8 @@
         </p:blipFill>
         <p:spPr>
           <a:xfrm>
-            <a:off x="0" y="1343822"/>
-            <a:ext cx="9144000" cy="2618664"/>
+            <a:off x="0" y="1447800"/>
+            <a:ext cx="9144000" cy="3676491"/>
           </a:xfrm>
           <a:prstGeom prst="rect">
             <a:avLst/>
@@ -12366,7 +12438,7 @@
     </p:spTree>
     <p:extLst>
       <p:ext uri="{BB962C8B-B14F-4D97-AF65-F5344CB8AC3E}">
-        <p14:creationId xmlns:p14="http://schemas.microsoft.com/office/powerpoint/2010/main" val="3139754571"/>
+        <p14:creationId xmlns:p14="http://schemas.microsoft.com/office/powerpoint/2010/main" val="3287302295"/>
       </p:ext>
     </p:extLst>
   </p:cSld>
@@ -12576,10 +12648,10 @@
       </p:sp>
       <p:pic>
         <p:nvPicPr>
-          <p:cNvPr id="3" name="Picture 2">
+          <p:cNvPr id="5" name="Picture 4" descr="A screenshot of a computer&#10;&#10;Description automatically generated">
             <a:extLst>
               <a:ext uri="{FF2B5EF4-FFF2-40B4-BE49-F238E27FC236}">
-                <a16:creationId xmlns:a16="http://schemas.microsoft.com/office/drawing/2014/main" id="{009A0193-3536-7765-BAE5-53F47C5C8E48}"/>
+                <a16:creationId xmlns:a16="http://schemas.microsoft.com/office/drawing/2014/main" id="{E5EFD0BC-A887-5D60-B1DC-B5F4F66BB441}"/>
               </a:ext>
             </a:extLst>
           </p:cNvPr>
@@ -12602,8 +12674,8 @@
         </p:blipFill>
         <p:spPr>
           <a:xfrm>
-            <a:off x="1219200" y="1237439"/>
-            <a:ext cx="7162800" cy="5149726"/>
+            <a:off x="0" y="1343822"/>
+            <a:ext cx="9144000" cy="2618664"/>
           </a:xfrm>
           <a:prstGeom prst="rect">
             <a:avLst/>
@@ -12613,7 +12685,7 @@
     </p:spTree>
     <p:extLst>
       <p:ext uri="{BB962C8B-B14F-4D97-AF65-F5344CB8AC3E}">
-        <p14:creationId xmlns:p14="http://schemas.microsoft.com/office/powerpoint/2010/main" val="1732278807"/>
+        <p14:creationId xmlns:p14="http://schemas.microsoft.com/office/powerpoint/2010/main" val="3139754571"/>
       </p:ext>
     </p:extLst>
   </p:cSld>
@@ -12823,10 +12895,10 @@
       </p:sp>
       <p:pic>
         <p:nvPicPr>
-          <p:cNvPr id="5" name="Picture 4" descr="Text&#10;&#10;Description automatically generated">
+          <p:cNvPr id="3" name="Picture 2">
             <a:extLst>
               <a:ext uri="{FF2B5EF4-FFF2-40B4-BE49-F238E27FC236}">
-                <a16:creationId xmlns:a16="http://schemas.microsoft.com/office/drawing/2014/main" id="{AD89527A-9AF5-24C7-5A6B-63F148A977AA}"/>
+                <a16:creationId xmlns:a16="http://schemas.microsoft.com/office/drawing/2014/main" id="{009A0193-3536-7765-BAE5-53F47C5C8E48}"/>
               </a:ext>
             </a:extLst>
           </p:cNvPr>
@@ -12849,8 +12921,8 @@
         </p:blipFill>
         <p:spPr>
           <a:xfrm>
-            <a:off x="1524000" y="1200122"/>
-            <a:ext cx="6320390" cy="5371969"/>
+            <a:off x="1219200" y="1237439"/>
+            <a:ext cx="7162800" cy="5149726"/>
           </a:xfrm>
           <a:prstGeom prst="rect">
             <a:avLst/>
@@ -12860,7 +12932,7 @@
     </p:spTree>
     <p:extLst>
       <p:ext uri="{BB962C8B-B14F-4D97-AF65-F5344CB8AC3E}">
-        <p14:creationId xmlns:p14="http://schemas.microsoft.com/office/powerpoint/2010/main" val="1200868996"/>
+        <p14:creationId xmlns:p14="http://schemas.microsoft.com/office/powerpoint/2010/main" val="1732278807"/>
       </p:ext>
     </p:extLst>
   </p:cSld>
@@ -13046,8 +13118,8 @@
         </p:nvSpPr>
         <p:spPr>
           <a:xfrm>
-            <a:off x="1143000" y="559822"/>
-            <a:ext cx="7162800" cy="461665"/>
+            <a:off x="3124200" y="489123"/>
+            <a:ext cx="7162800" cy="584775"/>
           </a:xfrm>
           <a:prstGeom prst="rect">
             <a:avLst/>
@@ -13061,27 +13133,19 @@
           <a:lstStyle/>
           <a:p>
             <a:r>
-              <a:rPr lang="en-US" sz="2400" b="0" dirty="0"/>
-              <a:t>const { </a:t>
-            </a:r>
-            <a:r>
-              <a:rPr lang="en-US" sz="2400" b="0" dirty="0" err="1"/>
-              <a:t>setTimeout</a:t>
-            </a:r>
-            <a:r>
-              <a:rPr lang="en-US" sz="2400" b="0" dirty="0"/>
-              <a:t> } = require('timers/promises')</a:t>
-            </a:r>
-            <a:endParaRPr lang="en-IL" sz="2400" dirty="0"/>
+              <a:rPr lang="en-US" sz="3200" dirty="0" err="1"/>
+              <a:t>AggregateError</a:t>
+            </a:r>
+            <a:endParaRPr lang="en-US" sz="3200" dirty="0"/>
           </a:p>
         </p:txBody>
       </p:sp>
       <p:pic>
         <p:nvPicPr>
-          <p:cNvPr id="9" name="Picture 8" descr="Graphical user interface, text, application&#10;&#10;Description automatically generated">
+          <p:cNvPr id="5" name="Picture 4" descr="Text&#10;&#10;Description automatically generated">
             <a:extLst>
               <a:ext uri="{FF2B5EF4-FFF2-40B4-BE49-F238E27FC236}">
-                <a16:creationId xmlns:a16="http://schemas.microsoft.com/office/drawing/2014/main" id="{64C86849-9E36-2788-460E-6D8CBA8BA163}"/>
+                <a16:creationId xmlns:a16="http://schemas.microsoft.com/office/drawing/2014/main" id="{AD89527A-9AF5-24C7-5A6B-63F148A977AA}"/>
               </a:ext>
             </a:extLst>
           </p:cNvPr>
@@ -13104,8 +13168,8 @@
         </p:blipFill>
         <p:spPr>
           <a:xfrm>
-            <a:off x="1676400" y="1202023"/>
-            <a:ext cx="5321300" cy="5321300"/>
+            <a:off x="1524000" y="1200122"/>
+            <a:ext cx="6320390" cy="5371969"/>
           </a:xfrm>
           <a:prstGeom prst="rect">
             <a:avLst/>
@@ -13115,7 +13179,7 @@
     </p:spTree>
     <p:extLst>
       <p:ext uri="{BB962C8B-B14F-4D97-AF65-F5344CB8AC3E}">
-        <p14:creationId xmlns:p14="http://schemas.microsoft.com/office/powerpoint/2010/main" val="4221772882"/>
+        <p14:creationId xmlns:p14="http://schemas.microsoft.com/office/powerpoint/2010/main" val="1200868996"/>
       </p:ext>
     </p:extLst>
   </p:cSld>
@@ -13289,46 +13353,54 @@
       </p:sp>
       <p:sp>
         <p:nvSpPr>
-          <p:cNvPr id="5" name="Title 1">
+          <p:cNvPr id="4" name="TextBox 3">
             <a:extLst>
               <a:ext uri="{FF2B5EF4-FFF2-40B4-BE49-F238E27FC236}">
-                <a16:creationId xmlns:a16="http://schemas.microsoft.com/office/drawing/2014/main" id="{0E6B41C0-0A87-4E79-E3F5-53E4965C5A22}"/>
+                <a16:creationId xmlns:a16="http://schemas.microsoft.com/office/drawing/2014/main" id="{C1539FA4-3B5C-AFA9-730B-E375CA55FB3C}"/>
               </a:ext>
             </a:extLst>
           </p:cNvPr>
-          <p:cNvSpPr>
-            <a:spLocks noGrp="1"/>
-          </p:cNvSpPr>
-          <p:nvPr>
-            <p:ph type="ctrTitle"/>
-          </p:nvPr>
-        </p:nvSpPr>
-        <p:spPr>
-          <a:xfrm>
-            <a:off x="2209800" y="396957"/>
-            <a:ext cx="6705600" cy="598962"/>
-          </a:xfrm>
-        </p:spPr>
-        <p:txBody>
-          <a:bodyPr>
-            <a:noAutofit/>
+          <p:cNvSpPr txBox="1"/>
+          <p:nvPr/>
+        </p:nvSpPr>
+        <p:spPr>
+          <a:xfrm>
+            <a:off x="1143000" y="559822"/>
+            <a:ext cx="7162800" cy="461665"/>
+          </a:xfrm>
+          <a:prstGeom prst="rect">
+            <a:avLst/>
+          </a:prstGeom>
+          <a:noFill/>
+        </p:spPr>
+        <p:txBody>
+          <a:bodyPr wrap="square">
+            <a:spAutoFit/>
           </a:bodyPr>
           <a:lstStyle/>
           <a:p>
             <a:r>
-              <a:rPr lang="en-US" b="0" dirty="0"/>
-              <a:t>deep clone a value (17.0.0)</a:t>
-            </a:r>
-            <a:endParaRPr lang="en-US" sz="4000" dirty="0"/>
+              <a:rPr lang="en-US" sz="2400" b="0" dirty="0"/>
+              <a:t>const { </a:t>
+            </a:r>
+            <a:r>
+              <a:rPr lang="en-US" sz="2400" b="0" dirty="0" err="1"/>
+              <a:t>setTimeout</a:t>
+            </a:r>
+            <a:r>
+              <a:rPr lang="en-US" sz="2400" b="0" dirty="0"/>
+              <a:t> } = require('timers/promises')</a:t>
+            </a:r>
+            <a:endParaRPr lang="en-IL" sz="2400" dirty="0"/>
           </a:p>
         </p:txBody>
       </p:sp>
       <p:pic>
         <p:nvPicPr>
-          <p:cNvPr id="8" name="Picture 7" descr="A picture containing text, person&#10;&#10;Description automatically generated">
+          <p:cNvPr id="9" name="Picture 8" descr="Graphical user interface, text, application&#10;&#10;Description automatically generated">
             <a:extLst>
               <a:ext uri="{FF2B5EF4-FFF2-40B4-BE49-F238E27FC236}">
-                <a16:creationId xmlns:a16="http://schemas.microsoft.com/office/drawing/2014/main" id="{39B6B651-1F37-9DAF-DC6C-5899D6F6D135}"/>
+                <a16:creationId xmlns:a16="http://schemas.microsoft.com/office/drawing/2014/main" id="{64C86849-9E36-2788-460E-6D8CBA8BA163}"/>
               </a:ext>
             </a:extLst>
           </p:cNvPr>
@@ -13351,8 +13423,8 @@
         </p:blipFill>
         <p:spPr>
           <a:xfrm>
-            <a:off x="1447800" y="1219200"/>
-            <a:ext cx="6400800" cy="5473700"/>
+            <a:off x="1676400" y="1202023"/>
+            <a:ext cx="5321300" cy="5321300"/>
           </a:xfrm>
           <a:prstGeom prst="rect">
             <a:avLst/>
@@ -13362,7 +13434,7 @@
     </p:spTree>
     <p:extLst>
       <p:ext uri="{BB962C8B-B14F-4D97-AF65-F5344CB8AC3E}">
-        <p14:creationId xmlns:p14="http://schemas.microsoft.com/office/powerpoint/2010/main" val="2637520472"/>
+        <p14:creationId xmlns:p14="http://schemas.microsoft.com/office/powerpoint/2010/main" val="4221772882"/>
       </p:ext>
     </p:extLst>
   </p:cSld>
@@ -13570,101 +13642,46 @@
           </a:p>
         </p:txBody>
       </p:sp>
-      <p:sp>
-        <p:nvSpPr>
-          <p:cNvPr id="3" name="TextBox 2">
+      <p:pic>
+        <p:nvPicPr>
+          <p:cNvPr id="8" name="Picture 7" descr="A picture containing text, person&#10;&#10;Description automatically generated">
             <a:extLst>
               <a:ext uri="{FF2B5EF4-FFF2-40B4-BE49-F238E27FC236}">
-                <a16:creationId xmlns:a16="http://schemas.microsoft.com/office/drawing/2014/main" id="{F4716F1D-3B4D-35AF-3DD9-E6EDA24CB30E}"/>
+                <a16:creationId xmlns:a16="http://schemas.microsoft.com/office/drawing/2014/main" id="{39B6B651-1F37-9DAF-DC6C-5899D6F6D135}"/>
               </a:ext>
             </a:extLst>
           </p:cNvPr>
-          <p:cNvSpPr txBox="1"/>
-          <p:nvPr/>
-        </p:nvSpPr>
-        <p:spPr>
-          <a:xfrm>
-            <a:off x="2200656" y="2217644"/>
-            <a:ext cx="4953000" cy="646331"/>
+          <p:cNvPicPr>
+            <a:picLocks noChangeAspect="1"/>
+          </p:cNvPicPr>
+          <p:nvPr/>
+        </p:nvPicPr>
+        <p:blipFill>
+          <a:blip r:embed="rId3">
+            <a:extLst>
+              <a:ext uri="{28A0092B-C50C-407E-A947-70E740481C1C}">
+                <a14:useLocalDpi xmlns:a14="http://schemas.microsoft.com/office/drawing/2010/main" val="0"/>
+              </a:ext>
+            </a:extLst>
+          </a:blip>
+          <a:stretch>
+            <a:fillRect/>
+          </a:stretch>
+        </p:blipFill>
+        <p:spPr>
+          <a:xfrm>
+            <a:off x="1447800" y="1219200"/>
+            <a:ext cx="6400800" cy="5473700"/>
           </a:xfrm>
           <a:prstGeom prst="rect">
             <a:avLst/>
           </a:prstGeom>
-          <a:noFill/>
-        </p:spPr>
-        <p:txBody>
-          <a:bodyPr wrap="square">
-            <a:spAutoFit/>
-          </a:bodyPr>
-          <a:lstStyle/>
-          <a:p>
-            <a:r>
-              <a:rPr lang="en-US" b="1" dirty="0">
-                <a:effectLst/>
-              </a:rPr>
-              <a:t>const</a:t>
-            </a:r>
-            <a:r>
-              <a:rPr lang="en-US" dirty="0"/>
-              <a:t> obj = {id: </a:t>
-            </a:r>
-            <a:r>
-              <a:rPr lang="en-US" dirty="0">
-                <a:solidFill>
-                  <a:srgbClr val="880000"/>
-                </a:solidFill>
-                <a:effectLst/>
-              </a:rPr>
-              <a:t>'e1fd960b'</a:t>
-            </a:r>
-            <a:r>
-              <a:rPr lang="en-US" dirty="0"/>
-              <a:t>, values: [</a:t>
-            </a:r>
-            <a:r>
-              <a:rPr lang="en-US" dirty="0">
-                <a:solidFill>
-                  <a:srgbClr val="880000"/>
-                </a:solidFill>
-                <a:effectLst/>
-              </a:rPr>
-              <a:t>'a'</a:t>
-            </a:r>
-            <a:r>
-              <a:rPr lang="en-US" dirty="0"/>
-              <a:t>, </a:t>
-            </a:r>
-            <a:r>
-              <a:rPr lang="en-US" dirty="0">
-                <a:solidFill>
-                  <a:srgbClr val="880000"/>
-                </a:solidFill>
-                <a:effectLst/>
-              </a:rPr>
-              <a:t>'b'</a:t>
-            </a:r>
-            <a:r>
-              <a:rPr lang="en-US" dirty="0"/>
-              <a:t>]}; </a:t>
-            </a:r>
-            <a:r>
-              <a:rPr lang="en-US" b="1" dirty="0">
-                <a:effectLst/>
-              </a:rPr>
-              <a:t>const</a:t>
-            </a:r>
-            <a:r>
-              <a:rPr lang="en-US" dirty="0"/>
-              <a:t> clone1 = {...obj};</a:t>
-            </a:r>
-            <a:endParaRPr lang="en-IL" dirty="0"/>
-          </a:p>
-        </p:txBody>
-      </p:sp>
+        </p:spPr>
+      </p:pic>
     </p:spTree>
     <p:extLst>
       <p:ext uri="{BB962C8B-B14F-4D97-AF65-F5344CB8AC3E}">
-        <p14:creationId xmlns:p14="http://schemas.microsoft.com/office/powerpoint/2010/main" val="224850387"/>
+        <p14:creationId xmlns:p14="http://schemas.microsoft.com/office/powerpoint/2010/main" val="2637520472"/>
       </p:ext>
     </p:extLst>
   </p:cSld>
@@ -13854,7 +13871,7 @@
         </p:nvSpPr>
         <p:spPr>
           <a:xfrm>
-            <a:off x="1345692" y="1386365"/>
+            <a:off x="2209800" y="396957"/>
             <a:ext cx="6705600" cy="598962"/>
           </a:xfrm>
         </p:spPr>
@@ -13865,63 +13882,108 @@
           <a:lstStyle/>
           <a:p>
             <a:r>
-              <a:rPr lang="en-US" dirty="0" err="1"/>
-              <a:t>String.prototype.replaceAll</a:t>
+              <a:rPr lang="en-US" b="0" dirty="0"/>
+              <a:t>deep clone a value (17.0.0)</a:t>
+            </a:r>
+            <a:endParaRPr lang="en-US" sz="4000" dirty="0"/>
+          </a:p>
+        </p:txBody>
+      </p:sp>
+      <p:sp>
+        <p:nvSpPr>
+          <p:cNvPr id="3" name="TextBox 2">
+            <a:extLst>
+              <a:ext uri="{FF2B5EF4-FFF2-40B4-BE49-F238E27FC236}">
+                <a16:creationId xmlns:a16="http://schemas.microsoft.com/office/drawing/2014/main" id="{F4716F1D-3B4D-35AF-3DD9-E6EDA24CB30E}"/>
+              </a:ext>
+            </a:extLst>
+          </p:cNvPr>
+          <p:cNvSpPr txBox="1"/>
+          <p:nvPr/>
+        </p:nvSpPr>
+        <p:spPr>
+          <a:xfrm>
+            <a:off x="2200656" y="2217644"/>
+            <a:ext cx="4953000" cy="646331"/>
+          </a:xfrm>
+          <a:prstGeom prst="rect">
+            <a:avLst/>
+          </a:prstGeom>
+          <a:noFill/>
+        </p:spPr>
+        <p:txBody>
+          <a:bodyPr wrap="square">
+            <a:spAutoFit/>
+          </a:bodyPr>
+          <a:lstStyle/>
+          <a:p>
+            <a:r>
+              <a:rPr lang="en-US" b="1" dirty="0">
+                <a:effectLst/>
+              </a:rPr>
+              <a:t>const</a:t>
             </a:r>
             <a:r>
               <a:rPr lang="en-US" dirty="0"/>
-              <a:t>()</a:t>
-            </a:r>
-            <a:br>
+              <a:t> obj = {id: </a:t>
+            </a:r>
+            <a:r>
+              <a:rPr lang="en-US" dirty="0">
+                <a:solidFill>
+                  <a:srgbClr val="880000"/>
+                </a:solidFill>
+                <a:effectLst/>
+              </a:rPr>
+              <a:t>'e1fd960b'</a:t>
+            </a:r>
+            <a:r>
               <a:rPr lang="en-US" dirty="0"/>
-            </a:br>
-            <a:br>
-              <a:rPr lang="en-US" b="0" dirty="0"/>
-            </a:br>
-            <a:endParaRPr lang="en-US" b="0" dirty="0"/>
-          </a:p>
-        </p:txBody>
-      </p:sp>
-      <p:pic>
-        <p:nvPicPr>
-          <p:cNvPr id="3" name="Picture 2" descr="Graphical user interface, text&#10;&#10;Description automatically generated">
-            <a:extLst>
-              <a:ext uri="{FF2B5EF4-FFF2-40B4-BE49-F238E27FC236}">
-                <a16:creationId xmlns:a16="http://schemas.microsoft.com/office/drawing/2014/main" id="{78963C68-95CB-403F-CFCC-F173174BE956}"/>
-              </a:ext>
-            </a:extLst>
-          </p:cNvPr>
-          <p:cNvPicPr>
-            <a:picLocks noChangeAspect="1"/>
-          </p:cNvPicPr>
-          <p:nvPr/>
-        </p:nvPicPr>
-        <p:blipFill>
-          <a:blip r:embed="rId3">
-            <a:extLst>
-              <a:ext uri="{28A0092B-C50C-407E-A947-70E740481C1C}">
-                <a14:useLocalDpi xmlns:a14="http://schemas.microsoft.com/office/drawing/2010/main" val="0"/>
-              </a:ext>
-            </a:extLst>
-          </a:blip>
-          <a:stretch>
-            <a:fillRect/>
-          </a:stretch>
-        </p:blipFill>
-        <p:spPr>
-          <a:xfrm>
-            <a:off x="1549908" y="1619091"/>
-            <a:ext cx="6501384" cy="4114800"/>
-          </a:xfrm>
-          <a:prstGeom prst="rect">
-            <a:avLst/>
-          </a:prstGeom>
-        </p:spPr>
-      </p:pic>
+              <a:t>, values: [</a:t>
+            </a:r>
+            <a:r>
+              <a:rPr lang="en-US" dirty="0">
+                <a:solidFill>
+                  <a:srgbClr val="880000"/>
+                </a:solidFill>
+                <a:effectLst/>
+              </a:rPr>
+              <a:t>'a'</a:t>
+            </a:r>
+            <a:r>
+              <a:rPr lang="en-US" dirty="0"/>
+              <a:t>, </a:t>
+            </a:r>
+            <a:r>
+              <a:rPr lang="en-US" dirty="0">
+                <a:solidFill>
+                  <a:srgbClr val="880000"/>
+                </a:solidFill>
+                <a:effectLst/>
+              </a:rPr>
+              <a:t>'b'</a:t>
+            </a:r>
+            <a:r>
+              <a:rPr lang="en-US" dirty="0"/>
+              <a:t>]}; </a:t>
+            </a:r>
+            <a:r>
+              <a:rPr lang="en-US" b="1" dirty="0">
+                <a:effectLst/>
+              </a:rPr>
+              <a:t>const</a:t>
+            </a:r>
+            <a:r>
+              <a:rPr lang="en-US" dirty="0"/>
+              <a:t> clone1 = {...obj};</a:t>
+            </a:r>
+            <a:endParaRPr lang="en-IL" dirty="0"/>
+          </a:p>
+        </p:txBody>
+      </p:sp>
     </p:spTree>
     <p:extLst>
       <p:ext uri="{BB962C8B-B14F-4D97-AF65-F5344CB8AC3E}">
-        <p14:creationId xmlns:p14="http://schemas.microsoft.com/office/powerpoint/2010/main" val="2262117460"/>
+        <p14:creationId xmlns:p14="http://schemas.microsoft.com/office/powerpoint/2010/main" val="224850387"/>
       </p:ext>
     </p:extLst>
   </p:cSld>
@@ -14359,14 +14421,18 @@
           <a:lstStyle/>
           <a:p>
             <a:r>
+              <a:rPr lang="en-US" dirty="0" err="1"/>
+              <a:t>String.prototype.replaceAll</a:t>
+            </a:r>
+            <a:r>
               <a:rPr lang="en-US" dirty="0"/>
-              <a:t>Finding elements from the end </a:t>
+              <a:t>()</a:t>
             </a:r>
             <a:br>
               <a:rPr lang="en-US" dirty="0"/>
             </a:br>
             <a:br>
-              <a:rPr lang="en-US" dirty="0"/>
+              <a:rPr lang="en-US" b="0" dirty="0"/>
             </a:br>
             <a:endParaRPr lang="en-US" b="0" dirty="0"/>
           </a:p>
@@ -14374,10 +14440,10 @@
       </p:sp>
       <p:pic>
         <p:nvPicPr>
-          <p:cNvPr id="7" name="Picture 6" descr="Graphical user interface, text&#10;&#10;Description automatically generated">
+          <p:cNvPr id="3" name="Picture 2" descr="Graphical user interface, text&#10;&#10;Description automatically generated">
             <a:extLst>
               <a:ext uri="{FF2B5EF4-FFF2-40B4-BE49-F238E27FC236}">
-                <a16:creationId xmlns:a16="http://schemas.microsoft.com/office/drawing/2014/main" id="{AFFC19AD-2982-41AA-3504-7D1BB18E735A}"/>
+                <a16:creationId xmlns:a16="http://schemas.microsoft.com/office/drawing/2014/main" id="{78963C68-95CB-403F-CFCC-F173174BE956}"/>
               </a:ext>
             </a:extLst>
           </p:cNvPr>
@@ -14400,8 +14466,8 @@
         </p:blipFill>
         <p:spPr>
           <a:xfrm>
-            <a:off x="1447800" y="1530350"/>
-            <a:ext cx="6096000" cy="3797300"/>
+            <a:off x="1549908" y="1619091"/>
+            <a:ext cx="6501384" cy="4114800"/>
           </a:xfrm>
           <a:prstGeom prst="rect">
             <a:avLst/>
@@ -14411,7 +14477,7 @@
     </p:spTree>
     <p:extLst>
       <p:ext uri="{BB962C8B-B14F-4D97-AF65-F5344CB8AC3E}">
-        <p14:creationId xmlns:p14="http://schemas.microsoft.com/office/powerpoint/2010/main" val="1422511446"/>
+        <p14:creationId xmlns:p14="http://schemas.microsoft.com/office/powerpoint/2010/main" val="2262117460"/>
       </p:ext>
     </p:extLst>
   </p:cSld>
@@ -14601,7 +14667,7 @@
         </p:nvSpPr>
         <p:spPr>
           <a:xfrm>
-            <a:off x="1752600" y="491174"/>
+            <a:off x="1345692" y="1386365"/>
             <a:ext cx="6705600" cy="598962"/>
           </a:xfrm>
         </p:spPr>
@@ -14611,21 +14677,60 @@
           </a:bodyPr>
           <a:lstStyle/>
           <a:p>
-            <a:pPr marL="285750" indent="-285750">
-              <a:buFont typeface="Arial" panose="020B0604020202020204" pitchFamily="34" charset="0"/>
-              <a:buChar char="•"/>
-            </a:pPr>
-            <a:r>
-              <a:rPr lang="en-IL" dirty="0"/>
-              <a:t>Cool Kids Syntax</a:t>
-            </a:r>
-          </a:p>
-        </p:txBody>
-      </p:sp>
+            <a:r>
+              <a:rPr lang="en-US" dirty="0"/>
+              <a:t>Finding elements from the end </a:t>
+            </a:r>
+            <a:br>
+              <a:rPr lang="en-US" dirty="0"/>
+            </a:br>
+            <a:br>
+              <a:rPr lang="en-US" dirty="0"/>
+            </a:br>
+            <a:endParaRPr lang="en-US" b="0" dirty="0"/>
+          </a:p>
+        </p:txBody>
+      </p:sp>
+      <p:pic>
+        <p:nvPicPr>
+          <p:cNvPr id="7" name="Picture 6" descr="Graphical user interface, text&#10;&#10;Description automatically generated">
+            <a:extLst>
+              <a:ext uri="{FF2B5EF4-FFF2-40B4-BE49-F238E27FC236}">
+                <a16:creationId xmlns:a16="http://schemas.microsoft.com/office/drawing/2014/main" id="{AFFC19AD-2982-41AA-3504-7D1BB18E735A}"/>
+              </a:ext>
+            </a:extLst>
+          </p:cNvPr>
+          <p:cNvPicPr>
+            <a:picLocks noChangeAspect="1"/>
+          </p:cNvPicPr>
+          <p:nvPr/>
+        </p:nvPicPr>
+        <p:blipFill>
+          <a:blip r:embed="rId3">
+            <a:extLst>
+              <a:ext uri="{28A0092B-C50C-407E-A947-70E740481C1C}">
+                <a14:useLocalDpi xmlns:a14="http://schemas.microsoft.com/office/drawing/2010/main" val="0"/>
+              </a:ext>
+            </a:extLst>
+          </a:blip>
+          <a:stretch>
+            <a:fillRect/>
+          </a:stretch>
+        </p:blipFill>
+        <p:spPr>
+          <a:xfrm>
+            <a:off x="1447800" y="1530350"/>
+            <a:ext cx="6096000" cy="3797300"/>
+          </a:xfrm>
+          <a:prstGeom prst="rect">
+            <a:avLst/>
+          </a:prstGeom>
+        </p:spPr>
+      </p:pic>
     </p:spTree>
     <p:extLst>
       <p:ext uri="{BB962C8B-B14F-4D97-AF65-F5344CB8AC3E}">
-        <p14:creationId xmlns:p14="http://schemas.microsoft.com/office/powerpoint/2010/main" val="2577453705"/>
+        <p14:creationId xmlns:p14="http://schemas.microsoft.com/office/powerpoint/2010/main" val="1422511446"/>
       </p:ext>
     </p:extLst>
   </p:cSld>
@@ -14703,41 +14808,6 @@
       </p:sp>
       <p:sp>
         <p:nvSpPr>
-          <p:cNvPr id="7" name="Title 1">
-            <a:extLst>
-              <a:ext uri="{FF2B5EF4-FFF2-40B4-BE49-F238E27FC236}">
-                <a16:creationId xmlns:a16="http://schemas.microsoft.com/office/drawing/2014/main" id="{54C561DF-0CCA-BAA8-EEF9-9C112E85285D}"/>
-              </a:ext>
-            </a:extLst>
-          </p:cNvPr>
-          <p:cNvSpPr>
-            <a:spLocks noGrp="1"/>
-          </p:cNvSpPr>
-          <p:nvPr>
-            <p:ph type="ctrTitle"/>
-          </p:nvPr>
-        </p:nvSpPr>
-        <p:spPr>
-          <a:xfrm>
-            <a:off x="1420368" y="384765"/>
-            <a:ext cx="6705600" cy="598962"/>
-          </a:xfrm>
-        </p:spPr>
-        <p:txBody>
-          <a:bodyPr>
-            <a:noAutofit/>
-          </a:bodyPr>
-          <a:lstStyle/>
-          <a:p>
-            <a:r>
-              <a:rPr lang="en-US" sz="3600" dirty="0"/>
-              <a:t>Happy Coding ..</a:t>
-            </a:r>
-          </a:p>
-        </p:txBody>
-      </p:sp>
-      <p:sp>
-        <p:nvSpPr>
           <p:cNvPr id="10" name="Title 1">
             <a:extLst>
               <a:ext uri="{FF2B5EF4-FFF2-40B4-BE49-F238E27FC236}">
@@ -14752,8 +14822,8 @@
         </p:nvSpPr>
         <p:spPr>
           <a:xfrm>
-            <a:off x="1066800" y="5590823"/>
-            <a:ext cx="8686800" cy="825819"/>
+            <a:off x="1447800" y="3676491"/>
+            <a:ext cx="6705600" cy="2895600"/>
           </a:xfrm>
           <a:prstGeom prst="rect">
             <a:avLst/>
@@ -14780,43 +14850,7 @@
             </a:lvl1pPr>
           </a:lstStyle>
           <a:p>
-            <a:r>
-              <a:rPr lang="en-US" sz="2400" dirty="0">
-                <a:hlinkClick r:id="rId3"/>
-              </a:rPr>
-              <a:t>https://</a:t>
-            </a:r>
-            <a:r>
-              <a:rPr lang="en-US" sz="2400" dirty="0" err="1">
-                <a:hlinkClick r:id="rId3"/>
-              </a:rPr>
-              <a:t>github.com</a:t>
-            </a:r>
-            <a:r>
-              <a:rPr lang="en-US" sz="2400" dirty="0">
-                <a:hlinkClick r:id="rId3"/>
-              </a:rPr>
-              <a:t>/</a:t>
-            </a:r>
-            <a:r>
-              <a:rPr lang="en-US" sz="2400" dirty="0" err="1">
-                <a:hlinkClick r:id="rId3"/>
-              </a:rPr>
-              <a:t>ntedgi</a:t>
-            </a:r>
-            <a:r>
-              <a:rPr lang="en-US" sz="2400" dirty="0">
-                <a:hlinkClick r:id="rId3"/>
-              </a:rPr>
-              <a:t>/Demand-</a:t>
-            </a:r>
-            <a:r>
-              <a:rPr lang="en-US" sz="2400" dirty="0" err="1">
-                <a:hlinkClick r:id="rId3"/>
-              </a:rPr>
-              <a:t>TechTalks</a:t>
-            </a:r>
-            <a:endParaRPr lang="en-US" sz="2400" dirty="0"/>
+            <a:endParaRPr lang="en-US" sz="4000" dirty="0"/>
           </a:p>
         </p:txBody>
       </p:sp>
@@ -14868,60 +14902,213 @@
           </a:p>
         </p:txBody>
       </p:sp>
-      <p:pic>
-        <p:nvPicPr>
-          <p:cNvPr id="3" name="Picture 2">
+      <p:sp>
+        <p:nvSpPr>
+          <p:cNvPr id="5" name="Title 1">
             <a:extLst>
               <a:ext uri="{FF2B5EF4-FFF2-40B4-BE49-F238E27FC236}">
-                <a16:creationId xmlns:a16="http://schemas.microsoft.com/office/drawing/2014/main" id="{D77048B2-ABBA-8005-9BB6-31913290A4EE}"/>
+                <a16:creationId xmlns:a16="http://schemas.microsoft.com/office/drawing/2014/main" id="{0E6B41C0-0A87-4E79-E3F5-53E4965C5A22}"/>
               </a:ext>
             </a:extLst>
           </p:cNvPr>
-          <p:cNvPicPr>
-            <a:picLocks noChangeAspect="1"/>
-          </p:cNvPicPr>
-          <p:nvPr/>
-        </p:nvPicPr>
-        <p:blipFill>
-          <a:blip r:embed="rId4">
-            <a:extLst>
-              <a:ext uri="{28A0092B-C50C-407E-A947-70E740481C1C}">
-                <a14:useLocalDpi xmlns:a14="http://schemas.microsoft.com/office/drawing/2010/main" val="0"/>
-              </a:ext>
-            </a:extLst>
-          </a:blip>
-          <a:stretch>
-            <a:fillRect/>
-          </a:stretch>
-        </p:blipFill>
-        <p:spPr>
-          <a:xfrm>
-            <a:off x="1801368" y="1111729"/>
-            <a:ext cx="5943600" cy="4177342"/>
+          <p:cNvSpPr>
+            <a:spLocks noGrp="1"/>
+          </p:cNvSpPr>
+          <p:nvPr>
+            <p:ph type="ctrTitle"/>
+          </p:nvPr>
+        </p:nvSpPr>
+        <p:spPr>
+          <a:xfrm>
+            <a:off x="1828800" y="843519"/>
+            <a:ext cx="7620000" cy="598962"/>
+          </a:xfrm>
+        </p:spPr>
+        <p:txBody>
+          <a:bodyPr>
+            <a:noAutofit/>
+          </a:bodyPr>
+          <a:lstStyle/>
+          <a:p>
+            <a:r>
+              <a:rPr lang="en-IL" dirty="0"/>
+              <a:t>Not coveerd But worth reading</a:t>
+            </a:r>
+            <a:br>
+              <a:rPr lang="en-IL" dirty="0"/>
+            </a:br>
+            <a:endParaRPr lang="en-IL" dirty="0"/>
+          </a:p>
+        </p:txBody>
+      </p:sp>
+      <p:sp>
+        <p:nvSpPr>
+          <p:cNvPr id="2" name="TextBox 1">
+            <a:extLst>
+              <a:ext uri="{FF2B5EF4-FFF2-40B4-BE49-F238E27FC236}">
+                <a16:creationId xmlns:a16="http://schemas.microsoft.com/office/drawing/2014/main" id="{1198E143-DCF0-C177-49B9-CB2C25A23E47}"/>
+              </a:ext>
+            </a:extLst>
+          </p:cNvPr>
+          <p:cNvSpPr txBox="1"/>
+          <p:nvPr/>
+        </p:nvSpPr>
+        <p:spPr>
+          <a:xfrm>
+            <a:off x="783336" y="1000035"/>
+            <a:ext cx="6553200" cy="1200329"/>
           </a:xfrm>
           <a:prstGeom prst="rect">
             <a:avLst/>
           </a:prstGeom>
-        </p:spPr>
-      </p:pic>
+          <a:noFill/>
+        </p:spPr>
+        <p:txBody>
+          <a:bodyPr wrap="square" rtlCol="0">
+            <a:spAutoFit/>
+          </a:bodyPr>
+          <a:lstStyle/>
+          <a:p>
+            <a:r>
+              <a:rPr lang="en-US" dirty="0">
+                <a:hlinkClick r:id="rId3"/>
+              </a:rPr>
+              <a:t>Web Streams API (experimental)</a:t>
+            </a:r>
+            <a:br>
+              <a:rPr lang="en-US" dirty="0"/>
+            </a:br>
+            <a:r>
+              <a:rPr lang="en-US" dirty="0">
+                <a:hlinkClick r:id="rId4"/>
+              </a:rPr>
+              <a:t>BroadcastChannel</a:t>
+            </a:r>
+            <a:r>
+              <a:rPr lang="en-US" dirty="0"/>
+              <a:t> (worker threads)</a:t>
+            </a:r>
+            <a:br>
+              <a:rPr lang="en-US" dirty="0"/>
+            </a:br>
+            <a:r>
+              <a:rPr lang="en-US" dirty="0"/>
+              <a:t>new operators  </a:t>
+            </a:r>
+            <a:r>
+              <a:rPr lang="en-IL" dirty="0"/>
+              <a:t>&amp;&amp;=, ||=,  ??= </a:t>
+            </a:r>
+            <a:endParaRPr lang="en-US" dirty="0"/>
+          </a:p>
+          <a:p>
+            <a:endParaRPr lang="en-US" dirty="0"/>
+          </a:p>
+        </p:txBody>
+      </p:sp>
+      <p:sp>
+        <p:nvSpPr>
+          <p:cNvPr id="3" name="TextBox 2">
+            <a:extLst>
+              <a:ext uri="{FF2B5EF4-FFF2-40B4-BE49-F238E27FC236}">
+                <a16:creationId xmlns:a16="http://schemas.microsoft.com/office/drawing/2014/main" id="{0A9575F6-F67E-6303-A042-A89A697B5708}"/>
+              </a:ext>
+            </a:extLst>
+          </p:cNvPr>
+          <p:cNvSpPr txBox="1"/>
+          <p:nvPr/>
+        </p:nvSpPr>
+        <p:spPr>
+          <a:xfrm>
+            <a:off x="457200" y="2187476"/>
+            <a:ext cx="8839200" cy="2308324"/>
+          </a:xfrm>
+          <a:prstGeom prst="rect">
+            <a:avLst/>
+          </a:prstGeom>
+          <a:noFill/>
+        </p:spPr>
+        <p:txBody>
+          <a:bodyPr wrap="square" rtlCol="0">
+            <a:spAutoFit/>
+          </a:bodyPr>
+          <a:lstStyle/>
+          <a:p>
+            <a:pPr marL="285750" indent="-285750">
+              <a:buFont typeface="Arial" panose="020B0604020202020204" pitchFamily="34" charset="0"/>
+              <a:buChar char="•"/>
+            </a:pPr>
+            <a:r>
+              <a:rPr lang="en-US" dirty="0">
+                <a:hlinkClick r:id="rId5"/>
+              </a:rPr>
+              <a:t>https://betterprogramming.pub/whats-new-in-node-js-15-fc24e87e2590</a:t>
+            </a:r>
+            <a:br>
+              <a:rPr lang="en-US" dirty="0"/>
+            </a:br>
+            <a:endParaRPr lang="en-US" dirty="0"/>
+          </a:p>
+          <a:p>
+            <a:pPr marL="285750" indent="-285750">
+              <a:buFont typeface="Arial" panose="020B0604020202020204" pitchFamily="34" charset="0"/>
+              <a:buChar char="•"/>
+            </a:pPr>
+            <a:r>
+              <a:rPr lang="en-US" dirty="0">
+                <a:hlinkClick r:id="rId6"/>
+              </a:rPr>
+              <a:t>https://betterprogramming.pub/a-quick-look-at-the-node-js-16-features-d616e8b2f29</a:t>
+            </a:r>
+            <a:endParaRPr lang="en-IL" dirty="0"/>
+          </a:p>
+          <a:p>
+            <a:endParaRPr lang="en-US" dirty="0">
+              <a:hlinkClick r:id="rId7"/>
+            </a:endParaRPr>
+          </a:p>
+          <a:p>
+            <a:pPr marL="285750" indent="-285750">
+              <a:buFont typeface="Arial" panose="020B0604020202020204" pitchFamily="34" charset="0"/>
+              <a:buChar char="•"/>
+            </a:pPr>
+            <a:r>
+              <a:rPr lang="en-US" dirty="0">
+                <a:hlinkClick r:id="rId7"/>
+              </a:rPr>
+              <a:t>https://betterprogramming.pub/3-major-features-of-node-js-17-4bee7135df02</a:t>
+            </a:r>
+            <a:br>
+              <a:rPr lang="en-US" dirty="0"/>
+            </a:br>
+            <a:endParaRPr lang="en-US" dirty="0"/>
+          </a:p>
+          <a:p>
+            <a:pPr marL="285750" indent="-285750">
+              <a:buFont typeface="Arial" panose="020B0604020202020204" pitchFamily="34" charset="0"/>
+              <a:buChar char="•"/>
+            </a:pPr>
+            <a:r>
+              <a:rPr lang="en-US" dirty="0">
+                <a:hlinkClick r:id="rId8"/>
+              </a:rPr>
+              <a:t>https://betterprogramming.pub/5-major-features-of-node-js-18-5f4a164cc9fc</a:t>
+            </a:r>
+            <a:endParaRPr lang="en-IL" dirty="0"/>
+          </a:p>
+        </p:txBody>
+      </p:sp>
     </p:spTree>
     <p:extLst>
       <p:ext uri="{BB962C8B-B14F-4D97-AF65-F5344CB8AC3E}">
-        <p14:creationId xmlns:p14="http://schemas.microsoft.com/office/powerpoint/2010/main" val="912269718"/>
+        <p14:creationId xmlns:p14="http://schemas.microsoft.com/office/powerpoint/2010/main" val="2577453705"/>
       </p:ext>
     </p:extLst>
   </p:cSld>
   <p:clrMapOvr>
     <a:masterClrMapping/>
   </p:clrMapOvr>
-  <mc:AlternateContent xmlns:mc="http://schemas.openxmlformats.org/markup-compatibility/2006">
-    <mc:Choice xmlns:p14="http://schemas.microsoft.com/office/powerpoint/2010/main" Requires="p14">
-      <p:transition p14:dur="0" advClick="0"/>
-    </mc:Choice>
-    <mc:Fallback>
-      <p:transition advClick="0"/>
-    </mc:Fallback>
-  </mc:AlternateContent>
+  <p:transition spd="med" advClick="0"/>
 </p:sld>
 </file>
 
@@ -15196,6 +15383,295 @@
     </p:spTree>
     <p:extLst>
       <p:ext uri="{BB962C8B-B14F-4D97-AF65-F5344CB8AC3E}">
+        <p14:creationId xmlns:p14="http://schemas.microsoft.com/office/powerpoint/2010/main" val="912269718"/>
+      </p:ext>
+    </p:extLst>
+  </p:cSld>
+  <p:clrMapOvr>
+    <a:masterClrMapping/>
+  </p:clrMapOvr>
+  <mc:AlternateContent xmlns:mc="http://schemas.openxmlformats.org/markup-compatibility/2006" xmlns:p14="http://schemas.microsoft.com/office/powerpoint/2010/main">
+    <mc:Choice Requires="p14">
+      <p:transition p14:dur="0" advClick="0"/>
+    </mc:Choice>
+    <mc:Fallback xmlns="">
+      <p:transition advClick="0"/>
+    </mc:Fallback>
+  </mc:AlternateContent>
+</p:sld>
+</file>
+
+<file path=ppt/slides/slide34.xml><?xml version="1.0" encoding="utf-8"?>
+<p:sld xmlns:a="http://schemas.openxmlformats.org/drawingml/2006/main" xmlns:r="http://schemas.openxmlformats.org/officeDocument/2006/relationships" xmlns:p="http://schemas.openxmlformats.org/presentationml/2006/main">
+  <p:cSld>
+    <p:spTree>
+      <p:nvGrpSpPr>
+        <p:cNvPr id="1" name=""/>
+        <p:cNvGrpSpPr/>
+        <p:nvPr/>
+      </p:nvGrpSpPr>
+      <p:grpSpPr>
+        <a:xfrm>
+          <a:off x="0" y="0"/>
+          <a:ext cx="0" cy="0"/>
+          <a:chOff x="0" y="0"/>
+          <a:chExt cx="0" cy="0"/>
+        </a:xfrm>
+      </p:grpSpPr>
+      <p:sp>
+        <p:nvSpPr>
+          <p:cNvPr id="12" name="Title 1">
+            <a:extLst>
+              <a:ext uri="{FF2B5EF4-FFF2-40B4-BE49-F238E27FC236}">
+                <a16:creationId xmlns:a16="http://schemas.microsoft.com/office/drawing/2014/main" id="{10FA0667-D2F1-61CF-06C4-CF76375845F1}"/>
+              </a:ext>
+            </a:extLst>
+          </p:cNvPr>
+          <p:cNvSpPr txBox="1">
+            <a:spLocks/>
+          </p:cNvSpPr>
+          <p:nvPr/>
+        </p:nvSpPr>
+        <p:spPr>
+          <a:xfrm>
+            <a:off x="1752600" y="1447800"/>
+            <a:ext cx="6705600" cy="2895600"/>
+          </a:xfrm>
+          <a:prstGeom prst="rect">
+            <a:avLst/>
+          </a:prstGeom>
+        </p:spPr>
+        <p:txBody>
+          <a:bodyPr vert="horz" anchor="b">
+            <a:noAutofit/>
+          </a:bodyPr>
+          <a:lstStyle>
+            <a:lvl1pPr algn="l" rtl="0" eaLnBrk="1" latinLnBrk="0" hangingPunct="1">
+              <a:spcBef>
+                <a:spcPct val="0"/>
+              </a:spcBef>
+              <a:buNone/>
+              <a:defRPr kumimoji="0" sz="3000" b="1" kern="1200" cap="small" baseline="0">
+                <a:solidFill>
+                  <a:schemeClr val="tx2"/>
+                </a:solidFill>
+                <a:latin typeface="+mj-lt"/>
+                <a:ea typeface="+mj-ea"/>
+                <a:cs typeface="+mj-cs"/>
+              </a:defRPr>
+            </a:lvl1pPr>
+          </a:lstStyle>
+          <a:p>
+            <a:endParaRPr lang="en-US" sz="4000" dirty="0"/>
+          </a:p>
+        </p:txBody>
+      </p:sp>
+      <p:sp>
+        <p:nvSpPr>
+          <p:cNvPr id="7" name="Title 1">
+            <a:extLst>
+              <a:ext uri="{FF2B5EF4-FFF2-40B4-BE49-F238E27FC236}">
+                <a16:creationId xmlns:a16="http://schemas.microsoft.com/office/drawing/2014/main" id="{54C561DF-0CCA-BAA8-EEF9-9C112E85285D}"/>
+              </a:ext>
+            </a:extLst>
+          </p:cNvPr>
+          <p:cNvSpPr>
+            <a:spLocks noGrp="1"/>
+          </p:cNvSpPr>
+          <p:nvPr>
+            <p:ph type="ctrTitle"/>
+          </p:nvPr>
+        </p:nvSpPr>
+        <p:spPr>
+          <a:xfrm>
+            <a:off x="1420368" y="384765"/>
+            <a:ext cx="6705600" cy="598962"/>
+          </a:xfrm>
+        </p:spPr>
+        <p:txBody>
+          <a:bodyPr>
+            <a:noAutofit/>
+          </a:bodyPr>
+          <a:lstStyle/>
+          <a:p>
+            <a:r>
+              <a:rPr lang="en-US" sz="3600" dirty="0"/>
+              <a:t>Happy Coding ..</a:t>
+            </a:r>
+          </a:p>
+        </p:txBody>
+      </p:sp>
+      <p:sp>
+        <p:nvSpPr>
+          <p:cNvPr id="10" name="Title 1">
+            <a:extLst>
+              <a:ext uri="{FF2B5EF4-FFF2-40B4-BE49-F238E27FC236}">
+                <a16:creationId xmlns:a16="http://schemas.microsoft.com/office/drawing/2014/main" id="{4ADC928A-D86E-42D6-61DE-57118FEA7509}"/>
+              </a:ext>
+            </a:extLst>
+          </p:cNvPr>
+          <p:cNvSpPr txBox="1">
+            <a:spLocks/>
+          </p:cNvSpPr>
+          <p:nvPr/>
+        </p:nvSpPr>
+        <p:spPr>
+          <a:xfrm>
+            <a:off x="1066800" y="5590823"/>
+            <a:ext cx="8686800" cy="825819"/>
+          </a:xfrm>
+          <a:prstGeom prst="rect">
+            <a:avLst/>
+          </a:prstGeom>
+        </p:spPr>
+        <p:txBody>
+          <a:bodyPr vert="horz" anchor="b">
+            <a:noAutofit/>
+          </a:bodyPr>
+          <a:lstStyle>
+            <a:lvl1pPr algn="l" rtl="0" eaLnBrk="1" latinLnBrk="0" hangingPunct="1">
+              <a:spcBef>
+                <a:spcPct val="0"/>
+              </a:spcBef>
+              <a:buNone/>
+              <a:defRPr kumimoji="0" sz="3000" b="1" kern="1200" cap="small" baseline="0">
+                <a:solidFill>
+                  <a:schemeClr val="tx2"/>
+                </a:solidFill>
+                <a:latin typeface="+mj-lt"/>
+                <a:ea typeface="+mj-ea"/>
+                <a:cs typeface="+mj-cs"/>
+              </a:defRPr>
+            </a:lvl1pPr>
+          </a:lstStyle>
+          <a:p>
+            <a:r>
+              <a:rPr lang="en-US" sz="2400" dirty="0">
+                <a:hlinkClick r:id="rId3"/>
+              </a:rPr>
+              <a:t>https://</a:t>
+            </a:r>
+            <a:r>
+              <a:rPr lang="en-US" sz="2400" dirty="0" err="1">
+                <a:hlinkClick r:id="rId3"/>
+              </a:rPr>
+              <a:t>github.com</a:t>
+            </a:r>
+            <a:r>
+              <a:rPr lang="en-US" sz="2400" dirty="0">
+                <a:hlinkClick r:id="rId3"/>
+              </a:rPr>
+              <a:t>/</a:t>
+            </a:r>
+            <a:r>
+              <a:rPr lang="en-US" sz="2400" dirty="0" err="1">
+                <a:hlinkClick r:id="rId3"/>
+              </a:rPr>
+              <a:t>ntedgi</a:t>
+            </a:r>
+            <a:r>
+              <a:rPr lang="en-US" sz="2400" dirty="0">
+                <a:hlinkClick r:id="rId3"/>
+              </a:rPr>
+              <a:t>/Demand-</a:t>
+            </a:r>
+            <a:r>
+              <a:rPr lang="en-US" sz="2400" dirty="0" err="1">
+                <a:hlinkClick r:id="rId3"/>
+              </a:rPr>
+              <a:t>TechTalks</a:t>
+            </a:r>
+            <a:endParaRPr lang="en-US" sz="2400" dirty="0"/>
+          </a:p>
+        </p:txBody>
+      </p:sp>
+      <p:sp>
+        <p:nvSpPr>
+          <p:cNvPr id="11" name="Title 1">
+            <a:extLst>
+              <a:ext uri="{FF2B5EF4-FFF2-40B4-BE49-F238E27FC236}">
+                <a16:creationId xmlns:a16="http://schemas.microsoft.com/office/drawing/2014/main" id="{3282A2DD-3CE3-2A87-5E0C-0A46F153DF07}"/>
+              </a:ext>
+            </a:extLst>
+          </p:cNvPr>
+          <p:cNvSpPr txBox="1">
+            <a:spLocks/>
+          </p:cNvSpPr>
+          <p:nvPr/>
+        </p:nvSpPr>
+        <p:spPr>
+          <a:xfrm>
+            <a:off x="2057400" y="1752600"/>
+            <a:ext cx="6705600" cy="2895600"/>
+          </a:xfrm>
+          <a:prstGeom prst="rect">
+            <a:avLst/>
+          </a:prstGeom>
+        </p:spPr>
+        <p:txBody>
+          <a:bodyPr vert="horz" anchor="b">
+            <a:noAutofit/>
+          </a:bodyPr>
+          <a:lstStyle>
+            <a:lvl1pPr algn="l" rtl="0" eaLnBrk="1" latinLnBrk="0" hangingPunct="1">
+              <a:spcBef>
+                <a:spcPct val="0"/>
+              </a:spcBef>
+              <a:buNone/>
+              <a:defRPr kumimoji="0" sz="3000" b="1" kern="1200" cap="small" baseline="0">
+                <a:solidFill>
+                  <a:schemeClr val="tx2"/>
+                </a:solidFill>
+                <a:latin typeface="+mj-lt"/>
+                <a:ea typeface="+mj-ea"/>
+                <a:cs typeface="+mj-cs"/>
+              </a:defRPr>
+            </a:lvl1pPr>
+          </a:lstStyle>
+          <a:p>
+            <a:endParaRPr lang="en-US" sz="4000" dirty="0"/>
+          </a:p>
+        </p:txBody>
+      </p:sp>
+      <p:pic>
+        <p:nvPicPr>
+          <p:cNvPr id="3" name="Picture 2">
+            <a:extLst>
+              <a:ext uri="{FF2B5EF4-FFF2-40B4-BE49-F238E27FC236}">
+                <a16:creationId xmlns:a16="http://schemas.microsoft.com/office/drawing/2014/main" id="{D77048B2-ABBA-8005-9BB6-31913290A4EE}"/>
+              </a:ext>
+            </a:extLst>
+          </p:cNvPr>
+          <p:cNvPicPr>
+            <a:picLocks noChangeAspect="1"/>
+          </p:cNvPicPr>
+          <p:nvPr/>
+        </p:nvPicPr>
+        <p:blipFill>
+          <a:blip r:embed="rId4">
+            <a:extLst>
+              <a:ext uri="{28A0092B-C50C-407E-A947-70E740481C1C}">
+                <a14:useLocalDpi xmlns:a14="http://schemas.microsoft.com/office/drawing/2010/main" val="0"/>
+              </a:ext>
+            </a:extLst>
+          </a:blip>
+          <a:stretch>
+            <a:fillRect/>
+          </a:stretch>
+        </p:blipFill>
+        <p:spPr>
+          <a:xfrm>
+            <a:off x="1801368" y="1111729"/>
+            <a:ext cx="5943600" cy="4177342"/>
+          </a:xfrm>
+          <a:prstGeom prst="rect">
+            <a:avLst/>
+          </a:prstGeom>
+        </p:spPr>
+      </p:pic>
+    </p:spTree>
+    <p:extLst>
+      <p:ext uri="{BB962C8B-B14F-4D97-AF65-F5344CB8AC3E}">
         <p14:creationId xmlns:p14="http://schemas.microsoft.com/office/powerpoint/2010/main" val="1407078488"/>
       </p:ext>
     </p:extLst>
@@ -15203,13 +15679,13 @@
   <p:clrMapOvr>
     <a:masterClrMapping/>
   </p:clrMapOvr>
-  <mc:AlternateContent xmlns:mc="http://schemas.openxmlformats.org/markup-compatibility/2006">
-    <mc:Choice xmlns:p15="http://schemas.microsoft.com/office/powerpoint/2012/main" Requires="p15">
+  <mc:AlternateContent xmlns:mc="http://schemas.openxmlformats.org/markup-compatibility/2006" xmlns:p15="http://schemas.microsoft.com/office/powerpoint/2012/main">
+    <mc:Choice Requires="p15">
       <p:transition xmlns:p14="http://schemas.microsoft.com/office/powerpoint/2010/main" spd="slow" p14:dur="2000" advClick="0">
         <p15:prstTrans prst="fracture"/>
       </p:transition>
     </mc:Choice>
-    <mc:Fallback>
+    <mc:Fallback xmlns="">
       <p:transition spd="slow" advClick="0">
         <p:fade/>
       </p:transition>
@@ -15495,7 +15971,7 @@
         </p:nvSpPr>
         <p:spPr>
           <a:xfrm>
-            <a:off x="1295400" y="1752600"/>
+            <a:off x="1133856" y="3205719"/>
             <a:ext cx="7315200" cy="598962"/>
           </a:xfrm>
         </p:spPr>
@@ -15505,17 +15981,28 @@
           </a:bodyPr>
           <a:lstStyle/>
           <a:p>
-            <a:r>
-              <a:rPr lang="en-US" dirty="0"/>
+            <a:pPr fontAlgn="base"/>
+            <a:r>
+              <a:rPr lang="en-US" sz="2800" dirty="0"/>
               <a:t>Super fast super property access</a:t>
             </a:r>
             <a:br>
-              <a:rPr lang="en-US" dirty="0"/>
+              <a:rPr lang="en-US" sz="2800" dirty="0"/>
+            </a:br>
+            <a:r>
+              <a:rPr lang="en-US" sz="2800" b="0" dirty="0"/>
+              <a:t>Performance improvement in both class fields and private class methods.</a:t>
+            </a:r>
+            <a:br>
+              <a:rPr lang="en-US" sz="2800" b="0" dirty="0"/>
             </a:br>
             <a:br>
-              <a:rPr lang="en-US" sz="4000" dirty="0"/>
+              <a:rPr lang="en-US" sz="3600" dirty="0"/>
             </a:br>
-            <a:endParaRPr lang="en-US" sz="4000" dirty="0"/>
+            <a:br>
+              <a:rPr lang="en-US" sz="3600" dirty="0"/>
+            </a:br>
+            <a:endParaRPr lang="en-US" sz="3600" dirty="0"/>
           </a:p>
         </p:txBody>
       </p:sp>
@@ -15599,8 +16086,8 @@
         </p:blipFill>
         <p:spPr>
           <a:xfrm>
-            <a:off x="12192" y="1143000"/>
-            <a:ext cx="9144000" cy="5091416"/>
+            <a:off x="152400" y="2223784"/>
+            <a:ext cx="9144000" cy="4634216"/>
           </a:xfrm>
           <a:prstGeom prst="rect">
             <a:avLst/>
@@ -16114,6 +16601,253 @@
 </file>
 
 <file path=ppt/slides/slide8.xml><?xml version="1.0" encoding="utf-8"?>
+<p:sld xmlns:a="http://schemas.openxmlformats.org/drawingml/2006/main" xmlns:r="http://schemas.openxmlformats.org/officeDocument/2006/relationships" xmlns:p="http://schemas.openxmlformats.org/presentationml/2006/main">
+  <p:cSld>
+    <p:spTree>
+      <p:nvGrpSpPr>
+        <p:cNvPr id="1" name=""/>
+        <p:cNvGrpSpPr/>
+        <p:nvPr/>
+      </p:nvGrpSpPr>
+      <p:grpSpPr>
+        <a:xfrm>
+          <a:off x="0" y="0"/>
+          <a:ext cx="0" cy="0"/>
+          <a:chOff x="0" y="0"/>
+          <a:chExt cx="0" cy="0"/>
+        </a:xfrm>
+      </p:grpSpPr>
+      <p:sp>
+        <p:nvSpPr>
+          <p:cNvPr id="12" name="Title 1">
+            <a:extLst>
+              <a:ext uri="{FF2B5EF4-FFF2-40B4-BE49-F238E27FC236}">
+                <a16:creationId xmlns:a16="http://schemas.microsoft.com/office/drawing/2014/main" id="{10FA0667-D2F1-61CF-06C4-CF76375845F1}"/>
+              </a:ext>
+            </a:extLst>
+          </p:cNvPr>
+          <p:cNvSpPr txBox="1">
+            <a:spLocks/>
+          </p:cNvSpPr>
+          <p:nvPr/>
+        </p:nvSpPr>
+        <p:spPr>
+          <a:xfrm>
+            <a:off x="1752600" y="1447800"/>
+            <a:ext cx="6705600" cy="4114800"/>
+          </a:xfrm>
+          <a:prstGeom prst="rect">
+            <a:avLst/>
+          </a:prstGeom>
+        </p:spPr>
+        <p:txBody>
+          <a:bodyPr vert="horz" anchor="b">
+            <a:noAutofit/>
+          </a:bodyPr>
+          <a:lstStyle>
+            <a:lvl1pPr algn="l" rtl="0" eaLnBrk="1" latinLnBrk="0" hangingPunct="1">
+              <a:spcBef>
+                <a:spcPct val="0"/>
+              </a:spcBef>
+              <a:buNone/>
+              <a:defRPr kumimoji="0" sz="3000" b="1" kern="1200" cap="small" baseline="0">
+                <a:solidFill>
+                  <a:schemeClr val="tx2"/>
+                </a:solidFill>
+                <a:latin typeface="+mj-lt"/>
+                <a:ea typeface="+mj-ea"/>
+                <a:cs typeface="+mj-cs"/>
+              </a:defRPr>
+            </a:lvl1pPr>
+          </a:lstStyle>
+          <a:p>
+            <a:endParaRPr lang="en-US" sz="4000" dirty="0"/>
+          </a:p>
+        </p:txBody>
+      </p:sp>
+      <p:sp>
+        <p:nvSpPr>
+          <p:cNvPr id="7" name="Title 1">
+            <a:extLst>
+              <a:ext uri="{FF2B5EF4-FFF2-40B4-BE49-F238E27FC236}">
+                <a16:creationId xmlns:a16="http://schemas.microsoft.com/office/drawing/2014/main" id="{54C561DF-0CCA-BAA8-EEF9-9C112E85285D}"/>
+              </a:ext>
+            </a:extLst>
+          </p:cNvPr>
+          <p:cNvSpPr>
+            <a:spLocks noGrp="1"/>
+          </p:cNvSpPr>
+          <p:nvPr>
+            <p:ph type="ctrTitle"/>
+          </p:nvPr>
+        </p:nvSpPr>
+        <p:spPr>
+          <a:xfrm>
+            <a:off x="1295400" y="1752600"/>
+            <a:ext cx="7315200" cy="598962"/>
+          </a:xfrm>
+        </p:spPr>
+        <p:txBody>
+          <a:bodyPr>
+            <a:noAutofit/>
+          </a:bodyPr>
+          <a:lstStyle/>
+          <a:p>
+            <a:r>
+              <a:rPr lang="en-US" dirty="0"/>
+              <a:t>Super fast super property access</a:t>
+            </a:r>
+            <a:br>
+              <a:rPr lang="en-US" dirty="0"/>
+            </a:br>
+            <a:br>
+              <a:rPr lang="en-US" sz="4000" dirty="0"/>
+            </a:br>
+            <a:endParaRPr lang="en-US" sz="4000" dirty="0"/>
+          </a:p>
+        </p:txBody>
+      </p:sp>
+      <p:sp>
+        <p:nvSpPr>
+          <p:cNvPr id="8" name="Title 1">
+            <a:extLst>
+              <a:ext uri="{FF2B5EF4-FFF2-40B4-BE49-F238E27FC236}">
+                <a16:creationId xmlns:a16="http://schemas.microsoft.com/office/drawing/2014/main" id="{819295D5-CFC5-39D4-ABCD-84611FB0FFEE}"/>
+              </a:ext>
+            </a:extLst>
+          </p:cNvPr>
+          <p:cNvSpPr txBox="1">
+            <a:spLocks/>
+          </p:cNvSpPr>
+          <p:nvPr/>
+        </p:nvSpPr>
+        <p:spPr>
+          <a:xfrm>
+            <a:off x="2438400" y="152400"/>
+            <a:ext cx="7315200" cy="598962"/>
+          </a:xfrm>
+          <a:prstGeom prst="rect">
+            <a:avLst/>
+          </a:prstGeom>
+        </p:spPr>
+        <p:txBody>
+          <a:bodyPr vert="horz" anchor="b">
+            <a:noAutofit/>
+          </a:bodyPr>
+          <a:lstStyle>
+            <a:lvl1pPr algn="l" rtl="0" eaLnBrk="1" latinLnBrk="0" hangingPunct="1">
+              <a:spcBef>
+                <a:spcPct val="0"/>
+              </a:spcBef>
+              <a:buNone/>
+              <a:defRPr kumimoji="0" sz="3000" b="1" kern="1200" cap="small" baseline="0">
+                <a:solidFill>
+                  <a:schemeClr val="tx2"/>
+                </a:solidFill>
+                <a:latin typeface="+mj-lt"/>
+                <a:ea typeface="+mj-ea"/>
+                <a:cs typeface="+mj-cs"/>
+              </a:defRPr>
+            </a:lvl1pPr>
+          </a:lstStyle>
+          <a:p>
+            <a:r>
+              <a:rPr lang="en-US" dirty="0"/>
+              <a:t>V8 Engine Features</a:t>
+            </a:r>
+            <a:endParaRPr lang="en-US" sz="4000" dirty="0"/>
+          </a:p>
+        </p:txBody>
+      </p:sp>
+      <p:sp>
+        <p:nvSpPr>
+          <p:cNvPr id="9" name="TextBox 8">
+            <a:extLst>
+              <a:ext uri="{FF2B5EF4-FFF2-40B4-BE49-F238E27FC236}">
+                <a16:creationId xmlns:a16="http://schemas.microsoft.com/office/drawing/2014/main" id="{FB1C7CB9-0363-653B-D413-82402196CC19}"/>
+              </a:ext>
+            </a:extLst>
+          </p:cNvPr>
+          <p:cNvSpPr txBox="1"/>
+          <p:nvPr/>
+        </p:nvSpPr>
+        <p:spPr>
+          <a:xfrm>
+            <a:off x="1828800" y="6074887"/>
+            <a:ext cx="4878324" cy="369332"/>
+          </a:xfrm>
+          <a:prstGeom prst="rect">
+            <a:avLst/>
+          </a:prstGeom>
+          <a:noFill/>
+        </p:spPr>
+        <p:txBody>
+          <a:bodyPr wrap="square">
+            <a:spAutoFit/>
+          </a:bodyPr>
+          <a:lstStyle/>
+          <a:p>
+            <a:r>
+              <a:rPr lang="en-IL" dirty="0">
+                <a:hlinkClick r:id="rId3"/>
+              </a:rPr>
+              <a:t>https://mathiasbynens.be/notes/shapes-ics</a:t>
+            </a:r>
+            <a:endParaRPr lang="en-IL" dirty="0"/>
+          </a:p>
+        </p:txBody>
+      </p:sp>
+      <p:pic>
+        <p:nvPicPr>
+          <p:cNvPr id="4" name="Picture 3" descr="Chart, bar chart&#10;&#10;Description automatically generated">
+            <a:extLst>
+              <a:ext uri="{FF2B5EF4-FFF2-40B4-BE49-F238E27FC236}">
+                <a16:creationId xmlns:a16="http://schemas.microsoft.com/office/drawing/2014/main" id="{24944DBE-A732-9CB1-59AD-1F9FE1B3B0DD}"/>
+              </a:ext>
+            </a:extLst>
+          </p:cNvPr>
+          <p:cNvPicPr>
+            <a:picLocks noChangeAspect="1"/>
+          </p:cNvPicPr>
+          <p:nvPr/>
+        </p:nvPicPr>
+        <p:blipFill>
+          <a:blip r:embed="rId4">
+            <a:extLst>
+              <a:ext uri="{28A0092B-C50C-407E-A947-70E740481C1C}">
+                <a14:useLocalDpi xmlns:a14="http://schemas.microsoft.com/office/drawing/2010/main" val="0"/>
+              </a:ext>
+            </a:extLst>
+          </a:blip>
+          <a:stretch>
+            <a:fillRect/>
+          </a:stretch>
+        </p:blipFill>
+        <p:spPr>
+          <a:xfrm>
+            <a:off x="0" y="1263649"/>
+            <a:ext cx="9144000" cy="4712719"/>
+          </a:xfrm>
+          <a:prstGeom prst="rect">
+            <a:avLst/>
+          </a:prstGeom>
+        </p:spPr>
+      </p:pic>
+    </p:spTree>
+    <p:extLst>
+      <p:ext uri="{BB962C8B-B14F-4D97-AF65-F5344CB8AC3E}">
+        <p14:creationId xmlns:p14="http://schemas.microsoft.com/office/powerpoint/2010/main" val="2365302388"/>
+      </p:ext>
+    </p:extLst>
+  </p:cSld>
+  <p:clrMapOvr>
+    <a:masterClrMapping/>
+  </p:clrMapOvr>
+  <p:transition spd="med" advClick="0"/>
+</p:sld>
+</file>
+
+<file path=ppt/slides/slide9.xml><?xml version="1.0" encoding="utf-8"?>
 <p:sld xmlns:a="http://schemas.openxmlformats.org/drawingml/2006/main" xmlns:r="http://schemas.openxmlformats.org/officeDocument/2006/relationships" xmlns:p="http://schemas.openxmlformats.org/presentationml/2006/main">
   <p:cSld>
     <p:spTree>
@@ -16481,240 +17215,6 @@
       </p:par>
     </p:tnLst>
   </p:timing>
-</p:sld>
-</file>
-
-<file path=ppt/slides/slide9.xml><?xml version="1.0" encoding="utf-8"?>
-<p:sld xmlns:a="http://schemas.openxmlformats.org/drawingml/2006/main" xmlns:r="http://schemas.openxmlformats.org/officeDocument/2006/relationships" xmlns:p="http://schemas.openxmlformats.org/presentationml/2006/main">
-  <p:cSld>
-    <p:spTree>
-      <p:nvGrpSpPr>
-        <p:cNvPr id="1" name=""/>
-        <p:cNvGrpSpPr/>
-        <p:nvPr/>
-      </p:nvGrpSpPr>
-      <p:grpSpPr>
-        <a:xfrm>
-          <a:off x="0" y="0"/>
-          <a:ext cx="0" cy="0"/>
-          <a:chOff x="0" y="0"/>
-          <a:chExt cx="0" cy="0"/>
-        </a:xfrm>
-      </p:grpSpPr>
-      <p:sp>
-        <p:nvSpPr>
-          <p:cNvPr id="12" name="Title 1">
-            <a:extLst>
-              <a:ext uri="{FF2B5EF4-FFF2-40B4-BE49-F238E27FC236}">
-                <a16:creationId xmlns:a16="http://schemas.microsoft.com/office/drawing/2014/main" id="{10FA0667-D2F1-61CF-06C4-CF76375845F1}"/>
-              </a:ext>
-            </a:extLst>
-          </p:cNvPr>
-          <p:cNvSpPr txBox="1">
-            <a:spLocks/>
-          </p:cNvSpPr>
-          <p:nvPr/>
-        </p:nvSpPr>
-        <p:spPr>
-          <a:xfrm>
-            <a:off x="1752600" y="1447800"/>
-            <a:ext cx="6705600" cy="4114800"/>
-          </a:xfrm>
-          <a:prstGeom prst="rect">
-            <a:avLst/>
-          </a:prstGeom>
-        </p:spPr>
-        <p:txBody>
-          <a:bodyPr vert="horz" anchor="b">
-            <a:noAutofit/>
-          </a:bodyPr>
-          <a:lstStyle>
-            <a:lvl1pPr algn="l" rtl="0" eaLnBrk="1" latinLnBrk="0" hangingPunct="1">
-              <a:spcBef>
-                <a:spcPct val="0"/>
-              </a:spcBef>
-              <a:buNone/>
-              <a:defRPr kumimoji="0" sz="3000" b="1" kern="1200" cap="small" baseline="0">
-                <a:solidFill>
-                  <a:schemeClr val="tx2"/>
-                </a:solidFill>
-                <a:latin typeface="+mj-lt"/>
-                <a:ea typeface="+mj-ea"/>
-                <a:cs typeface="+mj-cs"/>
-              </a:defRPr>
-            </a:lvl1pPr>
-          </a:lstStyle>
-          <a:p>
-            <a:endParaRPr lang="en-US" sz="4000" dirty="0"/>
-          </a:p>
-        </p:txBody>
-      </p:sp>
-      <p:sp>
-        <p:nvSpPr>
-          <p:cNvPr id="7" name="Title 1">
-            <a:extLst>
-              <a:ext uri="{FF2B5EF4-FFF2-40B4-BE49-F238E27FC236}">
-                <a16:creationId xmlns:a16="http://schemas.microsoft.com/office/drawing/2014/main" id="{54C561DF-0CCA-BAA8-EEF9-9C112E85285D}"/>
-              </a:ext>
-            </a:extLst>
-          </p:cNvPr>
-          <p:cNvSpPr>
-            <a:spLocks noGrp="1"/>
-          </p:cNvSpPr>
-          <p:nvPr>
-            <p:ph type="ctrTitle"/>
-          </p:nvPr>
-        </p:nvSpPr>
-        <p:spPr>
-          <a:xfrm>
-            <a:off x="2971800" y="1869785"/>
-            <a:ext cx="6705600" cy="598962"/>
-          </a:xfrm>
-        </p:spPr>
-        <p:txBody>
-          <a:bodyPr>
-            <a:noAutofit/>
-          </a:bodyPr>
-          <a:lstStyle/>
-          <a:p>
-            <a:r>
-              <a:rPr lang="en-US" sz="4000" dirty="0"/>
-              <a:t>Node 14.18 – </a:t>
-            </a:r>
-            <a:br>
-              <a:rPr lang="en-US" sz="4000" dirty="0"/>
-            </a:br>
-            <a:r>
-              <a:rPr lang="en-US" dirty="0"/>
-              <a:t>Built-in tooling</a:t>
-            </a:r>
-            <a:br>
-              <a:rPr lang="en-US" dirty="0"/>
-            </a:br>
-            <a:br>
-              <a:rPr lang="en-US" sz="4000" dirty="0"/>
-            </a:br>
-            <a:r>
-              <a:rPr lang="en-US" sz="4000" dirty="0"/>
-              <a:t> </a:t>
-            </a:r>
-          </a:p>
-        </p:txBody>
-      </p:sp>
-      <p:pic>
-        <p:nvPicPr>
-          <p:cNvPr id="4" name="Picture 3" descr="Graphical user interface, text, application&#10;&#10;Description automatically generated">
-            <a:extLst>
-              <a:ext uri="{FF2B5EF4-FFF2-40B4-BE49-F238E27FC236}">
-                <a16:creationId xmlns:a16="http://schemas.microsoft.com/office/drawing/2014/main" id="{EB1C4C4A-0B7A-5DAC-AFC0-D654A6154FDB}"/>
-              </a:ext>
-            </a:extLst>
-          </p:cNvPr>
-          <p:cNvPicPr>
-            <a:picLocks noChangeAspect="1"/>
-          </p:cNvPicPr>
-          <p:nvPr/>
-        </p:nvPicPr>
-        <p:blipFill>
-          <a:blip r:embed="rId3">
-            <a:extLst>
-              <a:ext uri="{28A0092B-C50C-407E-A947-70E740481C1C}">
-                <a14:useLocalDpi xmlns:a14="http://schemas.microsoft.com/office/drawing/2010/main" val="0"/>
-              </a:ext>
-            </a:extLst>
-          </a:blip>
-          <a:stretch>
-            <a:fillRect/>
-          </a:stretch>
-        </p:blipFill>
-        <p:spPr>
-          <a:xfrm>
-            <a:off x="876300" y="1479487"/>
-            <a:ext cx="7391400" cy="4582668"/>
-          </a:xfrm>
-          <a:prstGeom prst="rect">
-            <a:avLst/>
-          </a:prstGeom>
-        </p:spPr>
-      </p:pic>
-      <p:sp>
-        <p:nvSpPr>
-          <p:cNvPr id="5" name="TextBox 4">
-            <a:extLst>
-              <a:ext uri="{FF2B5EF4-FFF2-40B4-BE49-F238E27FC236}">
-                <a16:creationId xmlns:a16="http://schemas.microsoft.com/office/drawing/2014/main" id="{4DE08A7A-AEDE-58D4-E03D-91FA7EE5DDF5}"/>
-              </a:ext>
-            </a:extLst>
-          </p:cNvPr>
-          <p:cNvSpPr txBox="1"/>
-          <p:nvPr/>
-        </p:nvSpPr>
-        <p:spPr>
-          <a:xfrm>
-            <a:off x="2476500" y="6093842"/>
-            <a:ext cx="4191000" cy="646331"/>
-          </a:xfrm>
-          <a:prstGeom prst="rect">
-            <a:avLst/>
-          </a:prstGeom>
-          <a:noFill/>
-        </p:spPr>
-        <p:txBody>
-          <a:bodyPr wrap="square" rtlCol="0">
-            <a:spAutoFit/>
-          </a:bodyPr>
-          <a:lstStyle/>
-          <a:p>
-            <a:r>
-              <a:rPr lang="en-US" dirty="0"/>
-              <a:t>f</a:t>
-            </a:r>
-            <a:r>
-              <a:rPr lang="en-IL" dirty="0"/>
-              <a:t>mt (eslint,prittier) , task (grunt)</a:t>
-            </a:r>
-            <a:br>
-              <a:rPr lang="en-IL" dirty="0"/>
-            </a:br>
-            <a:r>
-              <a:rPr lang="en-IL" dirty="0"/>
-              <a:t>test </a:t>
-            </a:r>
-            <a:r>
-              <a:rPr lang="he-IL" dirty="0"/>
-              <a:t>)</a:t>
-            </a:r>
-            <a:r>
-              <a:rPr lang="en-IL" dirty="0"/>
-              <a:t>mocha </a:t>
-            </a:r>
-            <a:r>
-              <a:rPr lang="en-US" dirty="0"/>
-              <a:t>,</a:t>
-            </a:r>
-            <a:r>
-              <a:rPr lang="en-IL" dirty="0"/>
-              <a:t>jest …</a:t>
-            </a:r>
-            <a:r>
-              <a:rPr lang="he-IL" dirty="0"/>
-              <a:t>(</a:t>
-            </a:r>
-            <a:endParaRPr lang="en-IL" dirty="0"/>
-          </a:p>
-        </p:txBody>
-      </p:sp>
-    </p:spTree>
-    <p:extLst>
-      <p:ext uri="{BB962C8B-B14F-4D97-AF65-F5344CB8AC3E}">
-        <p14:creationId xmlns:p14="http://schemas.microsoft.com/office/powerpoint/2010/main" val="3225896332"/>
-      </p:ext>
-    </p:extLst>
-  </p:cSld>
-  <p:clrMapOvr>
-    <a:masterClrMapping/>
-  </p:clrMapOvr>
-  <p:transition spd="med" advClick="0"/>
 </p:sld>
 </file>
 

</xml_diff>